<commit_message>
socheton bangla proposal final
</commit_message>
<xml_diff>
--- a/Socheton/Socheton Academy-Bangla.pptx
+++ b/Socheton/Socheton Academy-Bangla.pptx
@@ -503,7 +503,7 @@
           <a:p>
             <a:fld id="{74C2A387-B29E-407A-9C31-AD00DC9D0CAD}" type="datetimeFigureOut">
               <a:rPr lang="en-US" smtClean="0"/>
-              <a:t>8/18/2020</a:t>
+              <a:t>9/1/2020</a:t>
             </a:fld>
             <a:endParaRPr lang="en-US"/>
           </a:p>
@@ -769,7 +769,7 @@
           <a:p>
             <a:fld id="{74C2A387-B29E-407A-9C31-AD00DC9D0CAD}" type="datetimeFigureOut">
               <a:rPr lang="en-US" smtClean="0"/>
-              <a:t>8/18/2020</a:t>
+              <a:t>9/1/2020</a:t>
             </a:fld>
             <a:endParaRPr lang="en-US"/>
           </a:p>
@@ -1019,7 +1019,7 @@
           <a:p>
             <a:fld id="{74C2A387-B29E-407A-9C31-AD00DC9D0CAD}" type="datetimeFigureOut">
               <a:rPr lang="en-US" smtClean="0"/>
-              <a:t>8/18/2020</a:t>
+              <a:t>9/1/2020</a:t>
             </a:fld>
             <a:endParaRPr lang="en-US"/>
           </a:p>
@@ -1327,7 +1327,7 @@
           <a:p>
             <a:fld id="{74C2A387-B29E-407A-9C31-AD00DC9D0CAD}" type="datetimeFigureOut">
               <a:rPr lang="en-US" smtClean="0"/>
-              <a:t>8/18/2020</a:t>
+              <a:t>9/1/2020</a:t>
             </a:fld>
             <a:endParaRPr lang="en-US"/>
           </a:p>
@@ -1645,7 +1645,7 @@
           <a:p>
             <a:fld id="{74C2A387-B29E-407A-9C31-AD00DC9D0CAD}" type="datetimeFigureOut">
               <a:rPr lang="en-US" smtClean="0"/>
-              <a:t>8/18/2020</a:t>
+              <a:t>9/1/2020</a:t>
             </a:fld>
             <a:endParaRPr lang="en-US"/>
           </a:p>
@@ -1947,7 +1947,7 @@
           <a:p>
             <a:fld id="{74C2A387-B29E-407A-9C31-AD00DC9D0CAD}" type="datetimeFigureOut">
               <a:rPr lang="en-US" smtClean="0"/>
-              <a:t>8/18/2020</a:t>
+              <a:t>9/1/2020</a:t>
             </a:fld>
             <a:endParaRPr lang="en-US"/>
           </a:p>
@@ -2314,7 +2314,7 @@
           <a:p>
             <a:fld id="{74C2A387-B29E-407A-9C31-AD00DC9D0CAD}" type="datetimeFigureOut">
               <a:rPr lang="en-US" smtClean="0"/>
-              <a:t>8/18/2020</a:t>
+              <a:t>9/1/2020</a:t>
             </a:fld>
             <a:endParaRPr lang="en-US"/>
           </a:p>
@@ -2500,7 +2500,7 @@
           <a:p>
             <a:fld id="{74C2A387-B29E-407A-9C31-AD00DC9D0CAD}" type="datetimeFigureOut">
               <a:rPr lang="en-US" smtClean="0"/>
-              <a:t>8/18/2020</a:t>
+              <a:t>9/1/2020</a:t>
             </a:fld>
             <a:endParaRPr lang="en-US"/>
           </a:p>
@@ -2686,7 +2686,7 @@
           <a:p>
             <a:fld id="{74C2A387-B29E-407A-9C31-AD00DC9D0CAD}" type="datetimeFigureOut">
               <a:rPr lang="en-US" smtClean="0"/>
-              <a:t>8/18/2020</a:t>
+              <a:t>9/1/2020</a:t>
             </a:fld>
             <a:endParaRPr lang="en-US"/>
           </a:p>
@@ -2866,7 +2866,7 @@
           <a:p>
             <a:fld id="{74C2A387-B29E-407A-9C31-AD00DC9D0CAD}" type="datetimeFigureOut">
               <a:rPr lang="en-US" smtClean="0"/>
-              <a:t>8/18/2020</a:t>
+              <a:t>9/1/2020</a:t>
             </a:fld>
             <a:endParaRPr lang="en-US"/>
           </a:p>
@@ -3116,7 +3116,7 @@
           <a:p>
             <a:fld id="{74C2A387-B29E-407A-9C31-AD00DC9D0CAD}" type="datetimeFigureOut">
               <a:rPr lang="en-US" smtClean="0"/>
-              <a:t>8/18/2020</a:t>
+              <a:t>9/1/2020</a:t>
             </a:fld>
             <a:endParaRPr lang="en-US"/>
           </a:p>
@@ -3363,7 +3363,7 @@
           <a:p>
             <a:fld id="{74C2A387-B29E-407A-9C31-AD00DC9D0CAD}" type="datetimeFigureOut">
               <a:rPr lang="en-US" smtClean="0"/>
-              <a:t>8/18/2020</a:t>
+              <a:t>9/1/2020</a:t>
             </a:fld>
             <a:endParaRPr lang="en-US"/>
           </a:p>
@@ -3752,7 +3752,7 @@
           <a:p>
             <a:fld id="{74C2A387-B29E-407A-9C31-AD00DC9D0CAD}" type="datetimeFigureOut">
               <a:rPr lang="en-US" smtClean="0"/>
-              <a:t>8/18/2020</a:t>
+              <a:t>9/1/2020</a:t>
             </a:fld>
             <a:endParaRPr lang="en-US"/>
           </a:p>
@@ -3881,7 +3881,7 @@
           <a:p>
             <a:fld id="{74C2A387-B29E-407A-9C31-AD00DC9D0CAD}" type="datetimeFigureOut">
               <a:rPr lang="en-US" smtClean="0"/>
-              <a:t>8/18/2020</a:t>
+              <a:t>9/1/2020</a:t>
             </a:fld>
             <a:endParaRPr lang="en-US"/>
           </a:p>
@@ -3976,7 +3976,7 @@
           <a:p>
             <a:fld id="{74C2A387-B29E-407A-9C31-AD00DC9D0CAD}" type="datetimeFigureOut">
               <a:rPr lang="en-US" smtClean="0"/>
-              <a:t>8/18/2020</a:t>
+              <a:t>9/1/2020</a:t>
             </a:fld>
             <a:endParaRPr lang="en-US"/>
           </a:p>
@@ -4231,7 +4231,7 @@
           <a:p>
             <a:fld id="{74C2A387-B29E-407A-9C31-AD00DC9D0CAD}" type="datetimeFigureOut">
               <a:rPr lang="en-US" smtClean="0"/>
-              <a:t>8/18/2020</a:t>
+              <a:t>9/1/2020</a:t>
             </a:fld>
             <a:endParaRPr lang="en-US"/>
           </a:p>
@@ -4514,7 +4514,7 @@
           <a:p>
             <a:fld id="{74C2A387-B29E-407A-9C31-AD00DC9D0CAD}" type="datetimeFigureOut">
               <a:rPr lang="en-US" smtClean="0"/>
-              <a:t>8/18/2020</a:t>
+              <a:t>9/1/2020</a:t>
             </a:fld>
             <a:endParaRPr lang="en-US"/>
           </a:p>
@@ -4925,7 +4925,7 @@
           <a:p>
             <a:fld id="{74C2A387-B29E-407A-9C31-AD00DC9D0CAD}" type="datetimeFigureOut">
               <a:rPr lang="en-US" smtClean="0"/>
-              <a:t>8/18/2020</a:t>
+              <a:t>9/1/2020</a:t>
             </a:fld>
             <a:endParaRPr lang="en-US"/>
           </a:p>
@@ -9314,7 +9314,7 @@
           </a:bodyPr>
           <a:lstStyle/>
           <a:p>
-            <a:pPr marL="0" marR="0" algn="just">
+            <a:pPr marL="0" marR="0" indent="0" algn="just">
               <a:lnSpc>
                 <a:spcPct val="107000"/>
               </a:lnSpc>
@@ -9324,9 +9324,13 @@
               <a:spcAft>
                 <a:spcPts val="800"/>
               </a:spcAft>
+              <a:buNone/>
             </a:pPr>
             <a:r>
               <a:rPr lang="en-US" sz="1800" dirty="0">
+                <a:solidFill>
+                  <a:schemeClr val="bg1"/>
+                </a:solidFill>
                 <a:effectLst/>
                 <a:latin typeface="SutonnyMJ" pitchFamily="2" charset="0"/>
                 <a:ea typeface="Calibri" panose="020F0502020204030204" pitchFamily="34" charset="0"/>
@@ -9336,6 +9340,9 @@
             </a:r>
             <a:r>
               <a:rPr lang="en-US" sz="1800" dirty="0" err="1">
+                <a:solidFill>
+                  <a:schemeClr val="bg1"/>
+                </a:solidFill>
                 <a:effectLst/>
                 <a:latin typeface="SutonnyMJ" pitchFamily="2" charset="0"/>
                 <a:ea typeface="Calibri" panose="020F0502020204030204" pitchFamily="34" charset="0"/>
@@ -9345,6 +9352,9 @@
             </a:r>
             <a:r>
               <a:rPr lang="en-US" sz="1800" dirty="0">
+                <a:solidFill>
+                  <a:schemeClr val="bg1"/>
+                </a:solidFill>
                 <a:effectLst/>
                 <a:latin typeface="SutonnyMJ" pitchFamily="2" charset="0"/>
                 <a:ea typeface="Calibri" panose="020F0502020204030204" pitchFamily="34" charset="0"/>
@@ -9354,6 +9364,9 @@
             </a:r>
             <a:r>
               <a:rPr lang="en-US" sz="1800" dirty="0" err="1">
+                <a:solidFill>
+                  <a:schemeClr val="bg1"/>
+                </a:solidFill>
                 <a:effectLst/>
                 <a:latin typeface="SutonnyMJ" pitchFamily="2" charset="0"/>
                 <a:ea typeface="Calibri" panose="020F0502020204030204" pitchFamily="34" charset="0"/>
@@ -9363,6 +9376,9 @@
             </a:r>
             <a:r>
               <a:rPr lang="en-US" sz="1800" dirty="0">
+                <a:solidFill>
+                  <a:schemeClr val="bg1"/>
+                </a:solidFill>
                 <a:effectLst/>
                 <a:latin typeface="SutonnyMJ" pitchFamily="2" charset="0"/>
                 <a:ea typeface="Calibri" panose="020F0502020204030204" pitchFamily="34" charset="0"/>
@@ -9372,6 +9388,9 @@
             </a:r>
             <a:r>
               <a:rPr lang="en-US" sz="1800" dirty="0" err="1">
+                <a:solidFill>
+                  <a:schemeClr val="bg1"/>
+                </a:solidFill>
                 <a:effectLst/>
                 <a:latin typeface="SutonnyMJ" pitchFamily="2" charset="0"/>
                 <a:ea typeface="Calibri" panose="020F0502020204030204" pitchFamily="34" charset="0"/>
@@ -9381,15 +9400,21 @@
             </a:r>
             <a:r>
               <a:rPr lang="en-US" sz="1800" dirty="0">
-                <a:effectLst/>
-                <a:latin typeface="SutonnyMJ" pitchFamily="2" charset="0"/>
-                <a:ea typeface="Calibri" panose="020F0502020204030204" pitchFamily="34" charset="0"/>
-                <a:cs typeface="Vrinda" panose="020B0502040204020203" pitchFamily="34" charset="0"/>
-              </a:rPr>
-              <a:t> </a:t>
-            </a:r>
-            <a:r>
-              <a:rPr lang="en-US" sz="1800" dirty="0" err="1">
+                <a:solidFill>
+                  <a:schemeClr val="bg1"/>
+                </a:solidFill>
+                <a:effectLst/>
+                <a:latin typeface="SutonnyMJ" pitchFamily="2" charset="0"/>
+                <a:ea typeface="Calibri" panose="020F0502020204030204" pitchFamily="34" charset="0"/>
+                <a:cs typeface="Vrinda" panose="020B0502040204020203" pitchFamily="34" charset="0"/>
+              </a:rPr>
+              <a:t> </a:t>
+            </a:r>
+            <a:r>
+              <a:rPr lang="en-US" sz="1800" dirty="0" err="1">
+                <a:solidFill>
+                  <a:schemeClr val="bg1"/>
+                </a:solidFill>
                 <a:effectLst/>
                 <a:latin typeface="SutonnyMJ" pitchFamily="2" charset="0"/>
                 <a:ea typeface="Calibri" panose="020F0502020204030204" pitchFamily="34" charset="0"/>
@@ -9399,15 +9424,21 @@
             </a:r>
             <a:r>
               <a:rPr lang="en-US" sz="1800" dirty="0">
-                <a:effectLst/>
-                <a:latin typeface="SutonnyMJ" pitchFamily="2" charset="0"/>
-                <a:ea typeface="Calibri" panose="020F0502020204030204" pitchFamily="34" charset="0"/>
-                <a:cs typeface="Vrinda" panose="020B0502040204020203" pitchFamily="34" charset="0"/>
-              </a:rPr>
-              <a:t> </a:t>
-            </a:r>
-            <a:r>
-              <a:rPr lang="en-US" sz="1800" dirty="0" err="1">
+                <a:solidFill>
+                  <a:schemeClr val="bg1"/>
+                </a:solidFill>
+                <a:effectLst/>
+                <a:latin typeface="SutonnyMJ" pitchFamily="2" charset="0"/>
+                <a:ea typeface="Calibri" panose="020F0502020204030204" pitchFamily="34" charset="0"/>
+                <a:cs typeface="Vrinda" panose="020B0502040204020203" pitchFamily="34" charset="0"/>
+              </a:rPr>
+              <a:t> </a:t>
+            </a:r>
+            <a:r>
+              <a:rPr lang="en-US" sz="1800" dirty="0" err="1">
+                <a:solidFill>
+                  <a:schemeClr val="bg1"/>
+                </a:solidFill>
                 <a:effectLst/>
                 <a:latin typeface="SutonnyMJ" pitchFamily="2" charset="0"/>
                 <a:ea typeface="Calibri" panose="020F0502020204030204" pitchFamily="34" charset="0"/>
@@ -9416,6 +9447,9 @@
               <a:t>myweav</a:t>
             </a:r>
             <a:endParaRPr lang="en-US" sz="1800" dirty="0">
+              <a:solidFill>
+                <a:schemeClr val="bg1"/>
+              </a:solidFill>
               <a:effectLst/>
               <a:latin typeface="Calibri" panose="020F0502020204030204" pitchFamily="34" charset="0"/>
               <a:ea typeface="Calibri" panose="020F0502020204030204" pitchFamily="34" charset="0"/>
@@ -9423,7 +9457,7 @@
             </a:endParaRPr>
           </a:p>
           <a:p>
-            <a:pPr marL="0" marR="0" algn="just">
+            <a:pPr marL="0" marR="0" indent="0" algn="just">
               <a:lnSpc>
                 <a:spcPct val="107000"/>
               </a:lnSpc>
@@ -9433,9 +9467,13 @@
               <a:spcAft>
                 <a:spcPts val="800"/>
               </a:spcAft>
+              <a:buNone/>
             </a:pPr>
             <a:r>
               <a:rPr lang="en-US" sz="1800" dirty="0">
+                <a:solidFill>
+                  <a:schemeClr val="bg1"/>
+                </a:solidFill>
                 <a:effectLst/>
                 <a:latin typeface="SutonnyMJ" pitchFamily="2" charset="0"/>
                 <a:ea typeface="Calibri" panose="020F0502020204030204" pitchFamily="34" charset="0"/>
@@ -9445,6 +9483,9 @@
             </a:r>
             <a:r>
               <a:rPr lang="en-US" sz="1800" dirty="0" err="1">
+                <a:solidFill>
+                  <a:schemeClr val="bg1"/>
+                </a:solidFill>
                 <a:effectLst/>
                 <a:latin typeface="SutonnyMJ" pitchFamily="2" charset="0"/>
                 <a:ea typeface="Calibri" panose="020F0502020204030204" pitchFamily="34" charset="0"/>
@@ -9454,15 +9495,21 @@
             </a:r>
             <a:r>
               <a:rPr lang="en-US" sz="1800" dirty="0">
-                <a:effectLst/>
-                <a:latin typeface="SutonnyMJ" pitchFamily="2" charset="0"/>
-                <a:ea typeface="Calibri" panose="020F0502020204030204" pitchFamily="34" charset="0"/>
-                <a:cs typeface="Vrinda" panose="020B0502040204020203" pitchFamily="34" charset="0"/>
-              </a:rPr>
-              <a:t> </a:t>
-            </a:r>
-            <a:r>
-              <a:rPr lang="en-US" sz="1800" dirty="0" err="1">
+                <a:solidFill>
+                  <a:schemeClr val="bg1"/>
+                </a:solidFill>
+                <a:effectLst/>
+                <a:latin typeface="SutonnyMJ" pitchFamily="2" charset="0"/>
+                <a:ea typeface="Calibri" panose="020F0502020204030204" pitchFamily="34" charset="0"/>
+                <a:cs typeface="Vrinda" panose="020B0502040204020203" pitchFamily="34" charset="0"/>
+              </a:rPr>
+              <a:t> </a:t>
+            </a:r>
+            <a:r>
+              <a:rPr lang="en-US" sz="1800" dirty="0" err="1">
+                <a:solidFill>
+                  <a:schemeClr val="bg1"/>
+                </a:solidFill>
                 <a:effectLst/>
                 <a:latin typeface="SutonnyMJ" pitchFamily="2" charset="0"/>
                 <a:ea typeface="Calibri" panose="020F0502020204030204" pitchFamily="34" charset="0"/>
@@ -9472,6 +9519,9 @@
             </a:r>
             <a:r>
               <a:rPr lang="en-US" sz="1800" dirty="0">
+                <a:solidFill>
+                  <a:schemeClr val="bg1"/>
+                </a:solidFill>
                 <a:effectLst/>
                 <a:latin typeface="SutonnyMJ" pitchFamily="2" charset="0"/>
                 <a:ea typeface="Calibri" panose="020F0502020204030204" pitchFamily="34" charset="0"/>
@@ -9481,6 +9531,9 @@
             </a:r>
             <a:r>
               <a:rPr lang="en-US" sz="1800" dirty="0" err="1">
+                <a:solidFill>
+                  <a:schemeClr val="bg1"/>
+                </a:solidFill>
                 <a:effectLst/>
                 <a:latin typeface="SutonnyMJ" pitchFamily="2" charset="0"/>
                 <a:ea typeface="Calibri" panose="020F0502020204030204" pitchFamily="34" charset="0"/>
@@ -9490,15 +9543,21 @@
             </a:r>
             <a:r>
               <a:rPr lang="en-US" sz="1800" dirty="0">
-                <a:effectLst/>
-                <a:latin typeface="SutonnyMJ" pitchFamily="2" charset="0"/>
-                <a:ea typeface="Calibri" panose="020F0502020204030204" pitchFamily="34" charset="0"/>
-                <a:cs typeface="Vrinda" panose="020B0502040204020203" pitchFamily="34" charset="0"/>
-              </a:rPr>
-              <a:t> </a:t>
-            </a:r>
-            <a:r>
-              <a:rPr lang="en-US" sz="1800" dirty="0" err="1">
+                <a:solidFill>
+                  <a:schemeClr val="bg1"/>
+                </a:solidFill>
+                <a:effectLst/>
+                <a:latin typeface="SutonnyMJ" pitchFamily="2" charset="0"/>
+                <a:ea typeface="Calibri" panose="020F0502020204030204" pitchFamily="34" charset="0"/>
+                <a:cs typeface="Vrinda" panose="020B0502040204020203" pitchFamily="34" charset="0"/>
+              </a:rPr>
+              <a:t> </a:t>
+            </a:r>
+            <a:r>
+              <a:rPr lang="en-US" sz="1800" dirty="0" err="1">
+                <a:solidFill>
+                  <a:schemeClr val="bg1"/>
+                </a:solidFill>
                 <a:effectLst/>
                 <a:latin typeface="SutonnyMJ" pitchFamily="2" charset="0"/>
                 <a:ea typeface="Calibri" panose="020F0502020204030204" pitchFamily="34" charset="0"/>
@@ -9508,15 +9567,21 @@
             </a:r>
             <a:r>
               <a:rPr lang="en-US" sz="1800" dirty="0">
-                <a:effectLst/>
-                <a:latin typeface="SutonnyMJ" pitchFamily="2" charset="0"/>
-                <a:ea typeface="Calibri" panose="020F0502020204030204" pitchFamily="34" charset="0"/>
-                <a:cs typeface="Vrinda" panose="020B0502040204020203" pitchFamily="34" charset="0"/>
-              </a:rPr>
-              <a:t> </a:t>
-            </a:r>
-            <a:r>
-              <a:rPr lang="en-US" sz="1800" dirty="0" err="1">
+                <a:solidFill>
+                  <a:schemeClr val="bg1"/>
+                </a:solidFill>
+                <a:effectLst/>
+                <a:latin typeface="SutonnyMJ" pitchFamily="2" charset="0"/>
+                <a:ea typeface="Calibri" panose="020F0502020204030204" pitchFamily="34" charset="0"/>
+                <a:cs typeface="Vrinda" panose="020B0502040204020203" pitchFamily="34" charset="0"/>
+              </a:rPr>
+              <a:t> </a:t>
+            </a:r>
+            <a:r>
+              <a:rPr lang="en-US" sz="1800" dirty="0" err="1">
+                <a:solidFill>
+                  <a:schemeClr val="bg1"/>
+                </a:solidFill>
                 <a:effectLst/>
                 <a:latin typeface="SutonnyMJ" pitchFamily="2" charset="0"/>
                 <a:ea typeface="Calibri" panose="020F0502020204030204" pitchFamily="34" charset="0"/>
@@ -9525,6 +9590,9 @@
               <a:t>LiP</a:t>
             </a:r>
             <a:endParaRPr lang="en-US" sz="1800" dirty="0">
+              <a:solidFill>
+                <a:schemeClr val="bg1"/>
+              </a:solidFill>
               <a:effectLst/>
               <a:latin typeface="Calibri" panose="020F0502020204030204" pitchFamily="34" charset="0"/>
               <a:ea typeface="Calibri" panose="020F0502020204030204" pitchFamily="34" charset="0"/>
@@ -9532,7 +9600,7 @@
             </a:endParaRPr>
           </a:p>
           <a:p>
-            <a:pPr marL="0" marR="0" algn="just">
+            <a:pPr marL="0" marR="0" indent="0" algn="just">
               <a:lnSpc>
                 <a:spcPct val="107000"/>
               </a:lnSpc>
@@ -9542,9 +9610,13 @@
               <a:spcAft>
                 <a:spcPts val="800"/>
               </a:spcAft>
+              <a:buNone/>
             </a:pPr>
             <a:r>
               <a:rPr lang="en-US" sz="1800" dirty="0">
+                <a:solidFill>
+                  <a:schemeClr val="bg1"/>
+                </a:solidFill>
                 <a:effectLst/>
                 <a:latin typeface="SutonnyMJ" pitchFamily="2" charset="0"/>
                 <a:ea typeface="Calibri" panose="020F0502020204030204" pitchFamily="34" charset="0"/>
@@ -9554,6 +9626,9 @@
             </a:r>
             <a:r>
               <a:rPr lang="en-US" sz="1800" dirty="0" err="1">
+                <a:solidFill>
+                  <a:schemeClr val="bg1"/>
+                </a:solidFill>
                 <a:effectLst/>
                 <a:latin typeface="SutonnyMJ" pitchFamily="2" charset="0"/>
                 <a:ea typeface="Calibri" panose="020F0502020204030204" pitchFamily="34" charset="0"/>
@@ -9563,15 +9638,21 @@
             </a:r>
             <a:r>
               <a:rPr lang="en-US" sz="1800" dirty="0">
-                <a:effectLst/>
-                <a:latin typeface="SutonnyMJ" pitchFamily="2" charset="0"/>
-                <a:ea typeface="Calibri" panose="020F0502020204030204" pitchFamily="34" charset="0"/>
-                <a:cs typeface="Vrinda" panose="020B0502040204020203" pitchFamily="34" charset="0"/>
-              </a:rPr>
-              <a:t> </a:t>
-            </a:r>
-            <a:r>
-              <a:rPr lang="en-US" sz="1800" dirty="0" err="1">
+                <a:solidFill>
+                  <a:schemeClr val="bg1"/>
+                </a:solidFill>
+                <a:effectLst/>
+                <a:latin typeface="SutonnyMJ" pitchFamily="2" charset="0"/>
+                <a:ea typeface="Calibri" panose="020F0502020204030204" pitchFamily="34" charset="0"/>
+                <a:cs typeface="Vrinda" panose="020B0502040204020203" pitchFamily="34" charset="0"/>
+              </a:rPr>
+              <a:t> </a:t>
+            </a:r>
+            <a:r>
+              <a:rPr lang="en-US" sz="1800" dirty="0" err="1">
+                <a:solidFill>
+                  <a:schemeClr val="bg1"/>
+                </a:solidFill>
                 <a:effectLst/>
                 <a:latin typeface="SutonnyMJ" pitchFamily="2" charset="0"/>
                 <a:ea typeface="Calibri" panose="020F0502020204030204" pitchFamily="34" charset="0"/>
@@ -9581,15 +9662,21 @@
             </a:r>
             <a:r>
               <a:rPr lang="en-US" sz="1800" dirty="0">
-                <a:effectLst/>
-                <a:latin typeface="SutonnyMJ" pitchFamily="2" charset="0"/>
-                <a:ea typeface="Calibri" panose="020F0502020204030204" pitchFamily="34" charset="0"/>
-                <a:cs typeface="Vrinda" panose="020B0502040204020203" pitchFamily="34" charset="0"/>
-              </a:rPr>
-              <a:t> </a:t>
-            </a:r>
-            <a:r>
-              <a:rPr lang="en-US" sz="1800" dirty="0" err="1">
+                <a:solidFill>
+                  <a:schemeClr val="bg1"/>
+                </a:solidFill>
+                <a:effectLst/>
+                <a:latin typeface="SutonnyMJ" pitchFamily="2" charset="0"/>
+                <a:ea typeface="Calibri" panose="020F0502020204030204" pitchFamily="34" charset="0"/>
+                <a:cs typeface="Vrinda" panose="020B0502040204020203" pitchFamily="34" charset="0"/>
+              </a:rPr>
+              <a:t> </a:t>
+            </a:r>
+            <a:r>
+              <a:rPr lang="en-US" sz="1800" dirty="0" err="1">
+                <a:solidFill>
+                  <a:schemeClr val="bg1"/>
+                </a:solidFill>
                 <a:effectLst/>
                 <a:latin typeface="SutonnyMJ" pitchFamily="2" charset="0"/>
                 <a:ea typeface="Calibri" panose="020F0502020204030204" pitchFamily="34" charset="0"/>
@@ -9599,15 +9686,21 @@
             </a:r>
             <a:r>
               <a:rPr lang="en-US" sz="1800" dirty="0">
-                <a:effectLst/>
-                <a:latin typeface="SutonnyMJ" pitchFamily="2" charset="0"/>
-                <a:ea typeface="Calibri" panose="020F0502020204030204" pitchFamily="34" charset="0"/>
-                <a:cs typeface="Vrinda" panose="020B0502040204020203" pitchFamily="34" charset="0"/>
-              </a:rPr>
-              <a:t> </a:t>
-            </a:r>
-            <a:r>
-              <a:rPr lang="en-US" sz="1800" dirty="0" err="1">
+                <a:solidFill>
+                  <a:schemeClr val="bg1"/>
+                </a:solidFill>
+                <a:effectLst/>
+                <a:latin typeface="SutonnyMJ" pitchFamily="2" charset="0"/>
+                <a:ea typeface="Calibri" panose="020F0502020204030204" pitchFamily="34" charset="0"/>
+                <a:cs typeface="Vrinda" panose="020B0502040204020203" pitchFamily="34" charset="0"/>
+              </a:rPr>
+              <a:t> </a:t>
+            </a:r>
+            <a:r>
+              <a:rPr lang="en-US" sz="1800" dirty="0" err="1">
+                <a:solidFill>
+                  <a:schemeClr val="bg1"/>
+                </a:solidFill>
                 <a:effectLst/>
                 <a:latin typeface="SutonnyMJ" pitchFamily="2" charset="0"/>
                 <a:ea typeface="Calibri" panose="020F0502020204030204" pitchFamily="34" charset="0"/>
@@ -9617,6 +9710,9 @@
             </a:r>
             <a:r>
               <a:rPr lang="en-US" sz="1800" dirty="0">
+                <a:solidFill>
+                  <a:schemeClr val="bg1"/>
+                </a:solidFill>
                 <a:effectLst/>
                 <a:latin typeface="SutonnyMJ" pitchFamily="2" charset="0"/>
                 <a:ea typeface="Calibri" panose="020F0502020204030204" pitchFamily="34" charset="0"/>
@@ -9626,6 +9722,9 @@
             </a:r>
             <a:r>
               <a:rPr lang="en-US" sz="1800" dirty="0" err="1">
+                <a:solidFill>
+                  <a:schemeClr val="bg1"/>
+                </a:solidFill>
                 <a:effectLst/>
                 <a:latin typeface="SutonnyMJ" pitchFamily="2" charset="0"/>
                 <a:ea typeface="Calibri" panose="020F0502020204030204" pitchFamily="34" charset="0"/>
@@ -9635,6 +9734,9 @@
             </a:r>
             <a:r>
               <a:rPr lang="en-US" sz="1800" dirty="0">
+                <a:solidFill>
+                  <a:schemeClr val="bg1"/>
+                </a:solidFill>
                 <a:effectLst/>
                 <a:latin typeface="SutonnyMJ" pitchFamily="2" charset="0"/>
                 <a:ea typeface="Calibri" panose="020F0502020204030204" pitchFamily="34" charset="0"/>
@@ -9644,6 +9746,9 @@
             </a:r>
             <a:r>
               <a:rPr lang="en-US" sz="1800" dirty="0" err="1">
+                <a:solidFill>
+                  <a:schemeClr val="bg1"/>
+                </a:solidFill>
                 <a:effectLst/>
                 <a:latin typeface="SutonnyMJ" pitchFamily="2" charset="0"/>
                 <a:ea typeface="Calibri" panose="020F0502020204030204" pitchFamily="34" charset="0"/>
@@ -9653,15 +9758,21 @@
             </a:r>
             <a:r>
               <a:rPr lang="en-US" sz="1800" dirty="0">
-                <a:effectLst/>
-                <a:latin typeface="SutonnyMJ" pitchFamily="2" charset="0"/>
-                <a:ea typeface="Calibri" panose="020F0502020204030204" pitchFamily="34" charset="0"/>
-                <a:cs typeface="Vrinda" panose="020B0502040204020203" pitchFamily="34" charset="0"/>
-              </a:rPr>
-              <a:t> </a:t>
-            </a:r>
-            <a:r>
-              <a:rPr lang="en-US" sz="1800" dirty="0" err="1">
+                <a:solidFill>
+                  <a:schemeClr val="bg1"/>
+                </a:solidFill>
+                <a:effectLst/>
+                <a:latin typeface="SutonnyMJ" pitchFamily="2" charset="0"/>
+                <a:ea typeface="Calibri" panose="020F0502020204030204" pitchFamily="34" charset="0"/>
+                <a:cs typeface="Vrinda" panose="020B0502040204020203" pitchFamily="34" charset="0"/>
+              </a:rPr>
+              <a:t> </a:t>
+            </a:r>
+            <a:r>
+              <a:rPr lang="en-US" sz="1800" dirty="0" err="1">
+                <a:solidFill>
+                  <a:schemeClr val="bg1"/>
+                </a:solidFill>
                 <a:effectLst/>
                 <a:latin typeface="SutonnyMJ" pitchFamily="2" charset="0"/>
                 <a:ea typeface="Calibri" panose="020F0502020204030204" pitchFamily="34" charset="0"/>
@@ -9670,6 +9781,9 @@
               <a:t>myweav</a:t>
             </a:r>
             <a:endParaRPr lang="en-US" sz="1800" dirty="0">
+              <a:solidFill>
+                <a:schemeClr val="bg1"/>
+              </a:solidFill>
               <a:effectLst/>
               <a:latin typeface="Calibri" panose="020F0502020204030204" pitchFamily="34" charset="0"/>
               <a:ea typeface="Calibri" panose="020F0502020204030204" pitchFamily="34" charset="0"/>
@@ -9677,7 +9791,7 @@
             </a:endParaRPr>
           </a:p>
           <a:p>
-            <a:pPr marL="0" marR="0" algn="just">
+            <a:pPr marL="0" marR="0" indent="0" algn="just">
               <a:lnSpc>
                 <a:spcPct val="107000"/>
               </a:lnSpc>
@@ -9687,9 +9801,13 @@
               <a:spcAft>
                 <a:spcPts val="800"/>
               </a:spcAft>
+              <a:buNone/>
             </a:pPr>
             <a:r>
               <a:rPr lang="en-US" sz="1800" dirty="0">
+                <a:solidFill>
+                  <a:schemeClr val="bg1"/>
+                </a:solidFill>
                 <a:effectLst/>
                 <a:latin typeface="SutonnyMJ" pitchFamily="2" charset="0"/>
                 <a:ea typeface="Calibri" panose="020F0502020204030204" pitchFamily="34" charset="0"/>
@@ -9699,6 +9817,9 @@
             </a:r>
             <a:r>
               <a:rPr lang="en-US" sz="1800" dirty="0" err="1">
+                <a:solidFill>
+                  <a:schemeClr val="bg1"/>
+                </a:solidFill>
                 <a:effectLst/>
                 <a:latin typeface="SutonnyMJ" pitchFamily="2" charset="0"/>
                 <a:ea typeface="Calibri" panose="020F0502020204030204" pitchFamily="34" charset="0"/>
@@ -9708,6 +9829,9 @@
             </a:r>
             <a:r>
               <a:rPr lang="en-US" sz="1800" dirty="0">
+                <a:solidFill>
+                  <a:schemeClr val="bg1"/>
+                </a:solidFill>
                 <a:effectLst/>
                 <a:latin typeface="SutonnyMJ" pitchFamily="2" charset="0"/>
                 <a:ea typeface="Calibri" panose="020F0502020204030204" pitchFamily="34" charset="0"/>
@@ -9717,6 +9841,9 @@
             </a:r>
             <a:r>
               <a:rPr lang="en-US" sz="1800" dirty="0" err="1">
+                <a:solidFill>
+                  <a:schemeClr val="bg1"/>
+                </a:solidFill>
                 <a:effectLst/>
                 <a:latin typeface="SutonnyMJ" pitchFamily="2" charset="0"/>
                 <a:ea typeface="Calibri" panose="020F0502020204030204" pitchFamily="34" charset="0"/>
@@ -9726,6 +9853,9 @@
             </a:r>
             <a:r>
               <a:rPr lang="en-US" sz="1800" dirty="0">
+                <a:solidFill>
+                  <a:schemeClr val="bg1"/>
+                </a:solidFill>
                 <a:effectLst/>
                 <a:latin typeface="SutonnyMJ" pitchFamily="2" charset="0"/>
                 <a:ea typeface="Calibri" panose="020F0502020204030204" pitchFamily="34" charset="0"/>
@@ -9735,6 +9865,9 @@
             </a:r>
             <a:r>
               <a:rPr lang="en-US" sz="1800" dirty="0" err="1">
+                <a:solidFill>
+                  <a:schemeClr val="bg1"/>
+                </a:solidFill>
                 <a:effectLst/>
                 <a:latin typeface="SutonnyMJ" pitchFamily="2" charset="0"/>
                 <a:ea typeface="Calibri" panose="020F0502020204030204" pitchFamily="34" charset="0"/>
@@ -9744,15 +9877,21 @@
             </a:r>
             <a:r>
               <a:rPr lang="en-US" sz="1800" dirty="0">
-                <a:effectLst/>
-                <a:latin typeface="SutonnyMJ" pitchFamily="2" charset="0"/>
-                <a:ea typeface="Calibri" panose="020F0502020204030204" pitchFamily="34" charset="0"/>
-                <a:cs typeface="Vrinda" panose="020B0502040204020203" pitchFamily="34" charset="0"/>
-              </a:rPr>
-              <a:t> </a:t>
-            </a:r>
-            <a:r>
-              <a:rPr lang="en-US" sz="1800" dirty="0" err="1">
+                <a:solidFill>
+                  <a:schemeClr val="bg1"/>
+                </a:solidFill>
+                <a:effectLst/>
+                <a:latin typeface="SutonnyMJ" pitchFamily="2" charset="0"/>
+                <a:ea typeface="Calibri" panose="020F0502020204030204" pitchFamily="34" charset="0"/>
+                <a:cs typeface="Vrinda" panose="020B0502040204020203" pitchFamily="34" charset="0"/>
+              </a:rPr>
+              <a:t> </a:t>
+            </a:r>
+            <a:r>
+              <a:rPr lang="en-US" sz="1800" dirty="0" err="1">
+                <a:solidFill>
+                  <a:schemeClr val="bg1"/>
+                </a:solidFill>
                 <a:effectLst/>
                 <a:latin typeface="SutonnyMJ" pitchFamily="2" charset="0"/>
                 <a:ea typeface="Calibri" panose="020F0502020204030204" pitchFamily="34" charset="0"/>
@@ -9762,6 +9901,9 @@
             </a:r>
             <a:r>
               <a:rPr lang="en-US" sz="1800" dirty="0">
+                <a:solidFill>
+                  <a:schemeClr val="bg1"/>
+                </a:solidFill>
                 <a:effectLst/>
                 <a:latin typeface="SutonnyMJ" pitchFamily="2" charset="0"/>
                 <a:ea typeface="Calibri" panose="020F0502020204030204" pitchFamily="34" charset="0"/>
@@ -9771,6 +9913,9 @@
             </a:r>
             <a:r>
               <a:rPr lang="en-US" sz="1800" dirty="0" err="1">
+                <a:solidFill>
+                  <a:schemeClr val="bg1"/>
+                </a:solidFill>
                 <a:effectLst/>
                 <a:latin typeface="SutonnyMJ" pitchFamily="2" charset="0"/>
                 <a:ea typeface="Calibri" panose="020F0502020204030204" pitchFamily="34" charset="0"/>
@@ -9780,6 +9925,9 @@
             </a:r>
             <a:r>
               <a:rPr lang="en-US" sz="1800" dirty="0">
+                <a:solidFill>
+                  <a:schemeClr val="bg1"/>
+                </a:solidFill>
                 <a:effectLst/>
                 <a:latin typeface="SutonnyMJ" pitchFamily="2" charset="0"/>
                 <a:ea typeface="Calibri" panose="020F0502020204030204" pitchFamily="34" charset="0"/>
@@ -9789,6 +9937,9 @@
             </a:r>
             <a:r>
               <a:rPr lang="en-US" sz="1800" dirty="0" err="1">
+                <a:solidFill>
+                  <a:schemeClr val="bg1"/>
+                </a:solidFill>
                 <a:effectLst/>
                 <a:latin typeface="SutonnyMJ" pitchFamily="2" charset="0"/>
                 <a:ea typeface="Calibri" panose="020F0502020204030204" pitchFamily="34" charset="0"/>
@@ -9798,6 +9949,9 @@
             </a:r>
             <a:r>
               <a:rPr lang="en-US" sz="1800" dirty="0">
+                <a:solidFill>
+                  <a:schemeClr val="bg1"/>
+                </a:solidFill>
                 <a:effectLst/>
                 <a:latin typeface="SutonnyMJ" pitchFamily="2" charset="0"/>
                 <a:ea typeface="Calibri" panose="020F0502020204030204" pitchFamily="34" charset="0"/>
@@ -9807,6 +9961,9 @@
             </a:r>
             <a:r>
               <a:rPr lang="en-US" sz="1800" dirty="0" err="1">
+                <a:solidFill>
+                  <a:schemeClr val="bg1"/>
+                </a:solidFill>
                 <a:latin typeface="SutonnyOMJ" panose="01010600010101010101" pitchFamily="2" charset="0"/>
                 <a:ea typeface="Calibri" panose="020F0502020204030204" pitchFamily="34" charset="0"/>
                 <a:cs typeface="SutonnyOMJ" panose="01010600010101010101" pitchFamily="2" charset="0"/>
@@ -9814,6 +9971,9 @@
               <a:t>সামঞ্জস্যপূর্ণ</a:t>
             </a:r>
             <a:endParaRPr lang="en-US" sz="1800" dirty="0">
+              <a:solidFill>
+                <a:schemeClr val="bg1"/>
+              </a:solidFill>
               <a:effectLst/>
               <a:latin typeface="SutonnyOMJ" panose="01010600010101010101" pitchFamily="2" charset="0"/>
               <a:ea typeface="Calibri" panose="020F0502020204030204" pitchFamily="34" charset="0"/>
@@ -9821,7 +9981,7 @@
             </a:endParaRPr>
           </a:p>
           <a:p>
-            <a:pPr marL="0" marR="0" algn="just">
+            <a:pPr marL="0" marR="0" indent="0" algn="just">
               <a:lnSpc>
                 <a:spcPct val="107000"/>
               </a:lnSpc>
@@ -9831,9 +9991,13 @@
               <a:spcAft>
                 <a:spcPts val="800"/>
               </a:spcAft>
+              <a:buNone/>
             </a:pPr>
             <a:r>
               <a:rPr lang="en-US" sz="1800" dirty="0">
+                <a:solidFill>
+                  <a:schemeClr val="bg1"/>
+                </a:solidFill>
                 <a:effectLst/>
                 <a:latin typeface="SutonnyMJ" pitchFamily="2" charset="0"/>
                 <a:ea typeface="Calibri" panose="020F0502020204030204" pitchFamily="34" charset="0"/>
@@ -9843,6 +10007,9 @@
             </a:r>
             <a:r>
               <a:rPr lang="en-US" sz="1800" dirty="0" err="1">
+                <a:solidFill>
+                  <a:schemeClr val="bg1"/>
+                </a:solidFill>
                 <a:effectLst/>
                 <a:latin typeface="SutonnyMJ" pitchFamily="2" charset="0"/>
                 <a:ea typeface="Calibri" panose="020F0502020204030204" pitchFamily="34" charset="0"/>
@@ -9852,6 +10019,9 @@
             </a:r>
             <a:r>
               <a:rPr lang="en-US" sz="1800" dirty="0">
+                <a:solidFill>
+                  <a:schemeClr val="bg1"/>
+                </a:solidFill>
                 <a:effectLst/>
                 <a:latin typeface="SutonnyMJ" pitchFamily="2" charset="0"/>
                 <a:ea typeface="Calibri" panose="020F0502020204030204" pitchFamily="34" charset="0"/>
@@ -9861,6 +10031,9 @@
             </a:r>
             <a:r>
               <a:rPr lang="en-US" sz="1800" dirty="0" err="1">
+                <a:solidFill>
+                  <a:schemeClr val="bg1"/>
+                </a:solidFill>
                 <a:effectLst/>
                 <a:latin typeface="SutonnyMJ" pitchFamily="2" charset="0"/>
                 <a:ea typeface="Calibri" panose="020F0502020204030204" pitchFamily="34" charset="0"/>
@@ -9870,6 +10043,9 @@
             </a:r>
             <a:r>
               <a:rPr lang="en-US" sz="1800" dirty="0">
+                <a:solidFill>
+                  <a:schemeClr val="bg1"/>
+                </a:solidFill>
                 <a:effectLst/>
                 <a:latin typeface="SutonnyMJ" pitchFamily="2" charset="0"/>
                 <a:ea typeface="Calibri" panose="020F0502020204030204" pitchFamily="34" charset="0"/>
@@ -9879,6 +10055,9 @@
             </a:r>
             <a:r>
               <a:rPr lang="en-US" sz="1800" dirty="0" err="1">
+                <a:solidFill>
+                  <a:schemeClr val="bg1"/>
+                </a:solidFill>
                 <a:effectLst/>
                 <a:latin typeface="SutonnyMJ" pitchFamily="2" charset="0"/>
                 <a:ea typeface="Calibri" panose="020F0502020204030204" pitchFamily="34" charset="0"/>
@@ -9888,15 +10067,21 @@
             </a:r>
             <a:r>
               <a:rPr lang="en-US" sz="1800" dirty="0">
-                <a:effectLst/>
-                <a:latin typeface="SutonnyMJ" pitchFamily="2" charset="0"/>
-                <a:ea typeface="Calibri" panose="020F0502020204030204" pitchFamily="34" charset="0"/>
-                <a:cs typeface="Vrinda" panose="020B0502040204020203" pitchFamily="34" charset="0"/>
-              </a:rPr>
-              <a:t> </a:t>
-            </a:r>
-            <a:r>
-              <a:rPr lang="en-US" sz="1800" dirty="0" err="1">
+                <a:solidFill>
+                  <a:schemeClr val="bg1"/>
+                </a:solidFill>
+                <a:effectLst/>
+                <a:latin typeface="SutonnyMJ" pitchFamily="2" charset="0"/>
+                <a:ea typeface="Calibri" panose="020F0502020204030204" pitchFamily="34" charset="0"/>
+                <a:cs typeface="Vrinda" panose="020B0502040204020203" pitchFamily="34" charset="0"/>
+              </a:rPr>
+              <a:t> </a:t>
+            </a:r>
+            <a:r>
+              <a:rPr lang="en-US" sz="1800" dirty="0" err="1">
+                <a:solidFill>
+                  <a:schemeClr val="bg1"/>
+                </a:solidFill>
                 <a:effectLst/>
                 <a:latin typeface="SutonnyMJ" pitchFamily="2" charset="0"/>
                 <a:ea typeface="Calibri" panose="020F0502020204030204" pitchFamily="34" charset="0"/>
@@ -9906,6 +10091,9 @@
             </a:r>
             <a:r>
               <a:rPr lang="en-US" sz="1800" dirty="0">
+                <a:solidFill>
+                  <a:schemeClr val="bg1"/>
+                </a:solidFill>
                 <a:effectLst/>
                 <a:latin typeface="SutonnyMJ" pitchFamily="2" charset="0"/>
                 <a:ea typeface="Calibri" panose="020F0502020204030204" pitchFamily="34" charset="0"/>
@@ -9915,6 +10103,9 @@
             </a:r>
             <a:r>
               <a:rPr lang="en-US" sz="1800" dirty="0" err="1">
+                <a:solidFill>
+                  <a:schemeClr val="bg1"/>
+                </a:solidFill>
                 <a:effectLst/>
                 <a:latin typeface="SutonnyMJ" pitchFamily="2" charset="0"/>
                 <a:ea typeface="Calibri" panose="020F0502020204030204" pitchFamily="34" charset="0"/>
@@ -9924,15 +10115,21 @@
             </a:r>
             <a:r>
               <a:rPr lang="en-US" sz="1800" dirty="0">
-                <a:effectLst/>
-                <a:latin typeface="SutonnyMJ" pitchFamily="2" charset="0"/>
-                <a:ea typeface="Calibri" panose="020F0502020204030204" pitchFamily="34" charset="0"/>
-                <a:cs typeface="Vrinda" panose="020B0502040204020203" pitchFamily="34" charset="0"/>
-              </a:rPr>
-              <a:t> </a:t>
-            </a:r>
-            <a:r>
-              <a:rPr lang="en-US" sz="1800" dirty="0" err="1">
+                <a:solidFill>
+                  <a:schemeClr val="bg1"/>
+                </a:solidFill>
+                <a:effectLst/>
+                <a:latin typeface="SutonnyMJ" pitchFamily="2" charset="0"/>
+                <a:ea typeface="Calibri" panose="020F0502020204030204" pitchFamily="34" charset="0"/>
+                <a:cs typeface="Vrinda" panose="020B0502040204020203" pitchFamily="34" charset="0"/>
+              </a:rPr>
+              <a:t> </a:t>
+            </a:r>
+            <a:r>
+              <a:rPr lang="en-US" sz="1800" dirty="0" err="1">
+                <a:solidFill>
+                  <a:schemeClr val="bg1"/>
+                </a:solidFill>
                 <a:effectLst/>
                 <a:latin typeface="SutonnyOMJ" panose="01010600010101010101" pitchFamily="2" charset="0"/>
                 <a:ea typeface="Calibri" panose="020F0502020204030204" pitchFamily="34" charset="0"/>
@@ -9941,6 +10138,9 @@
               <a:t>সিস্টেম</a:t>
             </a:r>
             <a:endParaRPr lang="en-US" sz="1800" dirty="0">
+              <a:solidFill>
+                <a:schemeClr val="bg1"/>
+              </a:solidFill>
               <a:effectLst/>
               <a:latin typeface="Calibri" panose="020F0502020204030204" pitchFamily="34" charset="0"/>
               <a:ea typeface="Calibri" panose="020F0502020204030204" pitchFamily="34" charset="0"/>
@@ -9948,7 +10148,7 @@
             </a:endParaRPr>
           </a:p>
           <a:p>
-            <a:pPr marL="0" marR="0" algn="just">
+            <a:pPr marL="0" marR="0" indent="0" algn="just">
               <a:lnSpc>
                 <a:spcPct val="107000"/>
               </a:lnSpc>
@@ -9958,9 +10158,13 @@
               <a:spcAft>
                 <a:spcPts val="800"/>
               </a:spcAft>
+              <a:buNone/>
             </a:pPr>
             <a:r>
               <a:rPr lang="en-US" sz="1800" dirty="0">
+                <a:solidFill>
+                  <a:schemeClr val="bg1"/>
+                </a:solidFill>
                 <a:effectLst/>
                 <a:latin typeface="SutonnyMJ" pitchFamily="2" charset="0"/>
                 <a:ea typeface="Calibri" panose="020F0502020204030204" pitchFamily="34" charset="0"/>
@@ -9970,6 +10174,9 @@
             </a:r>
             <a:r>
               <a:rPr lang="en-US" sz="1800" dirty="0" err="1">
+                <a:solidFill>
+                  <a:schemeClr val="bg1"/>
+                </a:solidFill>
                 <a:effectLst/>
                 <a:latin typeface="SutonnyMJ" pitchFamily="2" charset="0"/>
                 <a:ea typeface="Calibri" panose="020F0502020204030204" pitchFamily="34" charset="0"/>
@@ -9979,15 +10186,21 @@
             </a:r>
             <a:r>
               <a:rPr lang="en-US" sz="1800" dirty="0">
-                <a:effectLst/>
-                <a:latin typeface="SutonnyMJ" pitchFamily="2" charset="0"/>
-                <a:ea typeface="Calibri" panose="020F0502020204030204" pitchFamily="34" charset="0"/>
-                <a:cs typeface="Vrinda" panose="020B0502040204020203" pitchFamily="34" charset="0"/>
-              </a:rPr>
-              <a:t> </a:t>
-            </a:r>
-            <a:r>
-              <a:rPr lang="en-US" sz="1800" dirty="0" err="1">
+                <a:solidFill>
+                  <a:schemeClr val="bg1"/>
+                </a:solidFill>
+                <a:effectLst/>
+                <a:latin typeface="SutonnyMJ" pitchFamily="2" charset="0"/>
+                <a:ea typeface="Calibri" panose="020F0502020204030204" pitchFamily="34" charset="0"/>
+                <a:cs typeface="Vrinda" panose="020B0502040204020203" pitchFamily="34" charset="0"/>
+              </a:rPr>
+              <a:t> </a:t>
+            </a:r>
+            <a:r>
+              <a:rPr lang="en-US" sz="1800" dirty="0" err="1">
+                <a:solidFill>
+                  <a:schemeClr val="bg1"/>
+                </a:solidFill>
                 <a:effectLst/>
                 <a:latin typeface="SutonnyMJ" pitchFamily="2" charset="0"/>
                 <a:ea typeface="Calibri" panose="020F0502020204030204" pitchFamily="34" charset="0"/>
@@ -9997,15 +10210,21 @@
             </a:r>
             <a:r>
               <a:rPr lang="en-US" sz="1800" dirty="0">
-                <a:effectLst/>
-                <a:latin typeface="SutonnyMJ" pitchFamily="2" charset="0"/>
-                <a:ea typeface="Calibri" panose="020F0502020204030204" pitchFamily="34" charset="0"/>
-                <a:cs typeface="Vrinda" panose="020B0502040204020203" pitchFamily="34" charset="0"/>
-              </a:rPr>
-              <a:t> </a:t>
-            </a:r>
-            <a:r>
-              <a:rPr lang="en-US" sz="1800" dirty="0" err="1">
+                <a:solidFill>
+                  <a:schemeClr val="bg1"/>
+                </a:solidFill>
+                <a:effectLst/>
+                <a:latin typeface="SutonnyMJ" pitchFamily="2" charset="0"/>
+                <a:ea typeface="Calibri" panose="020F0502020204030204" pitchFamily="34" charset="0"/>
+                <a:cs typeface="Vrinda" panose="020B0502040204020203" pitchFamily="34" charset="0"/>
+              </a:rPr>
+              <a:t> </a:t>
+            </a:r>
+            <a:r>
+              <a:rPr lang="en-US" sz="1800" dirty="0" err="1">
+                <a:solidFill>
+                  <a:schemeClr val="bg1"/>
+                </a:solidFill>
                 <a:effectLst/>
                 <a:latin typeface="SutonnyMJ" pitchFamily="2" charset="0"/>
                 <a:ea typeface="Calibri" panose="020F0502020204030204" pitchFamily="34" charset="0"/>
@@ -10015,15 +10234,21 @@
             </a:r>
             <a:r>
               <a:rPr lang="en-US" sz="1800" dirty="0">
-                <a:effectLst/>
-                <a:latin typeface="SutonnyMJ" pitchFamily="2" charset="0"/>
-                <a:ea typeface="Calibri" panose="020F0502020204030204" pitchFamily="34" charset="0"/>
-                <a:cs typeface="Vrinda" panose="020B0502040204020203" pitchFamily="34" charset="0"/>
-              </a:rPr>
-              <a:t> </a:t>
-            </a:r>
-            <a:r>
-              <a:rPr lang="en-US" sz="1800" dirty="0" err="1">
+                <a:solidFill>
+                  <a:schemeClr val="bg1"/>
+                </a:solidFill>
+                <a:effectLst/>
+                <a:latin typeface="SutonnyMJ" pitchFamily="2" charset="0"/>
+                <a:ea typeface="Calibri" panose="020F0502020204030204" pitchFamily="34" charset="0"/>
+                <a:cs typeface="Vrinda" panose="020B0502040204020203" pitchFamily="34" charset="0"/>
+              </a:rPr>
+              <a:t> </a:t>
+            </a:r>
+            <a:r>
+              <a:rPr lang="en-US" sz="1800" dirty="0" err="1">
+                <a:solidFill>
+                  <a:schemeClr val="bg1"/>
+                </a:solidFill>
                 <a:effectLst/>
                 <a:latin typeface="SutonnyMJ" pitchFamily="2" charset="0"/>
                 <a:ea typeface="Calibri" panose="020F0502020204030204" pitchFamily="34" charset="0"/>
@@ -10033,15 +10258,21 @@
             </a:r>
             <a:r>
               <a:rPr lang="en-US" sz="1800" dirty="0">
-                <a:effectLst/>
-                <a:latin typeface="SutonnyMJ" pitchFamily="2" charset="0"/>
-                <a:ea typeface="Calibri" panose="020F0502020204030204" pitchFamily="34" charset="0"/>
-                <a:cs typeface="Vrinda" panose="020B0502040204020203" pitchFamily="34" charset="0"/>
-              </a:rPr>
-              <a:t> </a:t>
-            </a:r>
-            <a:r>
-              <a:rPr lang="en-US" sz="1800" dirty="0" err="1">
+                <a:solidFill>
+                  <a:schemeClr val="bg1"/>
+                </a:solidFill>
+                <a:effectLst/>
+                <a:latin typeface="SutonnyMJ" pitchFamily="2" charset="0"/>
+                <a:ea typeface="Calibri" panose="020F0502020204030204" pitchFamily="34" charset="0"/>
+                <a:cs typeface="Vrinda" panose="020B0502040204020203" pitchFamily="34" charset="0"/>
+              </a:rPr>
+              <a:t> </a:t>
+            </a:r>
+            <a:r>
+              <a:rPr lang="en-US" sz="1800" dirty="0" err="1">
+                <a:solidFill>
+                  <a:schemeClr val="bg1"/>
+                </a:solidFill>
                 <a:effectLst/>
                 <a:latin typeface="SutonnyMJ" pitchFamily="2" charset="0"/>
                 <a:ea typeface="Calibri" panose="020F0502020204030204" pitchFamily="34" charset="0"/>
@@ -10050,6 +10281,9 @@
               <a:t>djvdj</a:t>
             </a:r>
             <a:endParaRPr lang="en-US" sz="1800" dirty="0">
+              <a:solidFill>
+                <a:schemeClr val="bg1"/>
+              </a:solidFill>
               <a:effectLst/>
               <a:latin typeface="Calibri" panose="020F0502020204030204" pitchFamily="34" charset="0"/>
               <a:ea typeface="Calibri" panose="020F0502020204030204" pitchFamily="34" charset="0"/>
@@ -10057,7 +10291,7 @@
             </a:endParaRPr>
           </a:p>
           <a:p>
-            <a:pPr marL="0" marR="0" algn="just">
+            <a:pPr marL="0" marR="0" indent="0" algn="just">
               <a:lnSpc>
                 <a:spcPct val="107000"/>
               </a:lnSpc>
@@ -10067,9 +10301,13 @@
               <a:spcAft>
                 <a:spcPts val="800"/>
               </a:spcAft>
+              <a:buNone/>
             </a:pPr>
             <a:r>
               <a:rPr lang="en-US" sz="1800" dirty="0">
+                <a:solidFill>
+                  <a:schemeClr val="bg1"/>
+                </a:solidFill>
                 <a:effectLst/>
                 <a:latin typeface="SutonnyMJ" pitchFamily="2" charset="0"/>
                 <a:ea typeface="Calibri" panose="020F0502020204030204" pitchFamily="34" charset="0"/>
@@ -10079,6 +10317,9 @@
             </a:r>
             <a:r>
               <a:rPr lang="en-US" sz="1800" dirty="0" err="1">
+                <a:solidFill>
+                  <a:schemeClr val="bg1"/>
+                </a:solidFill>
                 <a:effectLst/>
                 <a:latin typeface="SutonnyMJ" pitchFamily="2" charset="0"/>
                 <a:ea typeface="Calibri" panose="020F0502020204030204" pitchFamily="34" charset="0"/>
@@ -10088,15 +10329,21 @@
             </a:r>
             <a:r>
               <a:rPr lang="en-US" sz="1800" dirty="0">
-                <a:effectLst/>
-                <a:latin typeface="SutonnyMJ" pitchFamily="2" charset="0"/>
-                <a:ea typeface="Calibri" panose="020F0502020204030204" pitchFamily="34" charset="0"/>
-                <a:cs typeface="Vrinda" panose="020B0502040204020203" pitchFamily="34" charset="0"/>
-              </a:rPr>
-              <a:t> </a:t>
-            </a:r>
-            <a:r>
-              <a:rPr lang="en-US" sz="1800" dirty="0" err="1">
+                <a:solidFill>
+                  <a:schemeClr val="bg1"/>
+                </a:solidFill>
+                <a:effectLst/>
+                <a:latin typeface="SutonnyMJ" pitchFamily="2" charset="0"/>
+                <a:ea typeface="Calibri" panose="020F0502020204030204" pitchFamily="34" charset="0"/>
+                <a:cs typeface="Vrinda" panose="020B0502040204020203" pitchFamily="34" charset="0"/>
+              </a:rPr>
+              <a:t> </a:t>
+            </a:r>
+            <a:r>
+              <a:rPr lang="en-US" sz="1800" dirty="0" err="1">
+                <a:solidFill>
+                  <a:schemeClr val="bg1"/>
+                </a:solidFill>
                 <a:effectLst/>
                 <a:latin typeface="SutonnyMJ" pitchFamily="2" charset="0"/>
                 <a:ea typeface="Calibri" panose="020F0502020204030204" pitchFamily="34" charset="0"/>
@@ -10106,15 +10353,21 @@
             </a:r>
             <a:r>
               <a:rPr lang="en-US" sz="1800" dirty="0">
-                <a:effectLst/>
-                <a:latin typeface="SutonnyMJ" pitchFamily="2" charset="0"/>
-                <a:ea typeface="Calibri" panose="020F0502020204030204" pitchFamily="34" charset="0"/>
-                <a:cs typeface="Vrinda" panose="020B0502040204020203" pitchFamily="34" charset="0"/>
-              </a:rPr>
-              <a:t> </a:t>
-            </a:r>
-            <a:r>
-              <a:rPr lang="en-US" sz="1800" dirty="0" err="1">
+                <a:solidFill>
+                  <a:schemeClr val="bg1"/>
+                </a:solidFill>
+                <a:effectLst/>
+                <a:latin typeface="SutonnyMJ" pitchFamily="2" charset="0"/>
+                <a:ea typeface="Calibri" panose="020F0502020204030204" pitchFamily="34" charset="0"/>
+                <a:cs typeface="Vrinda" panose="020B0502040204020203" pitchFamily="34" charset="0"/>
+              </a:rPr>
+              <a:t> </a:t>
+            </a:r>
+            <a:r>
+              <a:rPr lang="en-US" sz="1800" dirty="0" err="1">
+                <a:solidFill>
+                  <a:schemeClr val="bg1"/>
+                </a:solidFill>
                 <a:effectLst/>
                 <a:latin typeface="SutonnyOMJ" panose="01010600010101010101" pitchFamily="2" charset="0"/>
                 <a:ea typeface="Calibri" panose="020F0502020204030204" pitchFamily="34" charset="0"/>
@@ -10124,15 +10377,21 @@
             </a:r>
             <a:r>
               <a:rPr lang="en-US" sz="1800" dirty="0">
-                <a:effectLst/>
-                <a:latin typeface="SutonnyMJ" pitchFamily="2" charset="0"/>
-                <a:ea typeface="Calibri" panose="020F0502020204030204" pitchFamily="34" charset="0"/>
-                <a:cs typeface="Vrinda" panose="020B0502040204020203" pitchFamily="34" charset="0"/>
-              </a:rPr>
-              <a:t> </a:t>
-            </a:r>
-            <a:r>
-              <a:rPr lang="en-US" sz="1800" dirty="0" err="1">
+                <a:solidFill>
+                  <a:schemeClr val="bg1"/>
+                </a:solidFill>
+                <a:effectLst/>
+                <a:latin typeface="SutonnyMJ" pitchFamily="2" charset="0"/>
+                <a:ea typeface="Calibri" panose="020F0502020204030204" pitchFamily="34" charset="0"/>
+                <a:cs typeface="Vrinda" panose="020B0502040204020203" pitchFamily="34" charset="0"/>
+              </a:rPr>
+              <a:t> </a:t>
+            </a:r>
+            <a:r>
+              <a:rPr lang="en-US" sz="1800" dirty="0" err="1">
+                <a:solidFill>
+                  <a:schemeClr val="bg1"/>
+                </a:solidFill>
                 <a:effectLst/>
                 <a:latin typeface="SutonnyMJ" pitchFamily="2" charset="0"/>
                 <a:ea typeface="Calibri" panose="020F0502020204030204" pitchFamily="34" charset="0"/>
@@ -10142,15 +10401,21 @@
             </a:r>
             <a:r>
               <a:rPr lang="en-US" sz="1800" dirty="0">
-                <a:effectLst/>
-                <a:latin typeface="SutonnyMJ" pitchFamily="2" charset="0"/>
-                <a:ea typeface="Calibri" panose="020F0502020204030204" pitchFamily="34" charset="0"/>
-                <a:cs typeface="Vrinda" panose="020B0502040204020203" pitchFamily="34" charset="0"/>
-              </a:rPr>
-              <a:t> </a:t>
-            </a:r>
-            <a:r>
-              <a:rPr lang="en-US" sz="1800" dirty="0" err="1">
+                <a:solidFill>
+                  <a:schemeClr val="bg1"/>
+                </a:solidFill>
+                <a:effectLst/>
+                <a:latin typeface="SutonnyMJ" pitchFamily="2" charset="0"/>
+                <a:ea typeface="Calibri" panose="020F0502020204030204" pitchFamily="34" charset="0"/>
+                <a:cs typeface="Vrinda" panose="020B0502040204020203" pitchFamily="34" charset="0"/>
+              </a:rPr>
+              <a:t> </a:t>
+            </a:r>
+            <a:r>
+              <a:rPr lang="en-US" sz="1800" dirty="0" err="1">
+                <a:solidFill>
+                  <a:schemeClr val="bg1"/>
+                </a:solidFill>
                 <a:effectLst/>
                 <a:latin typeface="SutonnyMJ" pitchFamily="2" charset="0"/>
                 <a:ea typeface="Calibri" panose="020F0502020204030204" pitchFamily="34" charset="0"/>
@@ -10160,15 +10425,21 @@
             </a:r>
             <a:r>
               <a:rPr lang="en-US" sz="1800" dirty="0">
-                <a:effectLst/>
-                <a:latin typeface="SutonnyMJ" pitchFamily="2" charset="0"/>
-                <a:ea typeface="Calibri" panose="020F0502020204030204" pitchFamily="34" charset="0"/>
-                <a:cs typeface="Vrinda" panose="020B0502040204020203" pitchFamily="34" charset="0"/>
-              </a:rPr>
-              <a:t> </a:t>
-            </a:r>
-            <a:r>
-              <a:rPr lang="en-US" sz="1800" dirty="0" err="1">
+                <a:solidFill>
+                  <a:schemeClr val="bg1"/>
+                </a:solidFill>
+                <a:effectLst/>
+                <a:latin typeface="SutonnyMJ" pitchFamily="2" charset="0"/>
+                <a:ea typeface="Calibri" panose="020F0502020204030204" pitchFamily="34" charset="0"/>
+                <a:cs typeface="Vrinda" panose="020B0502040204020203" pitchFamily="34" charset="0"/>
+              </a:rPr>
+              <a:t> </a:t>
+            </a:r>
+            <a:r>
+              <a:rPr lang="en-US" sz="1800" dirty="0" err="1">
+                <a:solidFill>
+                  <a:schemeClr val="bg1"/>
+                </a:solidFill>
                 <a:effectLst/>
                 <a:latin typeface="SutonnyMJ" pitchFamily="2" charset="0"/>
                 <a:ea typeface="Calibri" panose="020F0502020204030204" pitchFamily="34" charset="0"/>
@@ -10178,15 +10449,21 @@
             </a:r>
             <a:r>
               <a:rPr lang="en-US" sz="1800" dirty="0">
-                <a:effectLst/>
-                <a:latin typeface="SutonnyMJ" pitchFamily="2" charset="0"/>
-                <a:ea typeface="Calibri" panose="020F0502020204030204" pitchFamily="34" charset="0"/>
-                <a:cs typeface="Vrinda" panose="020B0502040204020203" pitchFamily="34" charset="0"/>
-              </a:rPr>
-              <a:t> </a:t>
-            </a:r>
-            <a:r>
-              <a:rPr lang="en-US" sz="1800" dirty="0" err="1">
+                <a:solidFill>
+                  <a:schemeClr val="bg1"/>
+                </a:solidFill>
+                <a:effectLst/>
+                <a:latin typeface="SutonnyMJ" pitchFamily="2" charset="0"/>
+                <a:ea typeface="Calibri" panose="020F0502020204030204" pitchFamily="34" charset="0"/>
+                <a:cs typeface="Vrinda" panose="020B0502040204020203" pitchFamily="34" charset="0"/>
+              </a:rPr>
+              <a:t> </a:t>
+            </a:r>
+            <a:r>
+              <a:rPr lang="en-US" sz="1800" dirty="0" err="1">
+                <a:solidFill>
+                  <a:schemeClr val="bg1"/>
+                </a:solidFill>
                 <a:effectLst/>
                 <a:latin typeface="SutonnyOMJ" panose="01010600010101010101" pitchFamily="2" charset="0"/>
                 <a:ea typeface="Calibri" panose="020F0502020204030204" pitchFamily="34" charset="0"/>
@@ -10196,15 +10473,21 @@
             </a:r>
             <a:r>
               <a:rPr lang="en-US" sz="1800" dirty="0">
-                <a:effectLst/>
-                <a:latin typeface="SutonnyMJ" pitchFamily="2" charset="0"/>
-                <a:ea typeface="Calibri" panose="020F0502020204030204" pitchFamily="34" charset="0"/>
-                <a:cs typeface="Vrinda" panose="020B0502040204020203" pitchFamily="34" charset="0"/>
-              </a:rPr>
-              <a:t> </a:t>
-            </a:r>
-            <a:r>
-              <a:rPr lang="en-US" sz="1800" dirty="0" err="1">
+                <a:solidFill>
+                  <a:schemeClr val="bg1"/>
+                </a:solidFill>
+                <a:effectLst/>
+                <a:latin typeface="SutonnyMJ" pitchFamily="2" charset="0"/>
+                <a:ea typeface="Calibri" panose="020F0502020204030204" pitchFamily="34" charset="0"/>
+                <a:cs typeface="Vrinda" panose="020B0502040204020203" pitchFamily="34" charset="0"/>
+              </a:rPr>
+              <a:t> </a:t>
+            </a:r>
+            <a:r>
+              <a:rPr lang="en-US" sz="1800" dirty="0" err="1">
+                <a:solidFill>
+                  <a:schemeClr val="bg1"/>
+                </a:solidFill>
                 <a:effectLst/>
                 <a:latin typeface="SutonnyMJ" pitchFamily="2" charset="0"/>
                 <a:ea typeface="Calibri" panose="020F0502020204030204" pitchFamily="34" charset="0"/>
@@ -10214,6 +10497,9 @@
             </a:r>
             <a:r>
               <a:rPr lang="en-US" sz="1800" dirty="0">
+                <a:solidFill>
+                  <a:schemeClr val="bg1"/>
+                </a:solidFill>
                 <a:effectLst/>
                 <a:latin typeface="SutonnyMJ" pitchFamily="2" charset="0"/>
                 <a:ea typeface="Calibri" panose="020F0502020204030204" pitchFamily="34" charset="0"/>
@@ -10223,6 +10509,9 @@
             </a:r>
             <a:r>
               <a:rPr lang="en-US" sz="1800" dirty="0" err="1">
+                <a:solidFill>
+                  <a:schemeClr val="bg1"/>
+                </a:solidFill>
                 <a:effectLst/>
                 <a:latin typeface="SutonnyMJ" pitchFamily="2" charset="0"/>
                 <a:ea typeface="Calibri" panose="020F0502020204030204" pitchFamily="34" charset="0"/>
@@ -10232,6 +10521,9 @@
             </a:r>
             <a:r>
               <a:rPr lang="en-US" sz="1800" dirty="0">
+                <a:solidFill>
+                  <a:schemeClr val="bg1"/>
+                </a:solidFill>
                 <a:effectLst/>
                 <a:latin typeface="SutonnyMJ" pitchFamily="2" charset="0"/>
                 <a:ea typeface="Calibri" panose="020F0502020204030204" pitchFamily="34" charset="0"/>
@@ -10241,6 +10533,9 @@
             </a:r>
             <a:r>
               <a:rPr lang="en-US" sz="1800" dirty="0" err="1">
+                <a:solidFill>
+                  <a:schemeClr val="bg1"/>
+                </a:solidFill>
                 <a:effectLst/>
                 <a:latin typeface="SutonnyMJ" pitchFamily="2" charset="0"/>
                 <a:ea typeface="Calibri" panose="020F0502020204030204" pitchFamily="34" charset="0"/>
@@ -10250,6 +10545,9 @@
             </a:r>
             <a:r>
               <a:rPr lang="en-US" sz="1800" dirty="0">
+                <a:solidFill>
+                  <a:schemeClr val="bg1"/>
+                </a:solidFill>
                 <a:effectLst/>
                 <a:latin typeface="SutonnyMJ" pitchFamily="2" charset="0"/>
                 <a:ea typeface="Calibri" panose="020F0502020204030204" pitchFamily="34" charset="0"/>
@@ -10259,6 +10557,9 @@
             </a:r>
             <a:r>
               <a:rPr lang="en-US" sz="1800" dirty="0" err="1">
+                <a:solidFill>
+                  <a:schemeClr val="bg1"/>
+                </a:solidFill>
                 <a:effectLst/>
                 <a:latin typeface="SutonnyMJ" pitchFamily="2" charset="0"/>
                 <a:ea typeface="Calibri" panose="020F0502020204030204" pitchFamily="34" charset="0"/>
@@ -10267,6 +10568,9 @@
               <a:t>hvMv‡hvM</a:t>
             </a:r>
             <a:endParaRPr lang="en-US" sz="1800" dirty="0">
+              <a:solidFill>
+                <a:schemeClr val="bg1"/>
+              </a:solidFill>
               <a:effectLst/>
               <a:latin typeface="Calibri" panose="020F0502020204030204" pitchFamily="34" charset="0"/>
               <a:ea typeface="Calibri" panose="020F0502020204030204" pitchFamily="34" charset="0"/>
@@ -10274,7 +10578,7 @@
             </a:endParaRPr>
           </a:p>
           <a:p>
-            <a:pPr marL="0" marR="0" algn="just">
+            <a:pPr marL="0" marR="0" indent="0" algn="just">
               <a:lnSpc>
                 <a:spcPct val="107000"/>
               </a:lnSpc>
@@ -10284,9 +10588,13 @@
               <a:spcAft>
                 <a:spcPts val="800"/>
               </a:spcAft>
+              <a:buNone/>
             </a:pPr>
             <a:r>
               <a:rPr lang="en-US" sz="1800" dirty="0">
+                <a:solidFill>
+                  <a:schemeClr val="bg1"/>
+                </a:solidFill>
                 <a:effectLst/>
                 <a:latin typeface="SutonnyMJ" pitchFamily="2" charset="0"/>
                 <a:ea typeface="Calibri" panose="020F0502020204030204" pitchFamily="34" charset="0"/>
@@ -10296,6 +10604,9 @@
             </a:r>
             <a:r>
               <a:rPr lang="en-US" sz="1800" dirty="0" err="1">
+                <a:solidFill>
+                  <a:schemeClr val="bg1"/>
+                </a:solidFill>
                 <a:effectLst/>
                 <a:latin typeface="SutonnyMJ" pitchFamily="2" charset="0"/>
                 <a:ea typeface="Calibri" panose="020F0502020204030204" pitchFamily="34" charset="0"/>
@@ -10305,15 +10616,21 @@
             </a:r>
             <a:r>
               <a:rPr lang="en-US" sz="1800" dirty="0">
-                <a:effectLst/>
-                <a:latin typeface="SutonnyMJ" pitchFamily="2" charset="0"/>
-                <a:ea typeface="Calibri" panose="020F0502020204030204" pitchFamily="34" charset="0"/>
-                <a:cs typeface="Vrinda" panose="020B0502040204020203" pitchFamily="34" charset="0"/>
-              </a:rPr>
-              <a:t> </a:t>
-            </a:r>
-            <a:r>
-              <a:rPr lang="en-US" sz="1800" dirty="0" err="1">
+                <a:solidFill>
+                  <a:schemeClr val="bg1"/>
+                </a:solidFill>
+                <a:effectLst/>
+                <a:latin typeface="SutonnyMJ" pitchFamily="2" charset="0"/>
+                <a:ea typeface="Calibri" panose="020F0502020204030204" pitchFamily="34" charset="0"/>
+                <a:cs typeface="Vrinda" panose="020B0502040204020203" pitchFamily="34" charset="0"/>
+              </a:rPr>
+              <a:t> </a:t>
+            </a:r>
+            <a:r>
+              <a:rPr lang="en-US" sz="1800" dirty="0" err="1">
+                <a:solidFill>
+                  <a:schemeClr val="bg1"/>
+                </a:solidFill>
                 <a:effectLst/>
                 <a:latin typeface="SutonnyMJ" pitchFamily="2" charset="0"/>
                 <a:ea typeface="Calibri" panose="020F0502020204030204" pitchFamily="34" charset="0"/>
@@ -10323,15 +10640,21 @@
             </a:r>
             <a:r>
               <a:rPr lang="en-US" sz="1800" dirty="0">
-                <a:effectLst/>
-                <a:latin typeface="SutonnyMJ" pitchFamily="2" charset="0"/>
-                <a:ea typeface="Calibri" panose="020F0502020204030204" pitchFamily="34" charset="0"/>
-                <a:cs typeface="Vrinda" panose="020B0502040204020203" pitchFamily="34" charset="0"/>
-              </a:rPr>
-              <a:t> </a:t>
-            </a:r>
-            <a:r>
-              <a:rPr lang="en-US" sz="1800" dirty="0" err="1">
+                <a:solidFill>
+                  <a:schemeClr val="bg1"/>
+                </a:solidFill>
+                <a:effectLst/>
+                <a:latin typeface="SutonnyMJ" pitchFamily="2" charset="0"/>
+                <a:ea typeface="Calibri" panose="020F0502020204030204" pitchFamily="34" charset="0"/>
+                <a:cs typeface="Vrinda" panose="020B0502040204020203" pitchFamily="34" charset="0"/>
+              </a:rPr>
+              <a:t> </a:t>
+            </a:r>
+            <a:r>
+              <a:rPr lang="en-US" sz="1800" dirty="0" err="1">
+                <a:solidFill>
+                  <a:schemeClr val="bg1"/>
+                </a:solidFill>
                 <a:effectLst/>
                 <a:latin typeface="SutonnyMJ" pitchFamily="2" charset="0"/>
                 <a:ea typeface="Calibri" panose="020F0502020204030204" pitchFamily="34" charset="0"/>
@@ -10341,15 +10664,21 @@
             </a:r>
             <a:r>
               <a:rPr lang="en-US" sz="1800" dirty="0">
-                <a:effectLst/>
-                <a:latin typeface="SutonnyMJ" pitchFamily="2" charset="0"/>
-                <a:ea typeface="Calibri" panose="020F0502020204030204" pitchFamily="34" charset="0"/>
-                <a:cs typeface="Vrinda" panose="020B0502040204020203" pitchFamily="34" charset="0"/>
-              </a:rPr>
-              <a:t> </a:t>
-            </a:r>
-            <a:r>
-              <a:rPr lang="en-US" sz="1800" dirty="0" err="1">
+                <a:solidFill>
+                  <a:schemeClr val="bg1"/>
+                </a:solidFill>
+                <a:effectLst/>
+                <a:latin typeface="SutonnyMJ" pitchFamily="2" charset="0"/>
+                <a:ea typeface="Calibri" panose="020F0502020204030204" pitchFamily="34" charset="0"/>
+                <a:cs typeface="Vrinda" panose="020B0502040204020203" pitchFamily="34" charset="0"/>
+              </a:rPr>
+              <a:t> </a:t>
+            </a:r>
+            <a:r>
+              <a:rPr lang="en-US" sz="1800" dirty="0" err="1">
+                <a:solidFill>
+                  <a:schemeClr val="bg1"/>
+                </a:solidFill>
                 <a:effectLst/>
                 <a:latin typeface="SutonnyMJ" pitchFamily="2" charset="0"/>
                 <a:ea typeface="Calibri" panose="020F0502020204030204" pitchFamily="34" charset="0"/>
@@ -10359,6 +10688,9 @@
             </a:r>
             <a:r>
               <a:rPr lang="en-US" sz="1800" dirty="0">
+                <a:solidFill>
+                  <a:schemeClr val="bg1"/>
+                </a:solidFill>
                 <a:effectLst/>
                 <a:latin typeface="SutonnyMJ" pitchFamily="2" charset="0"/>
                 <a:ea typeface="Calibri" panose="020F0502020204030204" pitchFamily="34" charset="0"/>
@@ -10367,6 +10699,9 @@
               <a:t> SzuwKgy³</a:t>
             </a:r>
             <a:endParaRPr lang="en-US" sz="1800" dirty="0">
+              <a:solidFill>
+                <a:schemeClr val="bg1"/>
+              </a:solidFill>
               <a:effectLst/>
               <a:latin typeface="Calibri" panose="020F0502020204030204" pitchFamily="34" charset="0"/>
               <a:ea typeface="Calibri" panose="020F0502020204030204" pitchFamily="34" charset="0"/>
@@ -10374,7 +10709,7 @@
             </a:endParaRPr>
           </a:p>
           <a:p>
-            <a:pPr marL="0" marR="0" algn="just">
+            <a:pPr marL="0" marR="0" indent="0" algn="just">
               <a:lnSpc>
                 <a:spcPct val="107000"/>
               </a:lnSpc>
@@ -10384,9 +10719,13 @@
               <a:spcAft>
                 <a:spcPts val="800"/>
               </a:spcAft>
+              <a:buNone/>
             </a:pPr>
             <a:r>
               <a:rPr lang="en-US" sz="1800" dirty="0">
+                <a:solidFill>
+                  <a:schemeClr val="bg1"/>
+                </a:solidFill>
                 <a:effectLst/>
                 <a:latin typeface="SutonnyMJ" pitchFamily="2" charset="0"/>
                 <a:ea typeface="Calibri" panose="020F0502020204030204" pitchFamily="34" charset="0"/>
@@ -10396,6 +10735,9 @@
             </a:r>
             <a:r>
               <a:rPr lang="en-US" sz="1800" dirty="0" err="1">
+                <a:solidFill>
+                  <a:schemeClr val="bg1"/>
+                </a:solidFill>
                 <a:effectLst/>
                 <a:latin typeface="SutonnyOMJ" panose="01010600010101010101" pitchFamily="2" charset="0"/>
                 <a:ea typeface="Calibri" panose="020F0502020204030204" pitchFamily="34" charset="0"/>
@@ -10405,6 +10747,9 @@
             </a:r>
             <a:r>
               <a:rPr lang="en-US" sz="1800" dirty="0">
+                <a:solidFill>
+                  <a:schemeClr val="bg1"/>
+                </a:solidFill>
                 <a:effectLst/>
                 <a:latin typeface="SutonnyOMJ" panose="01010600010101010101" pitchFamily="2" charset="0"/>
                 <a:ea typeface="Calibri" panose="020F0502020204030204" pitchFamily="34" charset="0"/>
@@ -10414,6 +10759,9 @@
             </a:r>
             <a:r>
               <a:rPr lang="en-US" sz="1800" dirty="0">
+                <a:solidFill>
+                  <a:schemeClr val="bg1"/>
+                </a:solidFill>
                 <a:effectLst/>
                 <a:latin typeface="SutonnyMJ" pitchFamily="2" charset="0"/>
                 <a:ea typeface="Calibri" panose="020F0502020204030204" pitchFamily="34" charset="0"/>
@@ -10423,6 +10771,9 @@
             </a:r>
             <a:r>
               <a:rPr lang="en-US" sz="1800" dirty="0" err="1">
+                <a:solidFill>
+                  <a:schemeClr val="bg1"/>
+                </a:solidFill>
                 <a:effectLst/>
                 <a:latin typeface="SutonnyMJ" pitchFamily="2" charset="0"/>
                 <a:ea typeface="Calibri" panose="020F0502020204030204" pitchFamily="34" charset="0"/>
@@ -10432,6 +10783,9 @@
             </a:r>
             <a:r>
               <a:rPr lang="en-US" sz="1800" dirty="0">
+                <a:solidFill>
+                  <a:schemeClr val="bg1"/>
+                </a:solidFill>
                 <a:effectLst/>
                 <a:latin typeface="SutonnyMJ" pitchFamily="2" charset="0"/>
                 <a:ea typeface="Calibri" panose="020F0502020204030204" pitchFamily="34" charset="0"/>
@@ -10441,6 +10795,9 @@
             </a:r>
             <a:r>
               <a:rPr lang="en-US" sz="1800" dirty="0" err="1">
+                <a:solidFill>
+                  <a:schemeClr val="bg1"/>
+                </a:solidFill>
                 <a:effectLst/>
                 <a:latin typeface="SutonnyMJ" pitchFamily="2" charset="0"/>
                 <a:ea typeface="Calibri" panose="020F0502020204030204" pitchFamily="34" charset="0"/>
@@ -10450,15 +10807,21 @@
             </a:r>
             <a:r>
               <a:rPr lang="en-US" sz="1800" dirty="0">
-                <a:effectLst/>
-                <a:latin typeface="SutonnyMJ" pitchFamily="2" charset="0"/>
-                <a:ea typeface="Calibri" panose="020F0502020204030204" pitchFamily="34" charset="0"/>
-                <a:cs typeface="Vrinda" panose="020B0502040204020203" pitchFamily="34" charset="0"/>
-              </a:rPr>
-              <a:t> </a:t>
-            </a:r>
-            <a:r>
-              <a:rPr lang="en-US" sz="1800" dirty="0" err="1">
+                <a:solidFill>
+                  <a:schemeClr val="bg1"/>
+                </a:solidFill>
+                <a:effectLst/>
+                <a:latin typeface="SutonnyMJ" pitchFamily="2" charset="0"/>
+                <a:ea typeface="Calibri" panose="020F0502020204030204" pitchFamily="34" charset="0"/>
+                <a:cs typeface="Vrinda" panose="020B0502040204020203" pitchFamily="34" charset="0"/>
+              </a:rPr>
+              <a:t> </a:t>
+            </a:r>
+            <a:r>
+              <a:rPr lang="en-US" sz="1800" dirty="0" err="1">
+                <a:solidFill>
+                  <a:schemeClr val="bg1"/>
+                </a:solidFill>
                 <a:effectLst/>
                 <a:latin typeface="SutonnyMJ" pitchFamily="2" charset="0"/>
                 <a:ea typeface="Calibri" panose="020F0502020204030204" pitchFamily="34" charset="0"/>
@@ -10468,15 +10831,21 @@
             </a:r>
             <a:r>
               <a:rPr lang="en-US" sz="1800" dirty="0">
-                <a:effectLst/>
-                <a:latin typeface="SutonnyMJ" pitchFamily="2" charset="0"/>
-                <a:ea typeface="Calibri" panose="020F0502020204030204" pitchFamily="34" charset="0"/>
-                <a:cs typeface="Vrinda" panose="020B0502040204020203" pitchFamily="34" charset="0"/>
-              </a:rPr>
-              <a:t> </a:t>
-            </a:r>
-            <a:r>
-              <a:rPr lang="en-US" sz="1800" dirty="0" err="1">
+                <a:solidFill>
+                  <a:schemeClr val="bg1"/>
+                </a:solidFill>
+                <a:effectLst/>
+                <a:latin typeface="SutonnyMJ" pitchFamily="2" charset="0"/>
+                <a:ea typeface="Calibri" panose="020F0502020204030204" pitchFamily="34" charset="0"/>
+                <a:cs typeface="Vrinda" panose="020B0502040204020203" pitchFamily="34" charset="0"/>
+              </a:rPr>
+              <a:t> </a:t>
+            </a:r>
+            <a:r>
+              <a:rPr lang="en-US" sz="1800" dirty="0" err="1">
+                <a:solidFill>
+                  <a:schemeClr val="bg1"/>
+                </a:solidFill>
                 <a:effectLst/>
                 <a:latin typeface="SutonnyMJ" pitchFamily="2" charset="0"/>
                 <a:ea typeface="Calibri" panose="020F0502020204030204" pitchFamily="34" charset="0"/>
@@ -10486,6 +10855,9 @@
             </a:r>
             <a:r>
               <a:rPr lang="en-US" sz="1800" dirty="0">
+                <a:solidFill>
+                  <a:schemeClr val="bg1"/>
+                </a:solidFill>
                 <a:effectLst/>
                 <a:latin typeface="SutonnyMJ" pitchFamily="2" charset="0"/>
                 <a:ea typeface="Calibri" panose="020F0502020204030204" pitchFamily="34" charset="0"/>
@@ -10494,6 +10866,9 @@
               <a:t>©</a:t>
             </a:r>
             <a:endParaRPr lang="en-US" sz="1800" dirty="0">
+              <a:solidFill>
+                <a:schemeClr val="bg1"/>
+              </a:solidFill>
               <a:effectLst/>
               <a:latin typeface="Calibri" panose="020F0502020204030204" pitchFamily="34" charset="0"/>
               <a:ea typeface="Calibri" panose="020F0502020204030204" pitchFamily="34" charset="0"/>
@@ -10501,7 +10876,7 @@
             </a:endParaRPr>
           </a:p>
           <a:p>
-            <a:pPr marL="0" marR="0" algn="just">
+            <a:pPr marL="0" marR="0" indent="0" algn="just">
               <a:lnSpc>
                 <a:spcPct val="107000"/>
               </a:lnSpc>
@@ -10511,9 +10886,13 @@
               <a:spcAft>
                 <a:spcPts val="800"/>
               </a:spcAft>
+              <a:buNone/>
             </a:pPr>
             <a:r>
               <a:rPr lang="en-US" sz="1800" dirty="0">
+                <a:solidFill>
+                  <a:schemeClr val="bg1"/>
+                </a:solidFill>
                 <a:effectLst/>
                 <a:latin typeface="SutonnyMJ" pitchFamily="2" charset="0"/>
                 <a:ea typeface="Calibri" panose="020F0502020204030204" pitchFamily="34" charset="0"/>
@@ -10523,6 +10902,9 @@
             </a:r>
             <a:r>
               <a:rPr lang="en-US" sz="1800" dirty="0" err="1">
+                <a:solidFill>
+                  <a:schemeClr val="bg1"/>
+                </a:solidFill>
                 <a:effectLst/>
                 <a:latin typeface="SutonnyMJ" pitchFamily="2" charset="0"/>
                 <a:ea typeface="Calibri" panose="020F0502020204030204" pitchFamily="34" charset="0"/>
@@ -10532,15 +10914,21 @@
             </a:r>
             <a:r>
               <a:rPr lang="en-US" sz="1800" dirty="0">
-                <a:effectLst/>
-                <a:latin typeface="SutonnyMJ" pitchFamily="2" charset="0"/>
-                <a:ea typeface="Calibri" panose="020F0502020204030204" pitchFamily="34" charset="0"/>
-                <a:cs typeface="Vrinda" panose="020B0502040204020203" pitchFamily="34" charset="0"/>
-              </a:rPr>
-              <a:t> </a:t>
-            </a:r>
-            <a:r>
-              <a:rPr lang="en-US" sz="1800" dirty="0" err="1">
+                <a:solidFill>
+                  <a:schemeClr val="bg1"/>
+                </a:solidFill>
+                <a:effectLst/>
+                <a:latin typeface="SutonnyMJ" pitchFamily="2" charset="0"/>
+                <a:ea typeface="Calibri" panose="020F0502020204030204" pitchFamily="34" charset="0"/>
+                <a:cs typeface="Vrinda" panose="020B0502040204020203" pitchFamily="34" charset="0"/>
+              </a:rPr>
+              <a:t> </a:t>
+            </a:r>
+            <a:r>
+              <a:rPr lang="en-US" sz="1800" dirty="0" err="1">
+                <a:solidFill>
+                  <a:schemeClr val="bg1"/>
+                </a:solidFill>
                 <a:effectLst/>
                 <a:latin typeface="SutonnyMJ" pitchFamily="2" charset="0"/>
                 <a:ea typeface="Calibri" panose="020F0502020204030204" pitchFamily="34" charset="0"/>
@@ -10550,15 +10938,21 @@
             </a:r>
             <a:r>
               <a:rPr lang="en-US" sz="1800" dirty="0">
-                <a:effectLst/>
-                <a:latin typeface="SutonnyMJ" pitchFamily="2" charset="0"/>
-                <a:ea typeface="Calibri" panose="020F0502020204030204" pitchFamily="34" charset="0"/>
-                <a:cs typeface="Vrinda" panose="020B0502040204020203" pitchFamily="34" charset="0"/>
-              </a:rPr>
-              <a:t> </a:t>
-            </a:r>
-            <a:r>
-              <a:rPr lang="en-US" sz="1800" dirty="0" err="1">
+                <a:solidFill>
+                  <a:schemeClr val="bg1"/>
+                </a:solidFill>
+                <a:effectLst/>
+                <a:latin typeface="SutonnyMJ" pitchFamily="2" charset="0"/>
+                <a:ea typeface="Calibri" panose="020F0502020204030204" pitchFamily="34" charset="0"/>
+                <a:cs typeface="Vrinda" panose="020B0502040204020203" pitchFamily="34" charset="0"/>
+              </a:rPr>
+              <a:t> </a:t>
+            </a:r>
+            <a:r>
+              <a:rPr lang="en-US" sz="1800" dirty="0" err="1">
+                <a:solidFill>
+                  <a:schemeClr val="bg1"/>
+                </a:solidFill>
                 <a:effectLst/>
                 <a:latin typeface="SutonnyMJ" pitchFamily="2" charset="0"/>
                 <a:ea typeface="Calibri" panose="020F0502020204030204" pitchFamily="34" charset="0"/>
@@ -10568,6 +10962,9 @@
             </a:r>
             <a:r>
               <a:rPr lang="en-US" sz="1800" dirty="0">
+                <a:solidFill>
+                  <a:schemeClr val="bg1"/>
+                </a:solidFill>
                 <a:effectLst/>
                 <a:latin typeface="SutonnyMJ" pitchFamily="2" charset="0"/>
                 <a:ea typeface="Calibri" panose="020F0502020204030204" pitchFamily="34" charset="0"/>
@@ -10577,6 +10974,9 @@
             </a:r>
             <a:r>
               <a:rPr lang="en-US" sz="1800" dirty="0" err="1">
+                <a:solidFill>
+                  <a:schemeClr val="bg1"/>
+                </a:solidFill>
                 <a:effectLst/>
                 <a:latin typeface="SutonnyMJ" pitchFamily="2" charset="0"/>
                 <a:ea typeface="Calibri" panose="020F0502020204030204" pitchFamily="34" charset="0"/>
@@ -10586,15 +10986,21 @@
             </a:r>
             <a:r>
               <a:rPr lang="en-US" sz="1800" dirty="0">
-                <a:effectLst/>
-                <a:latin typeface="SutonnyMJ" pitchFamily="2" charset="0"/>
-                <a:ea typeface="Calibri" panose="020F0502020204030204" pitchFamily="34" charset="0"/>
-                <a:cs typeface="Vrinda" panose="020B0502040204020203" pitchFamily="34" charset="0"/>
-              </a:rPr>
-              <a:t> </a:t>
-            </a:r>
-            <a:r>
-              <a:rPr lang="en-US" sz="1800" dirty="0" err="1">
+                <a:solidFill>
+                  <a:schemeClr val="bg1"/>
+                </a:solidFill>
+                <a:effectLst/>
+                <a:latin typeface="SutonnyMJ" pitchFamily="2" charset="0"/>
+                <a:ea typeface="Calibri" panose="020F0502020204030204" pitchFamily="34" charset="0"/>
+                <a:cs typeface="Vrinda" panose="020B0502040204020203" pitchFamily="34" charset="0"/>
+              </a:rPr>
+              <a:t> </a:t>
+            </a:r>
+            <a:r>
+              <a:rPr lang="en-US" sz="1800" dirty="0" err="1">
+                <a:solidFill>
+                  <a:schemeClr val="bg1"/>
+                </a:solidFill>
                 <a:effectLst/>
                 <a:latin typeface="SutonnyMJ" pitchFamily="2" charset="0"/>
                 <a:ea typeface="Calibri" panose="020F0502020204030204" pitchFamily="34" charset="0"/>
@@ -10604,15 +11010,21 @@
             </a:r>
             <a:r>
               <a:rPr lang="en-US" sz="1800" dirty="0">
-                <a:effectLst/>
-                <a:latin typeface="SutonnyMJ" pitchFamily="2" charset="0"/>
-                <a:ea typeface="Calibri" panose="020F0502020204030204" pitchFamily="34" charset="0"/>
-                <a:cs typeface="Vrinda" panose="020B0502040204020203" pitchFamily="34" charset="0"/>
-              </a:rPr>
-              <a:t> </a:t>
-            </a:r>
-            <a:r>
-              <a:rPr lang="en-US" sz="1800" dirty="0" err="1">
+                <a:solidFill>
+                  <a:schemeClr val="bg1"/>
+                </a:solidFill>
+                <a:effectLst/>
+                <a:latin typeface="SutonnyMJ" pitchFamily="2" charset="0"/>
+                <a:ea typeface="Calibri" panose="020F0502020204030204" pitchFamily="34" charset="0"/>
+                <a:cs typeface="Vrinda" panose="020B0502040204020203" pitchFamily="34" charset="0"/>
+              </a:rPr>
+              <a:t> </a:t>
+            </a:r>
+            <a:r>
+              <a:rPr lang="en-US" sz="1800" dirty="0" err="1">
+                <a:solidFill>
+                  <a:schemeClr val="bg1"/>
+                </a:solidFill>
                 <a:effectLst/>
                 <a:latin typeface="SutonnyMJ" pitchFamily="2" charset="0"/>
                 <a:ea typeface="Calibri" panose="020F0502020204030204" pitchFamily="34" charset="0"/>
@@ -10622,15 +11034,21 @@
             </a:r>
             <a:r>
               <a:rPr lang="en-US" sz="1800" dirty="0">
-                <a:effectLst/>
-                <a:latin typeface="SutonnyMJ" pitchFamily="2" charset="0"/>
-                <a:ea typeface="Calibri" panose="020F0502020204030204" pitchFamily="34" charset="0"/>
-                <a:cs typeface="Vrinda" panose="020B0502040204020203" pitchFamily="34" charset="0"/>
-              </a:rPr>
-              <a:t> </a:t>
-            </a:r>
-            <a:r>
-              <a:rPr lang="en-US" sz="1800" dirty="0" err="1">
+                <a:solidFill>
+                  <a:schemeClr val="bg1"/>
+                </a:solidFill>
+                <a:effectLst/>
+                <a:latin typeface="SutonnyMJ" pitchFamily="2" charset="0"/>
+                <a:ea typeface="Calibri" panose="020F0502020204030204" pitchFamily="34" charset="0"/>
+                <a:cs typeface="Vrinda" panose="020B0502040204020203" pitchFamily="34" charset="0"/>
+              </a:rPr>
+              <a:t> </a:t>
+            </a:r>
+            <a:r>
+              <a:rPr lang="en-US" sz="1800" dirty="0" err="1">
+                <a:solidFill>
+                  <a:schemeClr val="bg1"/>
+                </a:solidFill>
                 <a:effectLst/>
                 <a:latin typeface="SutonnyMJ" pitchFamily="2" charset="0"/>
                 <a:ea typeface="Calibri" panose="020F0502020204030204" pitchFamily="34" charset="0"/>
@@ -10640,15 +11058,21 @@
             </a:r>
             <a:r>
               <a:rPr lang="en-US" sz="1800" dirty="0">
-                <a:effectLst/>
-                <a:latin typeface="SutonnyMJ" pitchFamily="2" charset="0"/>
-                <a:ea typeface="Calibri" panose="020F0502020204030204" pitchFamily="34" charset="0"/>
-                <a:cs typeface="Vrinda" panose="020B0502040204020203" pitchFamily="34" charset="0"/>
-              </a:rPr>
-              <a:t> </a:t>
-            </a:r>
-            <a:r>
-              <a:rPr lang="en-US" sz="1800" dirty="0" err="1">
+                <a:solidFill>
+                  <a:schemeClr val="bg1"/>
+                </a:solidFill>
+                <a:effectLst/>
+                <a:latin typeface="SutonnyMJ" pitchFamily="2" charset="0"/>
+                <a:ea typeface="Calibri" panose="020F0502020204030204" pitchFamily="34" charset="0"/>
+                <a:cs typeface="Vrinda" panose="020B0502040204020203" pitchFamily="34" charset="0"/>
+              </a:rPr>
+              <a:t> </a:t>
+            </a:r>
+            <a:r>
+              <a:rPr lang="en-US" sz="1800" dirty="0" err="1">
+                <a:solidFill>
+                  <a:schemeClr val="bg1"/>
+                </a:solidFill>
                 <a:effectLst/>
                 <a:latin typeface="SutonnyMJ" pitchFamily="2" charset="0"/>
                 <a:ea typeface="Calibri" panose="020F0502020204030204" pitchFamily="34" charset="0"/>
@@ -10658,6 +11082,9 @@
             </a:r>
             <a:r>
               <a:rPr lang="en-US" sz="1800" dirty="0">
+                <a:solidFill>
+                  <a:schemeClr val="bg1"/>
+                </a:solidFill>
                 <a:effectLst/>
                 <a:latin typeface="SutonnyMJ" pitchFamily="2" charset="0"/>
                 <a:ea typeface="Calibri" panose="020F0502020204030204" pitchFamily="34" charset="0"/>
@@ -10667,6 +11094,9 @@
             </a:r>
             <a:r>
               <a:rPr lang="en-US" sz="1800" dirty="0" err="1">
+                <a:solidFill>
+                  <a:schemeClr val="bg1"/>
+                </a:solidFill>
                 <a:effectLst/>
                 <a:latin typeface="SutonnyMJ" pitchFamily="2" charset="0"/>
                 <a:ea typeface="Calibri" panose="020F0502020204030204" pitchFamily="34" charset="0"/>
@@ -10676,15 +11106,21 @@
             </a:r>
             <a:r>
               <a:rPr lang="en-US" sz="1800" dirty="0">
-                <a:effectLst/>
-                <a:latin typeface="SutonnyMJ" pitchFamily="2" charset="0"/>
-                <a:ea typeface="Calibri" panose="020F0502020204030204" pitchFamily="34" charset="0"/>
-                <a:cs typeface="Vrinda" panose="020B0502040204020203" pitchFamily="34" charset="0"/>
-              </a:rPr>
-              <a:t> </a:t>
-            </a:r>
-            <a:r>
-              <a:rPr lang="en-US" sz="1800" dirty="0" err="1">
+                <a:solidFill>
+                  <a:schemeClr val="bg1"/>
+                </a:solidFill>
+                <a:effectLst/>
+                <a:latin typeface="SutonnyMJ" pitchFamily="2" charset="0"/>
+                <a:ea typeface="Calibri" panose="020F0502020204030204" pitchFamily="34" charset="0"/>
+                <a:cs typeface="Vrinda" panose="020B0502040204020203" pitchFamily="34" charset="0"/>
+              </a:rPr>
+              <a:t> </a:t>
+            </a:r>
+            <a:r>
+              <a:rPr lang="en-US" sz="1800" dirty="0" err="1">
+                <a:solidFill>
+                  <a:schemeClr val="bg1"/>
+                </a:solidFill>
                 <a:effectLst/>
                 <a:latin typeface="SutonnyMJ" pitchFamily="2" charset="0"/>
                 <a:ea typeface="Calibri" panose="020F0502020204030204" pitchFamily="34" charset="0"/>
@@ -10694,15 +11130,21 @@
             </a:r>
             <a:r>
               <a:rPr lang="en-US" sz="1800" dirty="0">
-                <a:effectLst/>
-                <a:latin typeface="SutonnyMJ" pitchFamily="2" charset="0"/>
-                <a:ea typeface="Calibri" panose="020F0502020204030204" pitchFamily="34" charset="0"/>
-                <a:cs typeface="Vrinda" panose="020B0502040204020203" pitchFamily="34" charset="0"/>
-              </a:rPr>
-              <a:t> </a:t>
-            </a:r>
-            <a:r>
-              <a:rPr lang="en-US" sz="1800" dirty="0" err="1">
+                <a:solidFill>
+                  <a:schemeClr val="bg1"/>
+                </a:solidFill>
+                <a:effectLst/>
+                <a:latin typeface="SutonnyMJ" pitchFamily="2" charset="0"/>
+                <a:ea typeface="Calibri" panose="020F0502020204030204" pitchFamily="34" charset="0"/>
+                <a:cs typeface="Vrinda" panose="020B0502040204020203" pitchFamily="34" charset="0"/>
+              </a:rPr>
+              <a:t> </a:t>
+            </a:r>
+            <a:r>
+              <a:rPr lang="en-US" sz="1800" dirty="0" err="1">
+                <a:solidFill>
+                  <a:schemeClr val="bg1"/>
+                </a:solidFill>
                 <a:effectLst/>
                 <a:latin typeface="SutonnyMJ" pitchFamily="2" charset="0"/>
                 <a:ea typeface="Calibri" panose="020F0502020204030204" pitchFamily="34" charset="0"/>
@@ -10712,15 +11154,21 @@
             </a:r>
             <a:r>
               <a:rPr lang="en-US" sz="1800" dirty="0">
-                <a:effectLst/>
-                <a:latin typeface="SutonnyMJ" pitchFamily="2" charset="0"/>
-                <a:ea typeface="Calibri" panose="020F0502020204030204" pitchFamily="34" charset="0"/>
-                <a:cs typeface="Vrinda" panose="020B0502040204020203" pitchFamily="34" charset="0"/>
-              </a:rPr>
-              <a:t> </a:t>
-            </a:r>
-            <a:r>
-              <a:rPr lang="en-US" sz="1800" dirty="0" err="1">
+                <a:solidFill>
+                  <a:schemeClr val="bg1"/>
+                </a:solidFill>
+                <a:effectLst/>
+                <a:latin typeface="SutonnyMJ" pitchFamily="2" charset="0"/>
+                <a:ea typeface="Calibri" panose="020F0502020204030204" pitchFamily="34" charset="0"/>
+                <a:cs typeface="Vrinda" panose="020B0502040204020203" pitchFamily="34" charset="0"/>
+              </a:rPr>
+              <a:t> </a:t>
+            </a:r>
+            <a:r>
+              <a:rPr lang="en-US" sz="1800" dirty="0" err="1">
+                <a:solidFill>
+                  <a:schemeClr val="bg1"/>
+                </a:solidFill>
                 <a:effectLst/>
                 <a:latin typeface="SutonnyMJ" pitchFamily="2" charset="0"/>
                 <a:ea typeface="Calibri" panose="020F0502020204030204" pitchFamily="34" charset="0"/>
@@ -10729,6 +11177,9 @@
               <a:t>myweav</a:t>
             </a:r>
             <a:endParaRPr lang="en-US" sz="1800" dirty="0">
+              <a:solidFill>
+                <a:schemeClr val="bg1"/>
+              </a:solidFill>
               <a:effectLst/>
               <a:latin typeface="Calibri" panose="020F0502020204030204" pitchFamily="34" charset="0"/>
               <a:ea typeface="Calibri" panose="020F0502020204030204" pitchFamily="34" charset="0"/>
@@ -10736,8 +11187,14 @@
             </a:endParaRPr>
           </a:p>
           <a:p>
-            <a:r>
-              <a:rPr lang="en-US" sz="1800" dirty="0">
+            <a:pPr marL="0" indent="0">
+              <a:buNone/>
+            </a:pPr>
+            <a:r>
+              <a:rPr lang="en-US" sz="1800" dirty="0">
+                <a:solidFill>
+                  <a:schemeClr val="bg1"/>
+                </a:solidFill>
                 <a:effectLst/>
                 <a:latin typeface="SutonnyMJ" pitchFamily="2" charset="0"/>
                 <a:ea typeface="Calibri" panose="020F0502020204030204" pitchFamily="34" charset="0"/>
@@ -10747,6 +11204,9 @@
             </a:r>
             <a:r>
               <a:rPr lang="en-US" sz="1800" dirty="0" err="1">
+                <a:solidFill>
+                  <a:schemeClr val="bg1"/>
+                </a:solidFill>
                 <a:effectLst/>
                 <a:latin typeface="SutonnyMJ" pitchFamily="2" charset="0"/>
                 <a:ea typeface="Calibri" panose="020F0502020204030204" pitchFamily="34" charset="0"/>
@@ -10756,6 +11216,9 @@
             </a:r>
             <a:r>
               <a:rPr lang="en-US" sz="1800" dirty="0">
+                <a:solidFill>
+                  <a:schemeClr val="bg1"/>
+                </a:solidFill>
                 <a:effectLst/>
                 <a:latin typeface="SutonnyMJ" pitchFamily="2" charset="0"/>
                 <a:ea typeface="Calibri" panose="020F0502020204030204" pitchFamily="34" charset="0"/>
@@ -10765,6 +11228,9 @@
             </a:r>
             <a:r>
               <a:rPr lang="en-US" sz="1800" dirty="0" err="1">
+                <a:solidFill>
+                  <a:schemeClr val="bg1"/>
+                </a:solidFill>
                 <a:effectLst/>
                 <a:latin typeface="SutonnyMJ" pitchFamily="2" charset="0"/>
                 <a:ea typeface="Calibri" panose="020F0502020204030204" pitchFamily="34" charset="0"/>
@@ -10774,6 +11240,9 @@
             </a:r>
             <a:r>
               <a:rPr lang="en-US" sz="1800" dirty="0">
+                <a:solidFill>
+                  <a:schemeClr val="bg1"/>
+                </a:solidFill>
                 <a:effectLst/>
                 <a:latin typeface="SutonnyMJ" pitchFamily="2" charset="0"/>
                 <a:ea typeface="Calibri" panose="020F0502020204030204" pitchFamily="34" charset="0"/>
@@ -10783,6 +11252,9 @@
             </a:r>
             <a:r>
               <a:rPr lang="en-US" sz="1800" dirty="0" err="1">
+                <a:solidFill>
+                  <a:schemeClr val="bg1"/>
+                </a:solidFill>
                 <a:effectLst/>
                 <a:latin typeface="SutonnyMJ" pitchFamily="2" charset="0"/>
                 <a:ea typeface="Calibri" panose="020F0502020204030204" pitchFamily="34" charset="0"/>
@@ -10792,15 +11264,21 @@
             </a:r>
             <a:r>
               <a:rPr lang="en-US" sz="1800" dirty="0">
-                <a:effectLst/>
-                <a:latin typeface="SutonnyMJ" pitchFamily="2" charset="0"/>
-                <a:ea typeface="Calibri" panose="020F0502020204030204" pitchFamily="34" charset="0"/>
-                <a:cs typeface="Vrinda" panose="020B0502040204020203" pitchFamily="34" charset="0"/>
-              </a:rPr>
-              <a:t> </a:t>
-            </a:r>
-            <a:r>
-              <a:rPr lang="en-US" sz="1800" dirty="0" err="1">
+                <a:solidFill>
+                  <a:schemeClr val="bg1"/>
+                </a:solidFill>
+                <a:effectLst/>
+                <a:latin typeface="SutonnyMJ" pitchFamily="2" charset="0"/>
+                <a:ea typeface="Calibri" panose="020F0502020204030204" pitchFamily="34" charset="0"/>
+                <a:cs typeface="Vrinda" panose="020B0502040204020203" pitchFamily="34" charset="0"/>
+              </a:rPr>
+              <a:t> </a:t>
+            </a:r>
+            <a:r>
+              <a:rPr lang="en-US" sz="1800" dirty="0" err="1">
+                <a:solidFill>
+                  <a:schemeClr val="bg1"/>
+                </a:solidFill>
                 <a:effectLst/>
                 <a:latin typeface="SutonnyMJ" pitchFamily="2" charset="0"/>
                 <a:ea typeface="Calibri" panose="020F0502020204030204" pitchFamily="34" charset="0"/>
@@ -10810,15 +11288,21 @@
             </a:r>
             <a:r>
               <a:rPr lang="en-US" sz="1800" dirty="0">
-                <a:effectLst/>
-                <a:latin typeface="SutonnyMJ" pitchFamily="2" charset="0"/>
-                <a:ea typeface="Calibri" panose="020F0502020204030204" pitchFamily="34" charset="0"/>
-                <a:cs typeface="Vrinda" panose="020B0502040204020203" pitchFamily="34" charset="0"/>
-              </a:rPr>
-              <a:t> </a:t>
-            </a:r>
-            <a:r>
-              <a:rPr lang="en-US" sz="1800" dirty="0" err="1">
+                <a:solidFill>
+                  <a:schemeClr val="bg1"/>
+                </a:solidFill>
+                <a:effectLst/>
+                <a:latin typeface="SutonnyMJ" pitchFamily="2" charset="0"/>
+                <a:ea typeface="Calibri" panose="020F0502020204030204" pitchFamily="34" charset="0"/>
+                <a:cs typeface="Vrinda" panose="020B0502040204020203" pitchFamily="34" charset="0"/>
+              </a:rPr>
+              <a:t> </a:t>
+            </a:r>
+            <a:r>
+              <a:rPr lang="en-US" sz="1800" dirty="0" err="1">
+                <a:solidFill>
+                  <a:schemeClr val="bg1"/>
+                </a:solidFill>
                 <a:effectLst/>
                 <a:latin typeface="SutonnyMJ" pitchFamily="2" charset="0"/>
                 <a:ea typeface="Calibri" panose="020F0502020204030204" pitchFamily="34" charset="0"/>
@@ -10828,15 +11312,21 @@
             </a:r>
             <a:r>
               <a:rPr lang="en-US" sz="1800" dirty="0">
-                <a:effectLst/>
-                <a:latin typeface="SutonnyMJ" pitchFamily="2" charset="0"/>
-                <a:ea typeface="Calibri" panose="020F0502020204030204" pitchFamily="34" charset="0"/>
-                <a:cs typeface="Vrinda" panose="020B0502040204020203" pitchFamily="34" charset="0"/>
-              </a:rPr>
-              <a:t> </a:t>
-            </a:r>
-            <a:r>
-              <a:rPr lang="en-US" sz="1800" dirty="0" err="1">
+                <a:solidFill>
+                  <a:schemeClr val="bg1"/>
+                </a:solidFill>
+                <a:effectLst/>
+                <a:latin typeface="SutonnyMJ" pitchFamily="2" charset="0"/>
+                <a:ea typeface="Calibri" panose="020F0502020204030204" pitchFamily="34" charset="0"/>
+                <a:cs typeface="Vrinda" panose="020B0502040204020203" pitchFamily="34" charset="0"/>
+              </a:rPr>
+              <a:t> </a:t>
+            </a:r>
+            <a:r>
+              <a:rPr lang="en-US" sz="1800" dirty="0" err="1">
+                <a:solidFill>
+                  <a:schemeClr val="bg1"/>
+                </a:solidFill>
                 <a:effectLst/>
                 <a:latin typeface="SutonnyMJ" pitchFamily="2" charset="0"/>
                 <a:ea typeface="Calibri" panose="020F0502020204030204" pitchFamily="34" charset="0"/>
@@ -10875,8 +11365,12 @@
           </a:bodyPr>
           <a:lstStyle/>
           <a:p>
+            <a:pPr algn="ctr"/>
             <a:r>
               <a:rPr lang="en-US" sz="2800" dirty="0" err="1">
+                <a:solidFill>
+                  <a:schemeClr val="bg1"/>
+                </a:solidFill>
                 <a:effectLst/>
                 <a:latin typeface="SutonnyMJ" pitchFamily="2" charset="0"/>
                 <a:ea typeface="Calibri" panose="020F0502020204030204" pitchFamily="34" charset="0"/>
@@ -10886,6 +11380,9 @@
             </a:r>
             <a:r>
               <a:rPr lang="en-US" sz="2800" dirty="0">
+                <a:solidFill>
+                  <a:schemeClr val="bg1"/>
+                </a:solidFill>
                 <a:effectLst/>
                 <a:latin typeface="SutonnyMJ" pitchFamily="2" charset="0"/>
                 <a:ea typeface="Calibri" panose="020F0502020204030204" pitchFamily="34" charset="0"/>
@@ -10895,6 +11392,9 @@
             </a:r>
             <a:r>
               <a:rPr lang="en-US" sz="2800" dirty="0" err="1">
+                <a:solidFill>
+                  <a:schemeClr val="bg1"/>
+                </a:solidFill>
                 <a:effectLst/>
                 <a:latin typeface="SutonnyMJ" pitchFamily="2" charset="0"/>
                 <a:ea typeface="Calibri" panose="020F0502020204030204" pitchFamily="34" charset="0"/>
@@ -10904,6 +11404,9 @@
             </a:r>
             <a:r>
               <a:rPr lang="en-US" sz="2800" dirty="0">
+                <a:solidFill>
+                  <a:schemeClr val="bg1"/>
+                </a:solidFill>
                 <a:effectLst/>
                 <a:latin typeface="SutonnyMJ" pitchFamily="2" charset="0"/>
                 <a:ea typeface="Calibri" panose="020F0502020204030204" pitchFamily="34" charset="0"/>
@@ -10913,6 +11416,9 @@
             </a:r>
             <a:r>
               <a:rPr lang="en-US" sz="2800" dirty="0" err="1">
+                <a:solidFill>
+                  <a:schemeClr val="bg1"/>
+                </a:solidFill>
                 <a:effectLst/>
                 <a:latin typeface="SutonnyOMJ" panose="01010600010101010101" pitchFamily="2" charset="0"/>
                 <a:ea typeface="Calibri" panose="020F0502020204030204" pitchFamily="34" charset="0"/>
@@ -10922,6 +11428,9 @@
             </a:r>
             <a:r>
               <a:rPr lang="en-US" sz="2800" dirty="0">
+                <a:solidFill>
+                  <a:schemeClr val="bg1"/>
+                </a:solidFill>
                 <a:effectLst/>
                 <a:latin typeface="SutonnyMJ" pitchFamily="2" charset="0"/>
                 <a:ea typeface="Calibri" panose="020F0502020204030204" pitchFamily="34" charset="0"/>
@@ -10931,6 +11440,9 @@
             </a:r>
             <a:r>
               <a:rPr lang="en-US" sz="2800" dirty="0" err="1">
+                <a:solidFill>
+                  <a:schemeClr val="bg1"/>
+                </a:solidFill>
                 <a:effectLst/>
                 <a:latin typeface="SutonnyMJ" pitchFamily="2" charset="0"/>
                 <a:ea typeface="Calibri" panose="020F0502020204030204" pitchFamily="34" charset="0"/>
@@ -10938,7 +11450,11 @@
               </a:rPr>
               <a:t>my‡hvM-myweavmg~n</a:t>
             </a:r>
-            <a:endParaRPr lang="en-US" sz="2400" dirty="0"/>
+            <a:endParaRPr lang="en-US" sz="2400" dirty="0">
+              <a:solidFill>
+                <a:schemeClr val="bg1"/>
+              </a:solidFill>
+            </a:endParaRPr>
           </a:p>
         </p:txBody>
       </p:sp>
@@ -10964,8 +11480,8 @@
         </p:blipFill>
         <p:spPr>
           <a:xfrm>
-            <a:off x="7147774" y="3505198"/>
-            <a:ext cx="1841680" cy="3262699"/>
+            <a:off x="7805530" y="5797826"/>
+            <a:ext cx="1232453" cy="970071"/>
           </a:xfrm>
           <a:prstGeom prst="rect">
             <a:avLst/>
@@ -11066,11 +11582,11 @@
         <p:spPr/>
         <p:txBody>
           <a:bodyPr>
-            <a:normAutofit fontScale="92500" lnSpcReduction="20000"/>
+            <a:normAutofit fontScale="92500" lnSpcReduction="10000"/>
           </a:bodyPr>
           <a:lstStyle/>
           <a:p>
-            <a:pPr marL="0" marR="0" algn="just">
+            <a:pPr marL="0" marR="0" indent="0" algn="just">
               <a:lnSpc>
                 <a:spcPct val="107000"/>
               </a:lnSpc>
@@ -11080,9 +11596,13 @@
               <a:spcAft>
                 <a:spcPts val="800"/>
               </a:spcAft>
+              <a:buNone/>
             </a:pPr>
             <a:r>
               <a:rPr lang="en-US" sz="1800" dirty="0">
+                <a:solidFill>
+                  <a:schemeClr val="bg1"/>
+                </a:solidFill>
                 <a:effectLst/>
                 <a:latin typeface="SutonnyMJ" pitchFamily="2" charset="0"/>
                 <a:ea typeface="Calibri" panose="020F0502020204030204" pitchFamily="34" charset="0"/>
@@ -11092,6 +11612,9 @@
             </a:r>
             <a:r>
               <a:rPr lang="en-US" sz="1800" dirty="0" err="1">
+                <a:solidFill>
+                  <a:schemeClr val="bg1"/>
+                </a:solidFill>
                 <a:effectLst/>
                 <a:latin typeface="SutonnyMJ" pitchFamily="2" charset="0"/>
                 <a:ea typeface="Calibri" panose="020F0502020204030204" pitchFamily="34" charset="0"/>
@@ -11101,6 +11624,9 @@
             </a:r>
             <a:r>
               <a:rPr lang="en-US" sz="1800" dirty="0">
+                <a:solidFill>
+                  <a:schemeClr val="bg1"/>
+                </a:solidFill>
                 <a:effectLst/>
                 <a:latin typeface="SutonnyMJ" pitchFamily="2" charset="0"/>
                 <a:ea typeface="Calibri" panose="020F0502020204030204" pitchFamily="34" charset="0"/>
@@ -11110,6 +11636,9 @@
             </a:r>
             <a:r>
               <a:rPr lang="en-US" sz="1800" dirty="0" err="1">
+                <a:solidFill>
+                  <a:schemeClr val="bg1"/>
+                </a:solidFill>
                 <a:effectLst/>
                 <a:latin typeface="SutonnyMJ" pitchFamily="2" charset="0"/>
                 <a:ea typeface="Calibri" panose="020F0502020204030204" pitchFamily="34" charset="0"/>
@@ -11119,15 +11648,21 @@
             </a:r>
             <a:r>
               <a:rPr lang="en-US" sz="1800" dirty="0">
-                <a:effectLst/>
-                <a:latin typeface="SutonnyMJ" pitchFamily="2" charset="0"/>
-                <a:ea typeface="Calibri" panose="020F0502020204030204" pitchFamily="34" charset="0"/>
-                <a:cs typeface="Vrinda" panose="020B0502040204020203" pitchFamily="34" charset="0"/>
-              </a:rPr>
-              <a:t> </a:t>
-            </a:r>
-            <a:r>
-              <a:rPr lang="en-US" sz="1800" dirty="0" err="1">
+                <a:solidFill>
+                  <a:schemeClr val="bg1"/>
+                </a:solidFill>
+                <a:effectLst/>
+                <a:latin typeface="SutonnyMJ" pitchFamily="2" charset="0"/>
+                <a:ea typeface="Calibri" panose="020F0502020204030204" pitchFamily="34" charset="0"/>
+                <a:cs typeface="Vrinda" panose="020B0502040204020203" pitchFamily="34" charset="0"/>
+              </a:rPr>
+              <a:t> </a:t>
+            </a:r>
+            <a:r>
+              <a:rPr lang="en-US" sz="1800" dirty="0" err="1">
+                <a:solidFill>
+                  <a:schemeClr val="bg1"/>
+                </a:solidFill>
                 <a:effectLst/>
                 <a:latin typeface="SutonnyOMJ" panose="01010600010101010101" pitchFamily="2" charset="0"/>
                 <a:ea typeface="Calibri" panose="020F0502020204030204" pitchFamily="34" charset="0"/>
@@ -11137,6 +11672,9 @@
             </a:r>
             <a:r>
               <a:rPr lang="en-US" sz="1800" dirty="0">
+                <a:solidFill>
+                  <a:schemeClr val="bg1"/>
+                </a:solidFill>
                 <a:effectLst/>
                 <a:latin typeface="SutonnyMJ" pitchFamily="2" charset="0"/>
                 <a:ea typeface="Calibri" panose="020F0502020204030204" pitchFamily="34" charset="0"/>
@@ -11146,6 +11684,9 @@
             </a:r>
             <a:r>
               <a:rPr lang="en-US" sz="1800" dirty="0" err="1">
+                <a:solidFill>
+                  <a:schemeClr val="bg1"/>
+                </a:solidFill>
                 <a:effectLst/>
                 <a:latin typeface="SutonnyOMJ" panose="01010600010101010101" pitchFamily="2" charset="0"/>
                 <a:ea typeface="Calibri" panose="020F0502020204030204" pitchFamily="34" charset="0"/>
@@ -11155,15 +11696,21 @@
             </a:r>
             <a:r>
               <a:rPr lang="en-US" sz="1800" dirty="0">
-                <a:effectLst/>
-                <a:latin typeface="SutonnyMJ" pitchFamily="2" charset="0"/>
-                <a:ea typeface="Calibri" panose="020F0502020204030204" pitchFamily="34" charset="0"/>
-                <a:cs typeface="Vrinda" panose="020B0502040204020203" pitchFamily="34" charset="0"/>
-              </a:rPr>
-              <a:t> </a:t>
-            </a:r>
-            <a:r>
-              <a:rPr lang="en-US" sz="1800" dirty="0" err="1">
+                <a:solidFill>
+                  <a:schemeClr val="bg1"/>
+                </a:solidFill>
+                <a:effectLst/>
+                <a:latin typeface="SutonnyMJ" pitchFamily="2" charset="0"/>
+                <a:ea typeface="Calibri" panose="020F0502020204030204" pitchFamily="34" charset="0"/>
+                <a:cs typeface="Vrinda" panose="020B0502040204020203" pitchFamily="34" charset="0"/>
+              </a:rPr>
+              <a:t> </a:t>
+            </a:r>
+            <a:r>
+              <a:rPr lang="en-US" sz="1800" dirty="0" err="1">
+                <a:solidFill>
+                  <a:schemeClr val="bg1"/>
+                </a:solidFill>
                 <a:effectLst/>
                 <a:latin typeface="SutonnyMJ" pitchFamily="2" charset="0"/>
                 <a:ea typeface="Calibri" panose="020F0502020204030204" pitchFamily="34" charset="0"/>
@@ -11173,6 +11720,9 @@
             </a:r>
             <a:r>
               <a:rPr lang="en-US" sz="1800" dirty="0">
+                <a:solidFill>
+                  <a:schemeClr val="bg1"/>
+                </a:solidFill>
                 <a:effectLst/>
                 <a:latin typeface="SutonnyMJ" pitchFamily="2" charset="0"/>
                 <a:ea typeface="Calibri" panose="020F0502020204030204" pitchFamily="34" charset="0"/>
@@ -11182,6 +11732,9 @@
             </a:r>
             <a:r>
               <a:rPr lang="en-US" sz="1800" dirty="0" err="1">
+                <a:solidFill>
+                  <a:schemeClr val="bg1"/>
+                </a:solidFill>
                 <a:effectLst/>
                 <a:latin typeface="SutonnyMJ" pitchFamily="2" charset="0"/>
                 <a:ea typeface="Calibri" panose="020F0502020204030204" pitchFamily="34" charset="0"/>
@@ -11191,15 +11744,21 @@
             </a:r>
             <a:r>
               <a:rPr lang="en-US" sz="1800" dirty="0">
-                <a:effectLst/>
-                <a:latin typeface="SutonnyMJ" pitchFamily="2" charset="0"/>
-                <a:ea typeface="Calibri" panose="020F0502020204030204" pitchFamily="34" charset="0"/>
-                <a:cs typeface="Vrinda" panose="020B0502040204020203" pitchFamily="34" charset="0"/>
-              </a:rPr>
-              <a:t> </a:t>
-            </a:r>
-            <a:r>
-              <a:rPr lang="en-US" sz="1800" dirty="0" err="1">
+                <a:solidFill>
+                  <a:schemeClr val="bg1"/>
+                </a:solidFill>
+                <a:effectLst/>
+                <a:latin typeface="SutonnyMJ" pitchFamily="2" charset="0"/>
+                <a:ea typeface="Calibri" panose="020F0502020204030204" pitchFamily="34" charset="0"/>
+                <a:cs typeface="Vrinda" panose="020B0502040204020203" pitchFamily="34" charset="0"/>
+              </a:rPr>
+              <a:t> </a:t>
+            </a:r>
+            <a:r>
+              <a:rPr lang="en-US" sz="1800" dirty="0" err="1">
+                <a:solidFill>
+                  <a:schemeClr val="bg1"/>
+                </a:solidFill>
                 <a:effectLst/>
                 <a:latin typeface="SutonnyMJ" pitchFamily="2" charset="0"/>
                 <a:ea typeface="Calibri" panose="020F0502020204030204" pitchFamily="34" charset="0"/>
@@ -11209,15 +11768,21 @@
             </a:r>
             <a:r>
               <a:rPr lang="en-US" sz="1800" dirty="0">
-                <a:effectLst/>
-                <a:latin typeface="SutonnyMJ" pitchFamily="2" charset="0"/>
-                <a:ea typeface="Calibri" panose="020F0502020204030204" pitchFamily="34" charset="0"/>
-                <a:cs typeface="Vrinda" panose="020B0502040204020203" pitchFamily="34" charset="0"/>
-              </a:rPr>
-              <a:t> </a:t>
-            </a:r>
-            <a:r>
-              <a:rPr lang="en-US" sz="1800" dirty="0" err="1">
+                <a:solidFill>
+                  <a:schemeClr val="bg1"/>
+                </a:solidFill>
+                <a:effectLst/>
+                <a:latin typeface="SutonnyMJ" pitchFamily="2" charset="0"/>
+                <a:ea typeface="Calibri" panose="020F0502020204030204" pitchFamily="34" charset="0"/>
+                <a:cs typeface="Vrinda" panose="020B0502040204020203" pitchFamily="34" charset="0"/>
+              </a:rPr>
+              <a:t> </a:t>
+            </a:r>
+            <a:r>
+              <a:rPr lang="en-US" sz="1800" dirty="0" err="1">
+                <a:solidFill>
+                  <a:schemeClr val="bg1"/>
+                </a:solidFill>
                 <a:effectLst/>
                 <a:latin typeface="SutonnyMJ" pitchFamily="2" charset="0"/>
                 <a:ea typeface="Calibri" panose="020F0502020204030204" pitchFamily="34" charset="0"/>
@@ -11227,15 +11792,21 @@
             </a:r>
             <a:r>
               <a:rPr lang="en-US" sz="1800" dirty="0">
-                <a:effectLst/>
-                <a:latin typeface="SutonnyMJ" pitchFamily="2" charset="0"/>
-                <a:ea typeface="Calibri" panose="020F0502020204030204" pitchFamily="34" charset="0"/>
-                <a:cs typeface="Vrinda" panose="020B0502040204020203" pitchFamily="34" charset="0"/>
-              </a:rPr>
-              <a:t> </a:t>
-            </a:r>
-            <a:r>
-              <a:rPr lang="en-US" sz="1800" dirty="0" err="1">
+                <a:solidFill>
+                  <a:schemeClr val="bg1"/>
+                </a:solidFill>
+                <a:effectLst/>
+                <a:latin typeface="SutonnyMJ" pitchFamily="2" charset="0"/>
+                <a:ea typeface="Calibri" panose="020F0502020204030204" pitchFamily="34" charset="0"/>
+                <a:cs typeface="Vrinda" panose="020B0502040204020203" pitchFamily="34" charset="0"/>
+              </a:rPr>
+              <a:t> </a:t>
+            </a:r>
+            <a:r>
+              <a:rPr lang="en-US" sz="1800" dirty="0" err="1">
+                <a:solidFill>
+                  <a:schemeClr val="bg1"/>
+                </a:solidFill>
                 <a:effectLst/>
                 <a:latin typeface="SutonnyMJ" pitchFamily="2" charset="0"/>
                 <a:ea typeface="Calibri" panose="020F0502020204030204" pitchFamily="34" charset="0"/>
@@ -11244,6 +11815,9 @@
               <a:t>myweav</a:t>
             </a:r>
             <a:endParaRPr lang="en-US" sz="1800" dirty="0">
+              <a:solidFill>
+                <a:schemeClr val="bg1"/>
+              </a:solidFill>
               <a:effectLst/>
               <a:latin typeface="Calibri" panose="020F0502020204030204" pitchFamily="34" charset="0"/>
               <a:ea typeface="Calibri" panose="020F0502020204030204" pitchFamily="34" charset="0"/>
@@ -11251,7 +11825,7 @@
             </a:endParaRPr>
           </a:p>
           <a:p>
-            <a:pPr marL="0" marR="0" algn="just">
+            <a:pPr marL="0" marR="0" indent="0" algn="just">
               <a:lnSpc>
                 <a:spcPct val="107000"/>
               </a:lnSpc>
@@ -11261,9 +11835,13 @@
               <a:spcAft>
                 <a:spcPts val="800"/>
               </a:spcAft>
+              <a:buNone/>
             </a:pPr>
             <a:r>
               <a:rPr lang="en-US" sz="1800" dirty="0">
+                <a:solidFill>
+                  <a:schemeClr val="bg1"/>
+                </a:solidFill>
                 <a:effectLst/>
                 <a:latin typeface="SutonnyMJ" pitchFamily="2" charset="0"/>
                 <a:ea typeface="Calibri" panose="020F0502020204030204" pitchFamily="34" charset="0"/>
@@ -11273,6 +11851,9 @@
             </a:r>
             <a:r>
               <a:rPr lang="en-US" sz="1800" dirty="0" err="1">
+                <a:solidFill>
+                  <a:schemeClr val="bg1"/>
+                </a:solidFill>
                 <a:latin typeface="SutonnyOMJ" panose="01010600010101010101" pitchFamily="2" charset="0"/>
                 <a:ea typeface="Calibri" panose="020F0502020204030204" pitchFamily="34" charset="0"/>
                 <a:cs typeface="SutonnyOMJ" panose="01010600010101010101" pitchFamily="2" charset="0"/>
@@ -11281,15 +11862,21 @@
             </a:r>
             <a:r>
               <a:rPr lang="en-US" sz="1800" dirty="0">
-                <a:effectLst/>
-                <a:latin typeface="SutonnyMJ" pitchFamily="2" charset="0"/>
-                <a:ea typeface="Calibri" panose="020F0502020204030204" pitchFamily="34" charset="0"/>
-                <a:cs typeface="Vrinda" panose="020B0502040204020203" pitchFamily="34" charset="0"/>
-              </a:rPr>
-              <a:t> </a:t>
-            </a:r>
-            <a:r>
-              <a:rPr lang="en-US" sz="1800" dirty="0" err="1">
+                <a:solidFill>
+                  <a:schemeClr val="bg1"/>
+                </a:solidFill>
+                <a:effectLst/>
+                <a:latin typeface="SutonnyMJ" pitchFamily="2" charset="0"/>
+                <a:ea typeface="Calibri" panose="020F0502020204030204" pitchFamily="34" charset="0"/>
+                <a:cs typeface="Vrinda" panose="020B0502040204020203" pitchFamily="34" charset="0"/>
+              </a:rPr>
+              <a:t> </a:t>
+            </a:r>
+            <a:r>
+              <a:rPr lang="en-US" sz="1800" dirty="0" err="1">
+                <a:solidFill>
+                  <a:schemeClr val="bg1"/>
+                </a:solidFill>
                 <a:effectLst/>
                 <a:latin typeface="SutonnyMJ" pitchFamily="2" charset="0"/>
                 <a:ea typeface="Calibri" panose="020F0502020204030204" pitchFamily="34" charset="0"/>
@@ -11299,15 +11886,21 @@
             </a:r>
             <a:r>
               <a:rPr lang="en-US" sz="1800" dirty="0">
-                <a:effectLst/>
-                <a:latin typeface="SutonnyMJ" pitchFamily="2" charset="0"/>
-                <a:ea typeface="Calibri" panose="020F0502020204030204" pitchFamily="34" charset="0"/>
-                <a:cs typeface="Vrinda" panose="020B0502040204020203" pitchFamily="34" charset="0"/>
-              </a:rPr>
-              <a:t> </a:t>
-            </a:r>
-            <a:r>
-              <a:rPr lang="en-US" sz="1800" dirty="0" err="1">
+                <a:solidFill>
+                  <a:schemeClr val="bg1"/>
+                </a:solidFill>
+                <a:effectLst/>
+                <a:latin typeface="SutonnyMJ" pitchFamily="2" charset="0"/>
+                <a:ea typeface="Calibri" panose="020F0502020204030204" pitchFamily="34" charset="0"/>
+                <a:cs typeface="Vrinda" panose="020B0502040204020203" pitchFamily="34" charset="0"/>
+              </a:rPr>
+              <a:t> </a:t>
+            </a:r>
+            <a:r>
+              <a:rPr lang="en-US" sz="1800" dirty="0" err="1">
+                <a:solidFill>
+                  <a:schemeClr val="bg1"/>
+                </a:solidFill>
                 <a:effectLst/>
                 <a:latin typeface="SutonnyMJ" pitchFamily="2" charset="0"/>
                 <a:ea typeface="Calibri" panose="020F0502020204030204" pitchFamily="34" charset="0"/>
@@ -11317,6 +11910,9 @@
             </a:r>
             <a:r>
               <a:rPr lang="en-US" sz="1800" dirty="0">
+                <a:solidFill>
+                  <a:schemeClr val="bg1"/>
+                </a:solidFill>
                 <a:effectLst/>
                 <a:latin typeface="SutonnyMJ" pitchFamily="2" charset="0"/>
                 <a:ea typeface="Calibri" panose="020F0502020204030204" pitchFamily="34" charset="0"/>
@@ -11325,6 +11921,9 @@
               <a:t>_©x</a:t>
             </a:r>
             <a:endParaRPr lang="en-US" sz="1800" dirty="0">
+              <a:solidFill>
+                <a:schemeClr val="bg1"/>
+              </a:solidFill>
               <a:effectLst/>
               <a:latin typeface="Calibri" panose="020F0502020204030204" pitchFamily="34" charset="0"/>
               <a:ea typeface="Calibri" panose="020F0502020204030204" pitchFamily="34" charset="0"/>
@@ -11332,7 +11931,7 @@
             </a:endParaRPr>
           </a:p>
           <a:p>
-            <a:pPr marL="0" marR="0" algn="just">
+            <a:pPr marL="0" marR="0" indent="0" algn="just">
               <a:lnSpc>
                 <a:spcPct val="107000"/>
               </a:lnSpc>
@@ -11342,9 +11941,13 @@
               <a:spcAft>
                 <a:spcPts val="800"/>
               </a:spcAft>
+              <a:buNone/>
             </a:pPr>
             <a:r>
               <a:rPr lang="en-US" sz="1800" dirty="0">
+                <a:solidFill>
+                  <a:schemeClr val="bg1"/>
+                </a:solidFill>
                 <a:effectLst/>
                 <a:latin typeface="SutonnyMJ" pitchFamily="2" charset="0"/>
                 <a:ea typeface="Calibri" panose="020F0502020204030204" pitchFamily="34" charset="0"/>
@@ -11354,6 +11957,9 @@
             </a:r>
             <a:r>
               <a:rPr lang="en-US" sz="1800" dirty="0" err="1">
+                <a:solidFill>
+                  <a:schemeClr val="bg1"/>
+                </a:solidFill>
                 <a:effectLst/>
                 <a:latin typeface="SutonnyMJ" pitchFamily="2" charset="0"/>
                 <a:ea typeface="Calibri" panose="020F0502020204030204" pitchFamily="34" charset="0"/>
@@ -11363,15 +11969,21 @@
             </a:r>
             <a:r>
               <a:rPr lang="en-US" sz="1800" dirty="0">
-                <a:effectLst/>
-                <a:latin typeface="SutonnyMJ" pitchFamily="2" charset="0"/>
-                <a:ea typeface="Calibri" panose="020F0502020204030204" pitchFamily="34" charset="0"/>
-                <a:cs typeface="Vrinda" panose="020B0502040204020203" pitchFamily="34" charset="0"/>
-              </a:rPr>
-              <a:t> </a:t>
-            </a:r>
-            <a:r>
-              <a:rPr lang="en-US" sz="1800" dirty="0" err="1">
+                <a:solidFill>
+                  <a:schemeClr val="bg1"/>
+                </a:solidFill>
+                <a:effectLst/>
+                <a:latin typeface="SutonnyMJ" pitchFamily="2" charset="0"/>
+                <a:ea typeface="Calibri" panose="020F0502020204030204" pitchFamily="34" charset="0"/>
+                <a:cs typeface="Vrinda" panose="020B0502040204020203" pitchFamily="34" charset="0"/>
+              </a:rPr>
+              <a:t> </a:t>
+            </a:r>
+            <a:r>
+              <a:rPr lang="en-US" sz="1800" dirty="0" err="1">
+                <a:solidFill>
+                  <a:schemeClr val="bg1"/>
+                </a:solidFill>
                 <a:effectLst/>
                 <a:latin typeface="SutonnyMJ" pitchFamily="2" charset="0"/>
                 <a:ea typeface="Calibri" panose="020F0502020204030204" pitchFamily="34" charset="0"/>
@@ -11381,15 +11993,21 @@
             </a:r>
             <a:r>
               <a:rPr lang="en-US" sz="1800" dirty="0">
-                <a:effectLst/>
-                <a:latin typeface="SutonnyMJ" pitchFamily="2" charset="0"/>
-                <a:ea typeface="Calibri" panose="020F0502020204030204" pitchFamily="34" charset="0"/>
-                <a:cs typeface="Vrinda" panose="020B0502040204020203" pitchFamily="34" charset="0"/>
-              </a:rPr>
-              <a:t> </a:t>
-            </a:r>
-            <a:r>
-              <a:rPr lang="en-US" sz="1800" dirty="0" err="1">
+                <a:solidFill>
+                  <a:schemeClr val="bg1"/>
+                </a:solidFill>
+                <a:effectLst/>
+                <a:latin typeface="SutonnyMJ" pitchFamily="2" charset="0"/>
+                <a:ea typeface="Calibri" panose="020F0502020204030204" pitchFamily="34" charset="0"/>
+                <a:cs typeface="Vrinda" panose="020B0502040204020203" pitchFamily="34" charset="0"/>
+              </a:rPr>
+              <a:t> </a:t>
+            </a:r>
+            <a:r>
+              <a:rPr lang="en-US" sz="1800" dirty="0" err="1">
+                <a:solidFill>
+                  <a:schemeClr val="bg1"/>
+                </a:solidFill>
                 <a:effectLst/>
                 <a:latin typeface="SutonnyMJ" pitchFamily="2" charset="0"/>
                 <a:ea typeface="Calibri" panose="020F0502020204030204" pitchFamily="34" charset="0"/>
@@ -11399,15 +12017,21 @@
             </a:r>
             <a:r>
               <a:rPr lang="en-US" sz="1800" dirty="0">
-                <a:effectLst/>
-                <a:latin typeface="SutonnyMJ" pitchFamily="2" charset="0"/>
-                <a:ea typeface="Calibri" panose="020F0502020204030204" pitchFamily="34" charset="0"/>
-                <a:cs typeface="Vrinda" panose="020B0502040204020203" pitchFamily="34" charset="0"/>
-              </a:rPr>
-              <a:t> </a:t>
-            </a:r>
-            <a:r>
-              <a:rPr lang="en-US" sz="1800" dirty="0" err="1">
+                <a:solidFill>
+                  <a:schemeClr val="bg1"/>
+                </a:solidFill>
+                <a:effectLst/>
+                <a:latin typeface="SutonnyMJ" pitchFamily="2" charset="0"/>
+                <a:ea typeface="Calibri" panose="020F0502020204030204" pitchFamily="34" charset="0"/>
+                <a:cs typeface="Vrinda" panose="020B0502040204020203" pitchFamily="34" charset="0"/>
+              </a:rPr>
+              <a:t> </a:t>
+            </a:r>
+            <a:r>
+              <a:rPr lang="en-US" sz="1800" dirty="0" err="1">
+                <a:solidFill>
+                  <a:schemeClr val="bg1"/>
+                </a:solidFill>
                 <a:effectLst/>
                 <a:latin typeface="SutonnyMJ" pitchFamily="2" charset="0"/>
                 <a:ea typeface="Calibri" panose="020F0502020204030204" pitchFamily="34" charset="0"/>
@@ -11417,15 +12041,21 @@
             </a:r>
             <a:r>
               <a:rPr lang="en-US" sz="1800" dirty="0">
-                <a:effectLst/>
-                <a:latin typeface="SutonnyMJ" pitchFamily="2" charset="0"/>
-                <a:ea typeface="Calibri" panose="020F0502020204030204" pitchFamily="34" charset="0"/>
-                <a:cs typeface="Vrinda" panose="020B0502040204020203" pitchFamily="34" charset="0"/>
-              </a:rPr>
-              <a:t> </a:t>
-            </a:r>
-            <a:r>
-              <a:rPr lang="en-US" sz="1800" dirty="0" err="1">
+                <a:solidFill>
+                  <a:schemeClr val="bg1"/>
+                </a:solidFill>
+                <a:effectLst/>
+                <a:latin typeface="SutonnyMJ" pitchFamily="2" charset="0"/>
+                <a:ea typeface="Calibri" panose="020F0502020204030204" pitchFamily="34" charset="0"/>
+                <a:cs typeface="Vrinda" panose="020B0502040204020203" pitchFamily="34" charset="0"/>
+              </a:rPr>
+              <a:t> </a:t>
+            </a:r>
+            <a:r>
+              <a:rPr lang="en-US" sz="1800" dirty="0" err="1">
+                <a:solidFill>
+                  <a:schemeClr val="bg1"/>
+                </a:solidFill>
                 <a:effectLst/>
                 <a:latin typeface="SutonnyMJ" pitchFamily="2" charset="0"/>
                 <a:ea typeface="Calibri" panose="020F0502020204030204" pitchFamily="34" charset="0"/>
@@ -11435,15 +12065,21 @@
             </a:r>
             <a:r>
               <a:rPr lang="en-US" sz="1800" dirty="0">
-                <a:effectLst/>
-                <a:latin typeface="SutonnyMJ" pitchFamily="2" charset="0"/>
-                <a:ea typeface="Calibri" panose="020F0502020204030204" pitchFamily="34" charset="0"/>
-                <a:cs typeface="Vrinda" panose="020B0502040204020203" pitchFamily="34" charset="0"/>
-              </a:rPr>
-              <a:t> </a:t>
-            </a:r>
-            <a:r>
-              <a:rPr lang="en-US" sz="1800" dirty="0" err="1">
+                <a:solidFill>
+                  <a:schemeClr val="bg1"/>
+                </a:solidFill>
+                <a:effectLst/>
+                <a:latin typeface="SutonnyMJ" pitchFamily="2" charset="0"/>
+                <a:ea typeface="Calibri" panose="020F0502020204030204" pitchFamily="34" charset="0"/>
+                <a:cs typeface="Vrinda" panose="020B0502040204020203" pitchFamily="34" charset="0"/>
+              </a:rPr>
+              <a:t> </a:t>
+            </a:r>
+            <a:r>
+              <a:rPr lang="en-US" sz="1800" dirty="0" err="1">
+                <a:solidFill>
+                  <a:schemeClr val="bg1"/>
+                </a:solidFill>
                 <a:effectLst/>
                 <a:latin typeface="SutonnyMJ" pitchFamily="2" charset="0"/>
                 <a:ea typeface="Calibri" panose="020F0502020204030204" pitchFamily="34" charset="0"/>
@@ -11453,15 +12089,21 @@
             </a:r>
             <a:r>
               <a:rPr lang="en-US" sz="1800" dirty="0">
-                <a:effectLst/>
-                <a:latin typeface="SutonnyMJ" pitchFamily="2" charset="0"/>
-                <a:ea typeface="Calibri" panose="020F0502020204030204" pitchFamily="34" charset="0"/>
-                <a:cs typeface="Vrinda" panose="020B0502040204020203" pitchFamily="34" charset="0"/>
-              </a:rPr>
-              <a:t> </a:t>
-            </a:r>
-            <a:r>
-              <a:rPr lang="en-US" sz="1800" dirty="0" err="1">
+                <a:solidFill>
+                  <a:schemeClr val="bg1"/>
+                </a:solidFill>
+                <a:effectLst/>
+                <a:latin typeface="SutonnyMJ" pitchFamily="2" charset="0"/>
+                <a:ea typeface="Calibri" panose="020F0502020204030204" pitchFamily="34" charset="0"/>
+                <a:cs typeface="Vrinda" panose="020B0502040204020203" pitchFamily="34" charset="0"/>
+              </a:rPr>
+              <a:t> </a:t>
+            </a:r>
+            <a:r>
+              <a:rPr lang="en-US" sz="1800" dirty="0" err="1">
+                <a:solidFill>
+                  <a:schemeClr val="bg1"/>
+                </a:solidFill>
                 <a:effectLst/>
                 <a:latin typeface="SutonnyMJ" pitchFamily="2" charset="0"/>
                 <a:ea typeface="Calibri" panose="020F0502020204030204" pitchFamily="34" charset="0"/>
@@ -11471,15 +12113,21 @@
             </a:r>
             <a:r>
               <a:rPr lang="en-US" sz="1800" dirty="0">
-                <a:effectLst/>
-                <a:latin typeface="SutonnyMJ" pitchFamily="2" charset="0"/>
-                <a:ea typeface="Calibri" panose="020F0502020204030204" pitchFamily="34" charset="0"/>
-                <a:cs typeface="Vrinda" panose="020B0502040204020203" pitchFamily="34" charset="0"/>
-              </a:rPr>
-              <a:t> </a:t>
-            </a:r>
-            <a:r>
-              <a:rPr lang="en-US" sz="1800" dirty="0" err="1">
+                <a:solidFill>
+                  <a:schemeClr val="bg1"/>
+                </a:solidFill>
+                <a:effectLst/>
+                <a:latin typeface="SutonnyMJ" pitchFamily="2" charset="0"/>
+                <a:ea typeface="Calibri" panose="020F0502020204030204" pitchFamily="34" charset="0"/>
+                <a:cs typeface="Vrinda" panose="020B0502040204020203" pitchFamily="34" charset="0"/>
+              </a:rPr>
+              <a:t> </a:t>
+            </a:r>
+            <a:r>
+              <a:rPr lang="en-US" sz="1800" dirty="0" err="1">
+                <a:solidFill>
+                  <a:schemeClr val="bg1"/>
+                </a:solidFill>
                 <a:effectLst/>
                 <a:latin typeface="SutonnyMJ" pitchFamily="2" charset="0"/>
                 <a:ea typeface="Calibri" panose="020F0502020204030204" pitchFamily="34" charset="0"/>
@@ -11488,6 +12136,9 @@
               <a:t>cwiPvjbv</a:t>
             </a:r>
             <a:endParaRPr lang="en-US" sz="1800" dirty="0">
+              <a:solidFill>
+                <a:schemeClr val="bg1"/>
+              </a:solidFill>
               <a:effectLst/>
               <a:latin typeface="Calibri" panose="020F0502020204030204" pitchFamily="34" charset="0"/>
               <a:ea typeface="Calibri" panose="020F0502020204030204" pitchFamily="34" charset="0"/>
@@ -11495,7 +12146,7 @@
             </a:endParaRPr>
           </a:p>
           <a:p>
-            <a:pPr marL="0" marR="0" algn="just">
+            <a:pPr marL="0" marR="0" indent="0" algn="just">
               <a:lnSpc>
                 <a:spcPct val="107000"/>
               </a:lnSpc>
@@ -11505,9 +12156,13 @@
               <a:spcAft>
                 <a:spcPts val="800"/>
               </a:spcAft>
+              <a:buNone/>
             </a:pPr>
             <a:r>
               <a:rPr lang="en-US" sz="1800" dirty="0">
+                <a:solidFill>
+                  <a:schemeClr val="bg1"/>
+                </a:solidFill>
                 <a:effectLst/>
                 <a:latin typeface="SutonnyMJ" pitchFamily="2" charset="0"/>
                 <a:ea typeface="Calibri" panose="020F0502020204030204" pitchFamily="34" charset="0"/>
@@ -11517,6 +12172,9 @@
             </a:r>
             <a:r>
               <a:rPr lang="en-US" sz="1800" dirty="0" err="1">
+                <a:solidFill>
+                  <a:schemeClr val="bg1"/>
+                </a:solidFill>
                 <a:effectLst/>
                 <a:latin typeface="SutonnyMJ" pitchFamily="2" charset="0"/>
                 <a:ea typeface="Calibri" panose="020F0502020204030204" pitchFamily="34" charset="0"/>
@@ -11526,15 +12184,21 @@
             </a:r>
             <a:r>
               <a:rPr lang="en-US" sz="1800" dirty="0">
-                <a:effectLst/>
-                <a:latin typeface="SutonnyMJ" pitchFamily="2" charset="0"/>
-                <a:ea typeface="Calibri" panose="020F0502020204030204" pitchFamily="34" charset="0"/>
-                <a:cs typeface="Vrinda" panose="020B0502040204020203" pitchFamily="34" charset="0"/>
-              </a:rPr>
-              <a:t> </a:t>
-            </a:r>
-            <a:r>
-              <a:rPr lang="en-US" sz="1800" dirty="0" err="1">
+                <a:solidFill>
+                  <a:schemeClr val="bg1"/>
+                </a:solidFill>
+                <a:effectLst/>
+                <a:latin typeface="SutonnyMJ" pitchFamily="2" charset="0"/>
+                <a:ea typeface="Calibri" panose="020F0502020204030204" pitchFamily="34" charset="0"/>
+                <a:cs typeface="Vrinda" panose="020B0502040204020203" pitchFamily="34" charset="0"/>
+              </a:rPr>
+              <a:t> </a:t>
+            </a:r>
+            <a:r>
+              <a:rPr lang="en-US" sz="1800" dirty="0" err="1">
+                <a:solidFill>
+                  <a:schemeClr val="bg1"/>
+                </a:solidFill>
                 <a:effectLst/>
                 <a:latin typeface="SutonnyMJ" pitchFamily="2" charset="0"/>
                 <a:ea typeface="Calibri" panose="020F0502020204030204" pitchFamily="34" charset="0"/>
@@ -11544,15 +12208,21 @@
             </a:r>
             <a:r>
               <a:rPr lang="en-US" sz="1800" dirty="0">
-                <a:effectLst/>
-                <a:latin typeface="SutonnyMJ" pitchFamily="2" charset="0"/>
-                <a:ea typeface="Calibri" panose="020F0502020204030204" pitchFamily="34" charset="0"/>
-                <a:cs typeface="Vrinda" panose="020B0502040204020203" pitchFamily="34" charset="0"/>
-              </a:rPr>
-              <a:t> </a:t>
-            </a:r>
-            <a:r>
-              <a:rPr lang="en-US" sz="1800" dirty="0" err="1">
+                <a:solidFill>
+                  <a:schemeClr val="bg1"/>
+                </a:solidFill>
+                <a:effectLst/>
+                <a:latin typeface="SutonnyMJ" pitchFamily="2" charset="0"/>
+                <a:ea typeface="Calibri" panose="020F0502020204030204" pitchFamily="34" charset="0"/>
+                <a:cs typeface="Vrinda" panose="020B0502040204020203" pitchFamily="34" charset="0"/>
+              </a:rPr>
+              <a:t> </a:t>
+            </a:r>
+            <a:r>
+              <a:rPr lang="en-US" sz="1800" dirty="0" err="1">
+                <a:solidFill>
+                  <a:schemeClr val="bg1"/>
+                </a:solidFill>
                 <a:effectLst/>
                 <a:latin typeface="SutonnyMJ" pitchFamily="2" charset="0"/>
                 <a:ea typeface="Calibri" panose="020F0502020204030204" pitchFamily="34" charset="0"/>
@@ -11562,6 +12232,9 @@
             </a:r>
             <a:r>
               <a:rPr lang="en-US" sz="1800" dirty="0">
+                <a:solidFill>
+                  <a:schemeClr val="bg1"/>
+                </a:solidFill>
                 <a:effectLst/>
                 <a:latin typeface="SutonnyMJ" pitchFamily="2" charset="0"/>
                 <a:ea typeface="Calibri" panose="020F0502020204030204" pitchFamily="34" charset="0"/>
@@ -11571,6 +12244,9 @@
             </a:r>
             <a:r>
               <a:rPr lang="en-US" sz="1800" dirty="0" err="1">
+                <a:solidFill>
+                  <a:schemeClr val="bg1"/>
+                </a:solidFill>
                 <a:effectLst/>
                 <a:latin typeface="SutonnyMJ" pitchFamily="2" charset="0"/>
                 <a:ea typeface="Calibri" panose="020F0502020204030204" pitchFamily="34" charset="0"/>
@@ -11580,15 +12256,21 @@
             </a:r>
             <a:r>
               <a:rPr lang="en-US" sz="1800" dirty="0">
-                <a:effectLst/>
-                <a:latin typeface="SutonnyMJ" pitchFamily="2" charset="0"/>
-                <a:ea typeface="Calibri" panose="020F0502020204030204" pitchFamily="34" charset="0"/>
-                <a:cs typeface="Vrinda" panose="020B0502040204020203" pitchFamily="34" charset="0"/>
-              </a:rPr>
-              <a:t> </a:t>
-            </a:r>
-            <a:r>
-              <a:rPr lang="en-US" sz="1800" dirty="0" err="1">
+                <a:solidFill>
+                  <a:schemeClr val="bg1"/>
+                </a:solidFill>
+                <a:effectLst/>
+                <a:latin typeface="SutonnyMJ" pitchFamily="2" charset="0"/>
+                <a:ea typeface="Calibri" panose="020F0502020204030204" pitchFamily="34" charset="0"/>
+                <a:cs typeface="Vrinda" panose="020B0502040204020203" pitchFamily="34" charset="0"/>
+              </a:rPr>
+              <a:t> </a:t>
+            </a:r>
+            <a:r>
+              <a:rPr lang="en-US" sz="1800" dirty="0" err="1">
+                <a:solidFill>
+                  <a:schemeClr val="bg1"/>
+                </a:solidFill>
                 <a:effectLst/>
                 <a:latin typeface="SutonnyMJ" pitchFamily="2" charset="0"/>
                 <a:ea typeface="Calibri" panose="020F0502020204030204" pitchFamily="34" charset="0"/>
@@ -11598,6 +12280,9 @@
             </a:r>
             <a:r>
               <a:rPr lang="en-US" sz="1800" dirty="0">
+                <a:solidFill>
+                  <a:schemeClr val="bg1"/>
+                </a:solidFill>
                 <a:effectLst/>
                 <a:latin typeface="SutonnyMJ" pitchFamily="2" charset="0"/>
                 <a:ea typeface="Calibri" panose="020F0502020204030204" pitchFamily="34" charset="0"/>
@@ -11607,6 +12292,9 @@
             </a:r>
             <a:r>
               <a:rPr lang="en-US" sz="1800" dirty="0" err="1">
+                <a:solidFill>
+                  <a:schemeClr val="bg1"/>
+                </a:solidFill>
                 <a:effectLst/>
                 <a:latin typeface="SutonnyMJ" pitchFamily="2" charset="0"/>
                 <a:ea typeface="Calibri" panose="020F0502020204030204" pitchFamily="34" charset="0"/>
@@ -11616,6 +12304,9 @@
             </a:r>
             <a:r>
               <a:rPr lang="en-US" sz="1800" dirty="0">
+                <a:solidFill>
+                  <a:schemeClr val="bg1"/>
+                </a:solidFill>
                 <a:effectLst/>
                 <a:latin typeface="SutonnyMJ" pitchFamily="2" charset="0"/>
                 <a:ea typeface="Calibri" panose="020F0502020204030204" pitchFamily="34" charset="0"/>
@@ -11625,6 +12316,9 @@
             </a:r>
             <a:r>
               <a:rPr lang="en-US" sz="1800" dirty="0" err="1">
+                <a:solidFill>
+                  <a:schemeClr val="bg1"/>
+                </a:solidFill>
                 <a:effectLst/>
                 <a:latin typeface="SutonnyOMJ" panose="01010600010101010101" pitchFamily="2" charset="0"/>
                 <a:ea typeface="Calibri" panose="020F0502020204030204" pitchFamily="34" charset="0"/>
@@ -11634,15 +12328,21 @@
             </a:r>
             <a:r>
               <a:rPr lang="en-US" sz="1800" dirty="0">
-                <a:effectLst/>
-                <a:latin typeface="SutonnyMJ" pitchFamily="2" charset="0"/>
-                <a:ea typeface="Calibri" panose="020F0502020204030204" pitchFamily="34" charset="0"/>
-                <a:cs typeface="Vrinda" panose="020B0502040204020203" pitchFamily="34" charset="0"/>
-              </a:rPr>
-              <a:t> </a:t>
-            </a:r>
-            <a:r>
-              <a:rPr lang="en-US" sz="1800" dirty="0" err="1">
+                <a:solidFill>
+                  <a:schemeClr val="bg1"/>
+                </a:solidFill>
+                <a:effectLst/>
+                <a:latin typeface="SutonnyMJ" pitchFamily="2" charset="0"/>
+                <a:ea typeface="Calibri" panose="020F0502020204030204" pitchFamily="34" charset="0"/>
+                <a:cs typeface="Vrinda" panose="020B0502040204020203" pitchFamily="34" charset="0"/>
+              </a:rPr>
+              <a:t> </a:t>
+            </a:r>
+            <a:r>
+              <a:rPr lang="en-US" sz="1800" dirty="0" err="1">
+                <a:solidFill>
+                  <a:schemeClr val="bg1"/>
+                </a:solidFill>
                 <a:effectLst/>
                 <a:latin typeface="SutonnyMJ" pitchFamily="2" charset="0"/>
                 <a:ea typeface="Calibri" panose="020F0502020204030204" pitchFamily="34" charset="0"/>
@@ -11651,6 +12351,9 @@
               <a:t>wewbgq</a:t>
             </a:r>
             <a:endParaRPr lang="en-US" sz="1800" dirty="0">
+              <a:solidFill>
+                <a:schemeClr val="bg1"/>
+              </a:solidFill>
               <a:effectLst/>
               <a:latin typeface="Calibri" panose="020F0502020204030204" pitchFamily="34" charset="0"/>
               <a:ea typeface="Calibri" panose="020F0502020204030204" pitchFamily="34" charset="0"/>
@@ -11658,7 +12361,7 @@
             </a:endParaRPr>
           </a:p>
           <a:p>
-            <a:pPr marL="0" marR="0" algn="just">
+            <a:pPr marL="0" marR="0" indent="0" algn="just">
               <a:lnSpc>
                 <a:spcPct val="107000"/>
               </a:lnSpc>
@@ -11668,9 +12371,13 @@
               <a:spcAft>
                 <a:spcPts val="800"/>
               </a:spcAft>
+              <a:buNone/>
             </a:pPr>
             <a:r>
               <a:rPr lang="en-US" sz="1800" dirty="0">
+                <a:solidFill>
+                  <a:schemeClr val="bg1"/>
+                </a:solidFill>
                 <a:effectLst/>
                 <a:latin typeface="SutonnyMJ" pitchFamily="2" charset="0"/>
                 <a:ea typeface="Calibri" panose="020F0502020204030204" pitchFamily="34" charset="0"/>
@@ -11680,6 +12387,9 @@
             </a:r>
             <a:r>
               <a:rPr lang="en-US" sz="1800" dirty="0" err="1">
+                <a:solidFill>
+                  <a:schemeClr val="bg1"/>
+                </a:solidFill>
                 <a:effectLst/>
                 <a:latin typeface="SutonnyOMJ" panose="01010600010101010101" pitchFamily="2" charset="0"/>
                 <a:ea typeface="Calibri" panose="020F0502020204030204" pitchFamily="34" charset="0"/>
@@ -11689,6 +12399,9 @@
             </a:r>
             <a:r>
               <a:rPr lang="en-US" sz="1800" dirty="0">
+                <a:solidFill>
+                  <a:schemeClr val="bg1"/>
+                </a:solidFill>
                 <a:effectLst/>
                 <a:latin typeface="SutonnyOMJ" panose="01010600010101010101" pitchFamily="2" charset="0"/>
                 <a:ea typeface="Calibri" panose="020F0502020204030204" pitchFamily="34" charset="0"/>
@@ -11698,15 +12411,21 @@
             </a:r>
             <a:r>
               <a:rPr lang="en-US" sz="1800" dirty="0">
-                <a:effectLst/>
-                <a:latin typeface="SutonnyMJ" pitchFamily="2" charset="0"/>
-                <a:ea typeface="Calibri" panose="020F0502020204030204" pitchFamily="34" charset="0"/>
-                <a:cs typeface="Vrinda" panose="020B0502040204020203" pitchFamily="34" charset="0"/>
-              </a:rPr>
-              <a:t> </a:t>
-            </a:r>
-            <a:r>
-              <a:rPr lang="en-US" sz="1800" dirty="0" err="1">
+                <a:solidFill>
+                  <a:schemeClr val="bg1"/>
+                </a:solidFill>
+                <a:effectLst/>
+                <a:latin typeface="SutonnyMJ" pitchFamily="2" charset="0"/>
+                <a:ea typeface="Calibri" panose="020F0502020204030204" pitchFamily="34" charset="0"/>
+                <a:cs typeface="Vrinda" panose="020B0502040204020203" pitchFamily="34" charset="0"/>
+              </a:rPr>
+              <a:t> </a:t>
+            </a:r>
+            <a:r>
+              <a:rPr lang="en-US" sz="1800" dirty="0" err="1">
+                <a:solidFill>
+                  <a:schemeClr val="bg1"/>
+                </a:solidFill>
                 <a:effectLst/>
                 <a:latin typeface="SutonnyMJ" pitchFamily="2" charset="0"/>
                 <a:ea typeface="Calibri" panose="020F0502020204030204" pitchFamily="34" charset="0"/>
@@ -11716,15 +12435,21 @@
             </a:r>
             <a:r>
               <a:rPr lang="en-US" sz="1800" dirty="0">
-                <a:effectLst/>
-                <a:latin typeface="SutonnyMJ" pitchFamily="2" charset="0"/>
-                <a:ea typeface="Calibri" panose="020F0502020204030204" pitchFamily="34" charset="0"/>
-                <a:cs typeface="Vrinda" panose="020B0502040204020203" pitchFamily="34" charset="0"/>
-              </a:rPr>
-              <a:t> </a:t>
-            </a:r>
-            <a:r>
-              <a:rPr lang="en-US" sz="1800" dirty="0" err="1">
+                <a:solidFill>
+                  <a:schemeClr val="bg1"/>
+                </a:solidFill>
+                <a:effectLst/>
+                <a:latin typeface="SutonnyMJ" pitchFamily="2" charset="0"/>
+                <a:ea typeface="Calibri" panose="020F0502020204030204" pitchFamily="34" charset="0"/>
+                <a:cs typeface="Vrinda" panose="020B0502040204020203" pitchFamily="34" charset="0"/>
+              </a:rPr>
+              <a:t> </a:t>
+            </a:r>
+            <a:r>
+              <a:rPr lang="en-US" sz="1800" dirty="0" err="1">
+                <a:solidFill>
+                  <a:schemeClr val="bg1"/>
+                </a:solidFill>
                 <a:effectLst/>
                 <a:latin typeface="SutonnyMJ" pitchFamily="2" charset="0"/>
                 <a:ea typeface="Calibri" panose="020F0502020204030204" pitchFamily="34" charset="0"/>
@@ -11734,6 +12459,9 @@
             </a:r>
             <a:r>
               <a:rPr lang="en-US" sz="1800" dirty="0">
+                <a:solidFill>
+                  <a:schemeClr val="bg1"/>
+                </a:solidFill>
                 <a:effectLst/>
                 <a:latin typeface="SutonnyMJ" pitchFamily="2" charset="0"/>
                 <a:ea typeface="Calibri" panose="020F0502020204030204" pitchFamily="34" charset="0"/>
@@ -11743,6 +12471,9 @@
             </a:r>
             <a:r>
               <a:rPr lang="en-US" sz="1800" dirty="0" err="1">
+                <a:solidFill>
+                  <a:schemeClr val="bg1"/>
+                </a:solidFill>
                 <a:effectLst/>
                 <a:latin typeface="SutonnyMJ" pitchFamily="2" charset="0"/>
                 <a:ea typeface="Calibri" panose="020F0502020204030204" pitchFamily="34" charset="0"/>
@@ -11751,6 +12482,9 @@
               <a:t>mUAvc</a:t>
             </a:r>
             <a:endParaRPr lang="en-US" sz="1800" dirty="0">
+              <a:solidFill>
+                <a:schemeClr val="bg1"/>
+              </a:solidFill>
               <a:effectLst/>
               <a:latin typeface="Calibri" panose="020F0502020204030204" pitchFamily="34" charset="0"/>
               <a:ea typeface="Calibri" panose="020F0502020204030204" pitchFamily="34" charset="0"/>
@@ -11758,7 +12492,7 @@
             </a:endParaRPr>
           </a:p>
           <a:p>
-            <a:pPr marL="0" marR="0" algn="just">
+            <a:pPr marL="0" marR="0" indent="0" algn="just">
               <a:lnSpc>
                 <a:spcPct val="107000"/>
               </a:lnSpc>
@@ -11768,9 +12502,13 @@
               <a:spcAft>
                 <a:spcPts val="800"/>
               </a:spcAft>
+              <a:buNone/>
             </a:pPr>
             <a:r>
               <a:rPr lang="en-US" sz="1800" dirty="0">
+                <a:solidFill>
+                  <a:schemeClr val="bg1"/>
+                </a:solidFill>
                 <a:effectLst/>
                 <a:latin typeface="SutonnyMJ" pitchFamily="2" charset="0"/>
                 <a:ea typeface="Calibri" panose="020F0502020204030204" pitchFamily="34" charset="0"/>
@@ -11780,6 +12518,9 @@
             </a:r>
             <a:r>
               <a:rPr lang="en-US" sz="1800" dirty="0" err="1">
+                <a:solidFill>
+                  <a:schemeClr val="bg1"/>
+                </a:solidFill>
                 <a:effectLst/>
                 <a:latin typeface="SutonnyMJ" pitchFamily="2" charset="0"/>
                 <a:ea typeface="Calibri" panose="020F0502020204030204" pitchFamily="34" charset="0"/>
@@ -11789,15 +12530,21 @@
             </a:r>
             <a:r>
               <a:rPr lang="en-US" sz="1800" dirty="0">
-                <a:effectLst/>
-                <a:latin typeface="SutonnyMJ" pitchFamily="2" charset="0"/>
-                <a:ea typeface="Calibri" panose="020F0502020204030204" pitchFamily="34" charset="0"/>
-                <a:cs typeface="Vrinda" panose="020B0502040204020203" pitchFamily="34" charset="0"/>
-              </a:rPr>
-              <a:t> </a:t>
-            </a:r>
-            <a:r>
-              <a:rPr lang="en-US" sz="1800" dirty="0" err="1">
+                <a:solidFill>
+                  <a:schemeClr val="bg1"/>
+                </a:solidFill>
+                <a:effectLst/>
+                <a:latin typeface="SutonnyMJ" pitchFamily="2" charset="0"/>
+                <a:ea typeface="Calibri" panose="020F0502020204030204" pitchFamily="34" charset="0"/>
+                <a:cs typeface="Vrinda" panose="020B0502040204020203" pitchFamily="34" charset="0"/>
+              </a:rPr>
+              <a:t> </a:t>
+            </a:r>
+            <a:r>
+              <a:rPr lang="en-US" sz="1800" dirty="0" err="1">
+                <a:solidFill>
+                  <a:schemeClr val="bg1"/>
+                </a:solidFill>
                 <a:effectLst/>
                 <a:latin typeface="SutonnyMJ" pitchFamily="2" charset="0"/>
                 <a:ea typeface="Calibri" panose="020F0502020204030204" pitchFamily="34" charset="0"/>
@@ -11806,6 +12553,9 @@
               <a:t>cwiPvjbv</a:t>
             </a:r>
             <a:endParaRPr lang="en-US" sz="1800" dirty="0">
+              <a:solidFill>
+                <a:schemeClr val="bg1"/>
+              </a:solidFill>
               <a:effectLst/>
               <a:latin typeface="Calibri" panose="020F0502020204030204" pitchFamily="34" charset="0"/>
               <a:ea typeface="Calibri" panose="020F0502020204030204" pitchFamily="34" charset="0"/>
@@ -11813,7 +12563,7 @@
             </a:endParaRPr>
           </a:p>
           <a:p>
-            <a:pPr marL="0" marR="0" algn="just">
+            <a:pPr marL="0" marR="0" indent="0" algn="just">
               <a:lnSpc>
                 <a:spcPct val="107000"/>
               </a:lnSpc>
@@ -11823,9 +12573,13 @@
               <a:spcAft>
                 <a:spcPts val="800"/>
               </a:spcAft>
+              <a:buNone/>
             </a:pPr>
             <a:r>
               <a:rPr lang="en-US" sz="1800" dirty="0">
+                <a:solidFill>
+                  <a:schemeClr val="bg1"/>
+                </a:solidFill>
                 <a:effectLst/>
                 <a:latin typeface="SutonnyMJ" pitchFamily="2" charset="0"/>
                 <a:ea typeface="Calibri" panose="020F0502020204030204" pitchFamily="34" charset="0"/>
@@ -11835,6 +12589,9 @@
             </a:r>
             <a:r>
               <a:rPr lang="en-US" sz="1800" dirty="0" err="1">
+                <a:solidFill>
+                  <a:schemeClr val="bg1"/>
+                </a:solidFill>
                 <a:effectLst/>
                 <a:latin typeface="SutonnyMJ" pitchFamily="2" charset="0"/>
                 <a:ea typeface="Calibri" panose="020F0502020204030204" pitchFamily="34" charset="0"/>
@@ -11844,15 +12601,21 @@
             </a:r>
             <a:r>
               <a:rPr lang="en-US" sz="1800" dirty="0">
-                <a:effectLst/>
-                <a:latin typeface="SutonnyMJ" pitchFamily="2" charset="0"/>
-                <a:ea typeface="Calibri" panose="020F0502020204030204" pitchFamily="34" charset="0"/>
-                <a:cs typeface="Vrinda" panose="020B0502040204020203" pitchFamily="34" charset="0"/>
-              </a:rPr>
-              <a:t> </a:t>
-            </a:r>
-            <a:r>
-              <a:rPr lang="en-US" sz="1800" dirty="0" err="1">
+                <a:solidFill>
+                  <a:schemeClr val="bg1"/>
+                </a:solidFill>
+                <a:effectLst/>
+                <a:latin typeface="SutonnyMJ" pitchFamily="2" charset="0"/>
+                <a:ea typeface="Calibri" panose="020F0502020204030204" pitchFamily="34" charset="0"/>
+                <a:cs typeface="Vrinda" panose="020B0502040204020203" pitchFamily="34" charset="0"/>
+              </a:rPr>
+              <a:t> </a:t>
+            </a:r>
+            <a:r>
+              <a:rPr lang="en-US" sz="1800" dirty="0" err="1">
+                <a:solidFill>
+                  <a:schemeClr val="bg1"/>
+                </a:solidFill>
                 <a:effectLst/>
                 <a:latin typeface="SutonnyMJ" pitchFamily="2" charset="0"/>
                 <a:ea typeface="Calibri" panose="020F0502020204030204" pitchFamily="34" charset="0"/>
@@ -11862,6 +12625,9 @@
             </a:r>
             <a:r>
               <a:rPr lang="en-US" sz="1800" dirty="0">
+                <a:solidFill>
+                  <a:schemeClr val="bg1"/>
+                </a:solidFill>
                 <a:effectLst/>
                 <a:latin typeface="SutonnyMJ" pitchFamily="2" charset="0"/>
                 <a:ea typeface="Calibri" panose="020F0502020204030204" pitchFamily="34" charset="0"/>
@@ -11871,6 +12637,9 @@
             </a:r>
             <a:r>
               <a:rPr lang="en-US" sz="1800" dirty="0" err="1">
+                <a:solidFill>
+                  <a:schemeClr val="bg1"/>
+                </a:solidFill>
                 <a:effectLst/>
                 <a:latin typeface="SutonnyMJ" pitchFamily="2" charset="0"/>
                 <a:ea typeface="Calibri" panose="020F0502020204030204" pitchFamily="34" charset="0"/>
@@ -11880,15 +12649,21 @@
             </a:r>
             <a:r>
               <a:rPr lang="en-US" sz="1800" dirty="0">
-                <a:effectLst/>
-                <a:latin typeface="SutonnyMJ" pitchFamily="2" charset="0"/>
-                <a:ea typeface="Calibri" panose="020F0502020204030204" pitchFamily="34" charset="0"/>
-                <a:cs typeface="Vrinda" panose="020B0502040204020203" pitchFamily="34" charset="0"/>
-              </a:rPr>
-              <a:t> </a:t>
-            </a:r>
-            <a:r>
-              <a:rPr lang="en-US" sz="1800" dirty="0" err="1">
+                <a:solidFill>
+                  <a:schemeClr val="bg1"/>
+                </a:solidFill>
+                <a:effectLst/>
+                <a:latin typeface="SutonnyMJ" pitchFamily="2" charset="0"/>
+                <a:ea typeface="Calibri" panose="020F0502020204030204" pitchFamily="34" charset="0"/>
+                <a:cs typeface="Vrinda" panose="020B0502040204020203" pitchFamily="34" charset="0"/>
+              </a:rPr>
+              <a:t> </a:t>
+            </a:r>
+            <a:r>
+              <a:rPr lang="en-US" sz="1800" dirty="0" err="1">
+                <a:solidFill>
+                  <a:schemeClr val="bg1"/>
+                </a:solidFill>
                 <a:effectLst/>
                 <a:latin typeface="SutonnyMJ" pitchFamily="2" charset="0"/>
                 <a:ea typeface="Calibri" panose="020F0502020204030204" pitchFamily="34" charset="0"/>
@@ -11898,15 +12673,21 @@
             </a:r>
             <a:r>
               <a:rPr lang="en-US" sz="1800" dirty="0">
-                <a:effectLst/>
-                <a:latin typeface="SutonnyMJ" pitchFamily="2" charset="0"/>
-                <a:ea typeface="Calibri" panose="020F0502020204030204" pitchFamily="34" charset="0"/>
-                <a:cs typeface="Vrinda" panose="020B0502040204020203" pitchFamily="34" charset="0"/>
-              </a:rPr>
-              <a:t> </a:t>
-            </a:r>
-            <a:r>
-              <a:rPr lang="en-US" sz="1800" dirty="0" err="1">
+                <a:solidFill>
+                  <a:schemeClr val="bg1"/>
+                </a:solidFill>
+                <a:effectLst/>
+                <a:latin typeface="SutonnyMJ" pitchFamily="2" charset="0"/>
+                <a:ea typeface="Calibri" panose="020F0502020204030204" pitchFamily="34" charset="0"/>
+                <a:cs typeface="Vrinda" panose="020B0502040204020203" pitchFamily="34" charset="0"/>
+              </a:rPr>
+              <a:t> </a:t>
+            </a:r>
+            <a:r>
+              <a:rPr lang="en-US" sz="1800" dirty="0" err="1">
+                <a:solidFill>
+                  <a:schemeClr val="bg1"/>
+                </a:solidFill>
                 <a:effectLst/>
                 <a:latin typeface="SutonnyOMJ" panose="01010600010101010101" pitchFamily="2" charset="0"/>
                 <a:ea typeface="Calibri" panose="020F0502020204030204" pitchFamily="34" charset="0"/>
@@ -11916,6 +12697,9 @@
             </a:r>
             <a:r>
               <a:rPr lang="en-US" sz="1800" dirty="0">
+                <a:solidFill>
+                  <a:schemeClr val="bg1"/>
+                </a:solidFill>
                 <a:effectLst/>
                 <a:latin typeface="SutonnyMJ" pitchFamily="2" charset="0"/>
                 <a:ea typeface="Calibri" panose="020F0502020204030204" pitchFamily="34" charset="0"/>
@@ -11925,6 +12709,9 @@
             </a:r>
             <a:r>
               <a:rPr lang="en-US" sz="1800" dirty="0" err="1">
+                <a:solidFill>
+                  <a:schemeClr val="bg1"/>
+                </a:solidFill>
                 <a:effectLst/>
                 <a:latin typeface="SutonnyMJ" pitchFamily="2" charset="0"/>
                 <a:ea typeface="Calibri" panose="020F0502020204030204" pitchFamily="34" charset="0"/>
@@ -11934,6 +12721,9 @@
             </a:r>
             <a:r>
               <a:rPr lang="en-US" sz="1800" dirty="0">
+                <a:solidFill>
+                  <a:schemeClr val="bg1"/>
+                </a:solidFill>
                 <a:effectLst/>
                 <a:latin typeface="SutonnyMJ" pitchFamily="2" charset="0"/>
                 <a:ea typeface="Calibri" panose="020F0502020204030204" pitchFamily="34" charset="0"/>
@@ -11943,6 +12733,9 @@
             </a:r>
             <a:r>
               <a:rPr lang="en-US" sz="1800" dirty="0" err="1">
+                <a:solidFill>
+                  <a:schemeClr val="bg1"/>
+                </a:solidFill>
                 <a:effectLst/>
                 <a:latin typeface="SutonnyMJ" pitchFamily="2" charset="0"/>
                 <a:ea typeface="Calibri" panose="020F0502020204030204" pitchFamily="34" charset="0"/>
@@ -11952,15 +12745,21 @@
             </a:r>
             <a:r>
               <a:rPr lang="en-US" sz="1800" dirty="0">
-                <a:effectLst/>
-                <a:latin typeface="SutonnyMJ" pitchFamily="2" charset="0"/>
-                <a:ea typeface="Calibri" panose="020F0502020204030204" pitchFamily="34" charset="0"/>
-                <a:cs typeface="Vrinda" panose="020B0502040204020203" pitchFamily="34" charset="0"/>
-              </a:rPr>
-              <a:t> </a:t>
-            </a:r>
-            <a:r>
-              <a:rPr lang="en-US" sz="1800" dirty="0" err="1">
+                <a:solidFill>
+                  <a:schemeClr val="bg1"/>
+                </a:solidFill>
+                <a:effectLst/>
+                <a:latin typeface="SutonnyMJ" pitchFamily="2" charset="0"/>
+                <a:ea typeface="Calibri" panose="020F0502020204030204" pitchFamily="34" charset="0"/>
+                <a:cs typeface="Vrinda" panose="020B0502040204020203" pitchFamily="34" charset="0"/>
+              </a:rPr>
+              <a:t> </a:t>
+            </a:r>
+            <a:r>
+              <a:rPr lang="en-US" sz="1800" dirty="0" err="1">
+                <a:solidFill>
+                  <a:schemeClr val="bg1"/>
+                </a:solidFill>
                 <a:effectLst/>
                 <a:latin typeface="SutonnyOMJ" panose="01010600010101010101" pitchFamily="2" charset="0"/>
                 <a:ea typeface="Calibri" panose="020F0502020204030204" pitchFamily="34" charset="0"/>
@@ -11969,6 +12768,9 @@
               <a:t>ব্যবস্থা</a:t>
             </a:r>
             <a:endParaRPr lang="en-US" sz="1800" dirty="0">
+              <a:solidFill>
+                <a:schemeClr val="bg1"/>
+              </a:solidFill>
               <a:effectLst/>
               <a:latin typeface="Calibri" panose="020F0502020204030204" pitchFamily="34" charset="0"/>
               <a:ea typeface="Calibri" panose="020F0502020204030204" pitchFamily="34" charset="0"/>
@@ -11976,7 +12778,7 @@
             </a:endParaRPr>
           </a:p>
           <a:p>
-            <a:pPr marL="0" marR="0" algn="just">
+            <a:pPr marL="0" marR="0" indent="0" algn="just">
               <a:lnSpc>
                 <a:spcPct val="107000"/>
               </a:lnSpc>
@@ -11986,9 +12788,13 @@
               <a:spcAft>
                 <a:spcPts val="800"/>
               </a:spcAft>
+              <a:buNone/>
             </a:pPr>
             <a:r>
               <a:rPr lang="en-US" sz="1800" dirty="0">
+                <a:solidFill>
+                  <a:schemeClr val="bg1"/>
+                </a:solidFill>
                 <a:effectLst/>
                 <a:latin typeface="SutonnyMJ" pitchFamily="2" charset="0"/>
                 <a:ea typeface="Calibri" panose="020F0502020204030204" pitchFamily="34" charset="0"/>
@@ -11998,6 +12804,9 @@
             </a:r>
             <a:r>
               <a:rPr lang="en-US" sz="1800" dirty="0" err="1">
+                <a:solidFill>
+                  <a:schemeClr val="bg1"/>
+                </a:solidFill>
                 <a:effectLst/>
                 <a:latin typeface="SutonnyMJ" pitchFamily="2" charset="0"/>
                 <a:ea typeface="Calibri" panose="020F0502020204030204" pitchFamily="34" charset="0"/>
@@ -12007,6 +12816,9 @@
             </a:r>
             <a:r>
               <a:rPr lang="en-US" sz="1800" dirty="0">
+                <a:solidFill>
+                  <a:schemeClr val="bg1"/>
+                </a:solidFill>
                 <a:effectLst/>
                 <a:latin typeface="SutonnyMJ" pitchFamily="2" charset="0"/>
                 <a:ea typeface="Calibri" panose="020F0502020204030204" pitchFamily="34" charset="0"/>
@@ -12016,6 +12828,9 @@
             </a:r>
             <a:r>
               <a:rPr lang="en-US" sz="1800" dirty="0" err="1">
+                <a:solidFill>
+                  <a:schemeClr val="bg1"/>
+                </a:solidFill>
                 <a:effectLst/>
                 <a:latin typeface="SutonnyMJ" pitchFamily="2" charset="0"/>
                 <a:ea typeface="Calibri" panose="020F0502020204030204" pitchFamily="34" charset="0"/>
@@ -12025,15 +12840,21 @@
             </a:r>
             <a:r>
               <a:rPr lang="en-US" sz="1800" dirty="0">
-                <a:effectLst/>
-                <a:latin typeface="SutonnyMJ" pitchFamily="2" charset="0"/>
-                <a:ea typeface="Calibri" panose="020F0502020204030204" pitchFamily="34" charset="0"/>
-                <a:cs typeface="Vrinda" panose="020B0502040204020203" pitchFamily="34" charset="0"/>
-              </a:rPr>
-              <a:t> </a:t>
-            </a:r>
-            <a:r>
-              <a:rPr lang="en-US" sz="1800" dirty="0" err="1">
+                <a:solidFill>
+                  <a:schemeClr val="bg1"/>
+                </a:solidFill>
+                <a:effectLst/>
+                <a:latin typeface="SutonnyMJ" pitchFamily="2" charset="0"/>
+                <a:ea typeface="Calibri" panose="020F0502020204030204" pitchFamily="34" charset="0"/>
+                <a:cs typeface="Vrinda" panose="020B0502040204020203" pitchFamily="34" charset="0"/>
+              </a:rPr>
+              <a:t> </a:t>
+            </a:r>
+            <a:r>
+              <a:rPr lang="en-US" sz="1800" dirty="0" err="1">
+                <a:solidFill>
+                  <a:schemeClr val="bg1"/>
+                </a:solidFill>
                 <a:effectLst/>
                 <a:latin typeface="SutonnyOMJ" panose="01010600010101010101" pitchFamily="2" charset="0"/>
                 <a:ea typeface="Calibri" panose="020F0502020204030204" pitchFamily="34" charset="0"/>
@@ -12042,6 +12863,9 @@
               <a:t>সিস্টেম</a:t>
             </a:r>
             <a:endParaRPr lang="en-US" sz="1800" dirty="0">
+              <a:solidFill>
+                <a:schemeClr val="bg1"/>
+              </a:solidFill>
               <a:effectLst/>
               <a:latin typeface="SutonnyMJ" pitchFamily="2" charset="0"/>
               <a:ea typeface="Calibri" panose="020F0502020204030204" pitchFamily="34" charset="0"/>
@@ -12049,7 +12873,7 @@
             </a:endParaRPr>
           </a:p>
           <a:p>
-            <a:pPr marL="0" marR="0" algn="just">
+            <a:pPr marL="0" marR="0" indent="0" algn="just">
               <a:lnSpc>
                 <a:spcPct val="107000"/>
               </a:lnSpc>
@@ -12059,9 +12883,13 @@
               <a:spcAft>
                 <a:spcPts val="800"/>
               </a:spcAft>
+              <a:buNone/>
             </a:pPr>
             <a:r>
               <a:rPr lang="en-US" sz="1800" dirty="0">
+                <a:solidFill>
+                  <a:schemeClr val="bg1"/>
+                </a:solidFill>
                 <a:effectLst/>
                 <a:latin typeface="SutonnyMJ" pitchFamily="2" charset="0"/>
                 <a:ea typeface="Calibri" panose="020F0502020204030204" pitchFamily="34" charset="0"/>
@@ -12071,6 +12899,9 @@
             </a:r>
             <a:r>
               <a:rPr lang="en-US" sz="1800" dirty="0" err="1">
+                <a:solidFill>
+                  <a:schemeClr val="bg1"/>
+                </a:solidFill>
                 <a:effectLst/>
                 <a:latin typeface="SutonnyMJ" pitchFamily="2" charset="0"/>
                 <a:ea typeface="Calibri" panose="020F0502020204030204" pitchFamily="34" charset="0"/>
@@ -12080,15 +12911,21 @@
             </a:r>
             <a:r>
               <a:rPr lang="en-US" sz="1800" dirty="0">
-                <a:effectLst/>
-                <a:latin typeface="SutonnyMJ" pitchFamily="2" charset="0"/>
-                <a:ea typeface="Calibri" panose="020F0502020204030204" pitchFamily="34" charset="0"/>
-                <a:cs typeface="Vrinda" panose="020B0502040204020203" pitchFamily="34" charset="0"/>
-              </a:rPr>
-              <a:t> </a:t>
-            </a:r>
-            <a:r>
-              <a:rPr lang="en-US" sz="1800" dirty="0" err="1">
+                <a:solidFill>
+                  <a:schemeClr val="bg1"/>
+                </a:solidFill>
+                <a:effectLst/>
+                <a:latin typeface="SutonnyMJ" pitchFamily="2" charset="0"/>
+                <a:ea typeface="Calibri" panose="020F0502020204030204" pitchFamily="34" charset="0"/>
+                <a:cs typeface="Vrinda" panose="020B0502040204020203" pitchFamily="34" charset="0"/>
+              </a:rPr>
+              <a:t> </a:t>
+            </a:r>
+            <a:r>
+              <a:rPr lang="en-US" sz="1800" dirty="0" err="1">
+                <a:solidFill>
+                  <a:schemeClr val="bg1"/>
+                </a:solidFill>
                 <a:effectLst/>
                 <a:latin typeface="SutonnyMJ" pitchFamily="2" charset="0"/>
                 <a:ea typeface="Calibri" panose="020F0502020204030204" pitchFamily="34" charset="0"/>
@@ -12098,15 +12935,21 @@
             </a:r>
             <a:r>
               <a:rPr lang="en-US" sz="1800" dirty="0">
-                <a:effectLst/>
-                <a:latin typeface="SutonnyMJ" pitchFamily="2" charset="0"/>
-                <a:ea typeface="Calibri" panose="020F0502020204030204" pitchFamily="34" charset="0"/>
-                <a:cs typeface="Vrinda" panose="020B0502040204020203" pitchFamily="34" charset="0"/>
-              </a:rPr>
-              <a:t> </a:t>
-            </a:r>
-            <a:r>
-              <a:rPr lang="en-US" sz="1800" dirty="0" err="1">
+                <a:solidFill>
+                  <a:schemeClr val="bg1"/>
+                </a:solidFill>
+                <a:effectLst/>
+                <a:latin typeface="SutonnyMJ" pitchFamily="2" charset="0"/>
+                <a:ea typeface="Calibri" panose="020F0502020204030204" pitchFamily="34" charset="0"/>
+                <a:cs typeface="Vrinda" panose="020B0502040204020203" pitchFamily="34" charset="0"/>
+              </a:rPr>
+              <a:t> </a:t>
+            </a:r>
+            <a:r>
+              <a:rPr lang="en-US" sz="1800" dirty="0" err="1">
+                <a:solidFill>
+                  <a:schemeClr val="bg1"/>
+                </a:solidFill>
                 <a:effectLst/>
                 <a:latin typeface="SutonnyOMJ" panose="01010600010101010101" pitchFamily="2" charset="0"/>
                 <a:ea typeface="Calibri" panose="020F0502020204030204" pitchFamily="34" charset="0"/>
@@ -12116,6 +12959,9 @@
             </a:r>
             <a:r>
               <a:rPr lang="en-US" sz="1800" dirty="0">
+                <a:solidFill>
+                  <a:schemeClr val="bg1"/>
+                </a:solidFill>
                 <a:effectLst/>
                 <a:latin typeface="SutonnyMJ" pitchFamily="2" charset="0"/>
                 <a:ea typeface="Calibri" panose="020F0502020204030204" pitchFamily="34" charset="0"/>
@@ -12125,6 +12971,9 @@
             </a:r>
             <a:r>
               <a:rPr lang="en-US" sz="1800" dirty="0" err="1">
+                <a:solidFill>
+                  <a:schemeClr val="bg1"/>
+                </a:solidFill>
                 <a:effectLst/>
                 <a:latin typeface="SutonnyMJ" pitchFamily="2" charset="0"/>
                 <a:ea typeface="Calibri" panose="020F0502020204030204" pitchFamily="34" charset="0"/>
@@ -12134,6 +12983,9 @@
             </a:r>
             <a:r>
               <a:rPr lang="en-US" sz="1800" dirty="0">
+                <a:solidFill>
+                  <a:schemeClr val="bg1"/>
+                </a:solidFill>
                 <a:effectLst/>
                 <a:latin typeface="SutonnyMJ" pitchFamily="2" charset="0"/>
                 <a:ea typeface="Calibri" panose="020F0502020204030204" pitchFamily="34" charset="0"/>
@@ -12143,6 +12995,9 @@
             </a:r>
             <a:r>
               <a:rPr lang="en-US" sz="1800" dirty="0" err="1">
+                <a:solidFill>
+                  <a:schemeClr val="bg1"/>
+                </a:solidFill>
                 <a:effectLst/>
                 <a:latin typeface="SutonnyMJ" pitchFamily="2" charset="0"/>
                 <a:ea typeface="Calibri" panose="020F0502020204030204" pitchFamily="34" charset="0"/>
@@ -12152,6 +13007,9 @@
             </a:r>
             <a:r>
               <a:rPr lang="en-US" sz="1800" dirty="0">
+                <a:solidFill>
+                  <a:schemeClr val="bg1"/>
+                </a:solidFill>
                 <a:effectLst/>
                 <a:latin typeface="SutonnyMJ" pitchFamily="2" charset="0"/>
                 <a:ea typeface="Calibri" panose="020F0502020204030204" pitchFamily="34" charset="0"/>
@@ -12161,6 +13019,9 @@
             </a:r>
             <a:r>
               <a:rPr lang="en-US" sz="1800" dirty="0" err="1">
+                <a:solidFill>
+                  <a:schemeClr val="bg1"/>
+                </a:solidFill>
                 <a:effectLst/>
                 <a:latin typeface="SutonnyMJ" pitchFamily="2" charset="0"/>
                 <a:ea typeface="Calibri" panose="020F0502020204030204" pitchFamily="34" charset="0"/>
@@ -12170,6 +13031,9 @@
             </a:r>
             <a:r>
               <a:rPr lang="en-US" sz="1800" dirty="0">
+                <a:solidFill>
+                  <a:schemeClr val="bg1"/>
+                </a:solidFill>
                 <a:effectLst/>
                 <a:latin typeface="SutonnyMJ" pitchFamily="2" charset="0"/>
                 <a:ea typeface="Calibri" panose="020F0502020204030204" pitchFamily="34" charset="0"/>
@@ -12179,6 +13043,9 @@
             </a:r>
             <a:r>
               <a:rPr lang="en-US" sz="1800" dirty="0" err="1">
+                <a:solidFill>
+                  <a:schemeClr val="bg1"/>
+                </a:solidFill>
                 <a:effectLst/>
                 <a:latin typeface="SutonnyOMJ" panose="01010600010101010101" pitchFamily="2" charset="0"/>
                 <a:ea typeface="Calibri" panose="020F0502020204030204" pitchFamily="34" charset="0"/>
@@ -12187,6 +13054,9 @@
               <a:t>ব্যতিক্রম</a:t>
             </a:r>
             <a:endParaRPr lang="en-US" sz="1800" dirty="0">
+              <a:solidFill>
+                <a:schemeClr val="bg1"/>
+              </a:solidFill>
               <a:effectLst/>
               <a:latin typeface="Calibri" panose="020F0502020204030204" pitchFamily="34" charset="0"/>
               <a:ea typeface="Calibri" panose="020F0502020204030204" pitchFamily="34" charset="0"/>
@@ -12194,7 +13064,7 @@
             </a:endParaRPr>
           </a:p>
           <a:p>
-            <a:pPr marL="0" marR="0" algn="just">
+            <a:pPr marL="0" marR="0" indent="0" algn="just">
               <a:lnSpc>
                 <a:spcPct val="107000"/>
               </a:lnSpc>
@@ -12204,9 +13074,13 @@
               <a:spcAft>
                 <a:spcPts val="800"/>
               </a:spcAft>
+              <a:buNone/>
             </a:pPr>
             <a:r>
               <a:rPr lang="en-US" sz="1800" dirty="0">
+                <a:solidFill>
+                  <a:schemeClr val="bg1"/>
+                </a:solidFill>
                 <a:effectLst/>
                 <a:latin typeface="SutonnyMJ" pitchFamily="2" charset="0"/>
                 <a:ea typeface="Calibri" panose="020F0502020204030204" pitchFamily="34" charset="0"/>
@@ -12216,6 +13090,9 @@
             </a:r>
             <a:r>
               <a:rPr lang="en-US" sz="1800" dirty="0" err="1">
+                <a:solidFill>
+                  <a:schemeClr val="bg1"/>
+                </a:solidFill>
                 <a:effectLst/>
                 <a:latin typeface="SutonnyMJ" pitchFamily="2" charset="0"/>
                 <a:ea typeface="Calibri" panose="020F0502020204030204" pitchFamily="34" charset="0"/>
@@ -12225,15 +13102,21 @@
             </a:r>
             <a:r>
               <a:rPr lang="en-US" sz="1800" dirty="0">
-                <a:effectLst/>
-                <a:latin typeface="SutonnyMJ" pitchFamily="2" charset="0"/>
-                <a:ea typeface="Calibri" panose="020F0502020204030204" pitchFamily="34" charset="0"/>
-                <a:cs typeface="Vrinda" panose="020B0502040204020203" pitchFamily="34" charset="0"/>
-              </a:rPr>
-              <a:t> </a:t>
-            </a:r>
-            <a:r>
-              <a:rPr lang="en-US" sz="1800" dirty="0" err="1">
+                <a:solidFill>
+                  <a:schemeClr val="bg1"/>
+                </a:solidFill>
+                <a:effectLst/>
+                <a:latin typeface="SutonnyMJ" pitchFamily="2" charset="0"/>
+                <a:ea typeface="Calibri" panose="020F0502020204030204" pitchFamily="34" charset="0"/>
+                <a:cs typeface="Vrinda" panose="020B0502040204020203" pitchFamily="34" charset="0"/>
+              </a:rPr>
+              <a:t> </a:t>
+            </a:r>
+            <a:r>
+              <a:rPr lang="en-US" sz="1800" dirty="0" err="1">
+                <a:solidFill>
+                  <a:schemeClr val="bg1"/>
+                </a:solidFill>
                 <a:effectLst/>
                 <a:latin typeface="SutonnyOMJ" panose="01010600010101010101" pitchFamily="2" charset="0"/>
                 <a:ea typeface="Calibri" panose="020F0502020204030204" pitchFamily="34" charset="0"/>
@@ -12243,15 +13126,21 @@
             </a:r>
             <a:r>
               <a:rPr lang="en-US" sz="1800" dirty="0">
-                <a:effectLst/>
-                <a:latin typeface="SutonnyMJ" pitchFamily="2" charset="0"/>
-                <a:ea typeface="Calibri" panose="020F0502020204030204" pitchFamily="34" charset="0"/>
-                <a:cs typeface="Vrinda" panose="020B0502040204020203" pitchFamily="34" charset="0"/>
-              </a:rPr>
-              <a:t> </a:t>
-            </a:r>
-            <a:r>
-              <a:rPr lang="en-US" sz="1800" dirty="0" err="1">
+                <a:solidFill>
+                  <a:schemeClr val="bg1"/>
+                </a:solidFill>
+                <a:effectLst/>
+                <a:latin typeface="SutonnyMJ" pitchFamily="2" charset="0"/>
+                <a:ea typeface="Calibri" panose="020F0502020204030204" pitchFamily="34" charset="0"/>
+                <a:cs typeface="Vrinda" panose="020B0502040204020203" pitchFamily="34" charset="0"/>
+              </a:rPr>
+              <a:t> </a:t>
+            </a:r>
+            <a:r>
+              <a:rPr lang="en-US" sz="1800" dirty="0" err="1">
+                <a:solidFill>
+                  <a:schemeClr val="bg1"/>
+                </a:solidFill>
                 <a:effectLst/>
                 <a:latin typeface="SutonnyMJ" pitchFamily="2" charset="0"/>
                 <a:ea typeface="Calibri" panose="020F0502020204030204" pitchFamily="34" charset="0"/>
@@ -12261,15 +13150,21 @@
             </a:r>
             <a:r>
               <a:rPr lang="en-US" sz="1800" dirty="0">
-                <a:effectLst/>
-                <a:latin typeface="SutonnyMJ" pitchFamily="2" charset="0"/>
-                <a:ea typeface="Calibri" panose="020F0502020204030204" pitchFamily="34" charset="0"/>
-                <a:cs typeface="Vrinda" panose="020B0502040204020203" pitchFamily="34" charset="0"/>
-              </a:rPr>
-              <a:t> </a:t>
-            </a:r>
-            <a:r>
-              <a:rPr lang="en-US" sz="1800" dirty="0" err="1">
+                <a:solidFill>
+                  <a:schemeClr val="bg1"/>
+                </a:solidFill>
+                <a:effectLst/>
+                <a:latin typeface="SutonnyMJ" pitchFamily="2" charset="0"/>
+                <a:ea typeface="Calibri" panose="020F0502020204030204" pitchFamily="34" charset="0"/>
+                <a:cs typeface="Vrinda" panose="020B0502040204020203" pitchFamily="34" charset="0"/>
+              </a:rPr>
+              <a:t> </a:t>
+            </a:r>
+            <a:r>
+              <a:rPr lang="en-US" sz="1800" dirty="0" err="1">
+                <a:solidFill>
+                  <a:schemeClr val="bg1"/>
+                </a:solidFill>
                 <a:effectLst/>
                 <a:latin typeface="SutonnyMJ" pitchFamily="2" charset="0"/>
                 <a:ea typeface="Calibri" panose="020F0502020204030204" pitchFamily="34" charset="0"/>
@@ -12279,6 +13174,9 @@
             </a:r>
             <a:r>
               <a:rPr lang="en-US" sz="1800" dirty="0">
+                <a:solidFill>
+                  <a:schemeClr val="bg1"/>
+                </a:solidFill>
                 <a:effectLst/>
                 <a:latin typeface="SutonnyMJ" pitchFamily="2" charset="0"/>
                 <a:ea typeface="Calibri" panose="020F0502020204030204" pitchFamily="34" charset="0"/>
@@ -12288,6 +13186,9 @@
             </a:r>
             <a:r>
               <a:rPr lang="en-US" sz="1800" dirty="0" err="1">
+                <a:solidFill>
+                  <a:schemeClr val="bg1"/>
+                </a:solidFill>
                 <a:effectLst/>
                 <a:latin typeface="SutonnyMJ" pitchFamily="2" charset="0"/>
                 <a:ea typeface="Calibri" panose="020F0502020204030204" pitchFamily="34" charset="0"/>
@@ -12297,6 +13198,9 @@
             </a:r>
             <a:r>
               <a:rPr lang="en-US" sz="1800" dirty="0">
+                <a:solidFill>
+                  <a:schemeClr val="bg1"/>
+                </a:solidFill>
                 <a:effectLst/>
                 <a:latin typeface="SutonnyMJ" pitchFamily="2" charset="0"/>
                 <a:ea typeface="Calibri" panose="020F0502020204030204" pitchFamily="34" charset="0"/>
@@ -12306,6 +13210,9 @@
             </a:r>
             <a:r>
               <a:rPr lang="en-US" sz="1800" dirty="0" err="1">
+                <a:solidFill>
+                  <a:schemeClr val="bg1"/>
+                </a:solidFill>
                 <a:effectLst/>
                 <a:latin typeface="SutonnyMJ" pitchFamily="2" charset="0"/>
                 <a:ea typeface="Calibri" panose="020F0502020204030204" pitchFamily="34" charset="0"/>
@@ -12315,15 +13222,21 @@
             </a:r>
             <a:r>
               <a:rPr lang="en-US" sz="1800" dirty="0">
-                <a:effectLst/>
-                <a:latin typeface="SutonnyMJ" pitchFamily="2" charset="0"/>
-                <a:ea typeface="Calibri" panose="020F0502020204030204" pitchFamily="34" charset="0"/>
-                <a:cs typeface="Vrinda" panose="020B0502040204020203" pitchFamily="34" charset="0"/>
-              </a:rPr>
-              <a:t> </a:t>
-            </a:r>
-            <a:r>
-              <a:rPr lang="en-US" sz="1800" dirty="0" err="1">
+                <a:solidFill>
+                  <a:schemeClr val="bg1"/>
+                </a:solidFill>
+                <a:effectLst/>
+                <a:latin typeface="SutonnyMJ" pitchFamily="2" charset="0"/>
+                <a:ea typeface="Calibri" panose="020F0502020204030204" pitchFamily="34" charset="0"/>
+                <a:cs typeface="Vrinda" panose="020B0502040204020203" pitchFamily="34" charset="0"/>
+              </a:rPr>
+              <a:t> </a:t>
+            </a:r>
+            <a:r>
+              <a:rPr lang="en-US" sz="1800" dirty="0" err="1">
+                <a:solidFill>
+                  <a:schemeClr val="bg1"/>
+                </a:solidFill>
                 <a:effectLst/>
                 <a:latin typeface="SutonnyOMJ" panose="01010600010101010101" pitchFamily="2" charset="0"/>
                 <a:ea typeface="Calibri" panose="020F0502020204030204" pitchFamily="34" charset="0"/>
@@ -12332,6 +13245,9 @@
               <a:t>পদ্ধতি</a:t>
             </a:r>
             <a:endParaRPr lang="en-US" sz="1800" dirty="0">
+              <a:solidFill>
+                <a:schemeClr val="bg1"/>
+              </a:solidFill>
               <a:effectLst/>
               <a:latin typeface="Calibri" panose="020F0502020204030204" pitchFamily="34" charset="0"/>
               <a:ea typeface="Calibri" panose="020F0502020204030204" pitchFamily="34" charset="0"/>
@@ -12339,7 +13255,7 @@
             </a:endParaRPr>
           </a:p>
           <a:p>
-            <a:pPr marL="0" marR="0" algn="just">
+            <a:pPr marL="0" marR="0" indent="0" algn="just">
               <a:lnSpc>
                 <a:spcPct val="107000"/>
               </a:lnSpc>
@@ -12349,9 +13265,13 @@
               <a:spcAft>
                 <a:spcPts val="800"/>
               </a:spcAft>
+              <a:buNone/>
             </a:pPr>
             <a:r>
               <a:rPr lang="en-US" sz="1800" dirty="0">
+                <a:solidFill>
+                  <a:schemeClr val="bg1"/>
+                </a:solidFill>
                 <a:effectLst/>
                 <a:latin typeface="SutonnyMJ" pitchFamily="2" charset="0"/>
                 <a:ea typeface="Calibri" panose="020F0502020204030204" pitchFamily="34" charset="0"/>
@@ -12361,6 +13281,9 @@
             </a:r>
             <a:r>
               <a:rPr lang="en-US" sz="1800" dirty="0" err="1">
+                <a:solidFill>
+                  <a:schemeClr val="bg1"/>
+                </a:solidFill>
                 <a:effectLst/>
                 <a:latin typeface="SutonnyMJ" pitchFamily="2" charset="0"/>
                 <a:ea typeface="Calibri" panose="020F0502020204030204" pitchFamily="34" charset="0"/>
@@ -12370,6 +13293,9 @@
             </a:r>
             <a:r>
               <a:rPr lang="en-US" sz="1800" dirty="0">
+                <a:solidFill>
+                  <a:schemeClr val="bg1"/>
+                </a:solidFill>
                 <a:effectLst/>
                 <a:latin typeface="SutonnyMJ" pitchFamily="2" charset="0"/>
                 <a:ea typeface="Calibri" panose="020F0502020204030204" pitchFamily="34" charset="0"/>
@@ -12379,6 +13305,9 @@
             </a:r>
             <a:r>
               <a:rPr lang="en-US" sz="1800" dirty="0" err="1">
+                <a:solidFill>
+                  <a:schemeClr val="bg1"/>
+                </a:solidFill>
                 <a:effectLst/>
                 <a:latin typeface="SutonnyMJ" pitchFamily="2" charset="0"/>
                 <a:ea typeface="Calibri" panose="020F0502020204030204" pitchFamily="34" charset="0"/>
@@ -12388,15 +13317,21 @@
             </a:r>
             <a:r>
               <a:rPr lang="en-US" sz="1800" dirty="0">
-                <a:effectLst/>
-                <a:latin typeface="SutonnyMJ" pitchFamily="2" charset="0"/>
-                <a:ea typeface="Calibri" panose="020F0502020204030204" pitchFamily="34" charset="0"/>
-                <a:cs typeface="Vrinda" panose="020B0502040204020203" pitchFamily="34" charset="0"/>
-              </a:rPr>
-              <a:t> </a:t>
-            </a:r>
-            <a:r>
-              <a:rPr lang="en-US" sz="1800" dirty="0" err="1">
+                <a:solidFill>
+                  <a:schemeClr val="bg1"/>
+                </a:solidFill>
+                <a:effectLst/>
+                <a:latin typeface="SutonnyMJ" pitchFamily="2" charset="0"/>
+                <a:ea typeface="Calibri" panose="020F0502020204030204" pitchFamily="34" charset="0"/>
+                <a:cs typeface="Vrinda" panose="020B0502040204020203" pitchFamily="34" charset="0"/>
+              </a:rPr>
+              <a:t> </a:t>
+            </a:r>
+            <a:r>
+              <a:rPr lang="en-US" sz="1800" dirty="0" err="1">
+                <a:solidFill>
+                  <a:schemeClr val="bg1"/>
+                </a:solidFill>
                 <a:effectLst/>
                 <a:latin typeface="SutonnyOMJ" panose="01010600010101010101" pitchFamily="2" charset="0"/>
                 <a:ea typeface="Calibri" panose="020F0502020204030204" pitchFamily="34" charset="0"/>
@@ -12406,15 +13341,21 @@
             </a:r>
             <a:r>
               <a:rPr lang="en-US" sz="1800" dirty="0">
-                <a:effectLst/>
-                <a:latin typeface="SutonnyMJ" pitchFamily="2" charset="0"/>
-                <a:ea typeface="Calibri" panose="020F0502020204030204" pitchFamily="34" charset="0"/>
-                <a:cs typeface="Vrinda" panose="020B0502040204020203" pitchFamily="34" charset="0"/>
-              </a:rPr>
-              <a:t> </a:t>
-            </a:r>
-            <a:r>
-              <a:rPr lang="en-US" sz="1800" dirty="0" err="1">
+                <a:solidFill>
+                  <a:schemeClr val="bg1"/>
+                </a:solidFill>
+                <a:effectLst/>
+                <a:latin typeface="SutonnyMJ" pitchFamily="2" charset="0"/>
+                <a:ea typeface="Calibri" panose="020F0502020204030204" pitchFamily="34" charset="0"/>
+                <a:cs typeface="Vrinda" panose="020B0502040204020203" pitchFamily="34" charset="0"/>
+              </a:rPr>
+              <a:t> </a:t>
+            </a:r>
+            <a:r>
+              <a:rPr lang="en-US" sz="1800" dirty="0" err="1">
+                <a:solidFill>
+                  <a:schemeClr val="bg1"/>
+                </a:solidFill>
                 <a:effectLst/>
                 <a:latin typeface="SutonnyMJ" pitchFamily="2" charset="0"/>
                 <a:ea typeface="Calibri" panose="020F0502020204030204" pitchFamily="34" charset="0"/>
@@ -12424,15 +13365,21 @@
             </a:r>
             <a:r>
               <a:rPr lang="en-US" sz="1800" dirty="0">
-                <a:effectLst/>
-                <a:latin typeface="SutonnyMJ" pitchFamily="2" charset="0"/>
-                <a:ea typeface="Calibri" panose="020F0502020204030204" pitchFamily="34" charset="0"/>
-                <a:cs typeface="Vrinda" panose="020B0502040204020203" pitchFamily="34" charset="0"/>
-              </a:rPr>
-              <a:t> </a:t>
-            </a:r>
-            <a:r>
-              <a:rPr lang="en-US" sz="1800" dirty="0" err="1">
+                <a:solidFill>
+                  <a:schemeClr val="bg1"/>
+                </a:solidFill>
+                <a:effectLst/>
+                <a:latin typeface="SutonnyMJ" pitchFamily="2" charset="0"/>
+                <a:ea typeface="Calibri" panose="020F0502020204030204" pitchFamily="34" charset="0"/>
+                <a:cs typeface="Vrinda" panose="020B0502040204020203" pitchFamily="34" charset="0"/>
+              </a:rPr>
+              <a:t> </a:t>
+            </a:r>
+            <a:r>
+              <a:rPr lang="en-US" sz="1800" dirty="0" err="1">
+                <a:solidFill>
+                  <a:schemeClr val="bg1"/>
+                </a:solidFill>
                 <a:effectLst/>
                 <a:latin typeface="SutonnyMJ" pitchFamily="2" charset="0"/>
                 <a:ea typeface="Calibri" panose="020F0502020204030204" pitchFamily="34" charset="0"/>
@@ -12441,6 +13388,9 @@
               <a:t>myweav</a:t>
             </a:r>
             <a:endParaRPr lang="en-US" sz="1800" dirty="0">
+              <a:solidFill>
+                <a:schemeClr val="bg1"/>
+              </a:solidFill>
               <a:effectLst/>
               <a:latin typeface="Calibri" panose="020F0502020204030204" pitchFamily="34" charset="0"/>
               <a:ea typeface="Calibri" panose="020F0502020204030204" pitchFamily="34" charset="0"/>
@@ -12448,7 +13398,7 @@
             </a:endParaRPr>
           </a:p>
           <a:p>
-            <a:pPr marL="0" marR="0" algn="just">
+            <a:pPr marL="0" marR="0" indent="0" algn="just">
               <a:lnSpc>
                 <a:spcPct val="107000"/>
               </a:lnSpc>
@@ -12458,9 +13408,13 @@
               <a:spcAft>
                 <a:spcPts val="800"/>
               </a:spcAft>
+              <a:buNone/>
             </a:pPr>
             <a:r>
               <a:rPr lang="en-US" sz="1800" dirty="0">
+                <a:solidFill>
+                  <a:schemeClr val="bg1"/>
+                </a:solidFill>
                 <a:effectLst/>
                 <a:latin typeface="SutonnyMJ" pitchFamily="2" charset="0"/>
                 <a:ea typeface="Calibri" panose="020F0502020204030204" pitchFamily="34" charset="0"/>
@@ -12470,6 +13424,9 @@
             </a:r>
             <a:r>
               <a:rPr lang="en-US" sz="1800" dirty="0" err="1">
+                <a:solidFill>
+                  <a:schemeClr val="bg1"/>
+                </a:solidFill>
                 <a:effectLst/>
                 <a:latin typeface="SutonnyMJ" pitchFamily="2" charset="0"/>
                 <a:ea typeface="Calibri" panose="020F0502020204030204" pitchFamily="34" charset="0"/>
@@ -12479,6 +13436,9 @@
             </a:r>
             <a:r>
               <a:rPr lang="en-US" sz="1800" dirty="0">
+                <a:solidFill>
+                  <a:schemeClr val="bg1"/>
+                </a:solidFill>
                 <a:effectLst/>
                 <a:latin typeface="SutonnyMJ" pitchFamily="2" charset="0"/>
                 <a:ea typeface="Calibri" panose="020F0502020204030204" pitchFamily="34" charset="0"/>
@@ -12488,6 +13448,9 @@
             </a:r>
             <a:r>
               <a:rPr lang="en-US" sz="1800" dirty="0" err="1">
+                <a:solidFill>
+                  <a:schemeClr val="bg1"/>
+                </a:solidFill>
                 <a:effectLst/>
                 <a:latin typeface="SutonnyMJ" pitchFamily="2" charset="0"/>
                 <a:ea typeface="Calibri" panose="020F0502020204030204" pitchFamily="34" charset="0"/>
@@ -12497,15 +13460,21 @@
             </a:r>
             <a:r>
               <a:rPr lang="en-US" sz="1800" dirty="0">
-                <a:effectLst/>
-                <a:latin typeface="SutonnyMJ" pitchFamily="2" charset="0"/>
-                <a:ea typeface="Calibri" panose="020F0502020204030204" pitchFamily="34" charset="0"/>
-                <a:cs typeface="Vrinda" panose="020B0502040204020203" pitchFamily="34" charset="0"/>
-              </a:rPr>
-              <a:t> </a:t>
-            </a:r>
-            <a:r>
-              <a:rPr lang="en-US" sz="1800" dirty="0" err="1">
+                <a:solidFill>
+                  <a:schemeClr val="bg1"/>
+                </a:solidFill>
+                <a:effectLst/>
+                <a:latin typeface="SutonnyMJ" pitchFamily="2" charset="0"/>
+                <a:ea typeface="Calibri" panose="020F0502020204030204" pitchFamily="34" charset="0"/>
+                <a:cs typeface="Vrinda" panose="020B0502040204020203" pitchFamily="34" charset="0"/>
+              </a:rPr>
+              <a:t> </a:t>
+            </a:r>
+            <a:r>
+              <a:rPr lang="en-US" sz="1800" dirty="0" err="1">
+                <a:solidFill>
+                  <a:schemeClr val="bg1"/>
+                </a:solidFill>
                 <a:effectLst/>
                 <a:latin typeface="SutonnyOMJ" panose="01010600010101010101" pitchFamily="2" charset="0"/>
                 <a:ea typeface="Calibri" panose="020F0502020204030204" pitchFamily="34" charset="0"/>
@@ -12515,15 +13484,21 @@
             </a:r>
             <a:r>
               <a:rPr lang="en-US" sz="1800" dirty="0">
-                <a:effectLst/>
-                <a:latin typeface="SutonnyMJ" pitchFamily="2" charset="0"/>
-                <a:ea typeface="Calibri" panose="020F0502020204030204" pitchFamily="34" charset="0"/>
-                <a:cs typeface="Vrinda" panose="020B0502040204020203" pitchFamily="34" charset="0"/>
-              </a:rPr>
-              <a:t> </a:t>
-            </a:r>
-            <a:r>
-              <a:rPr lang="en-US" sz="1800" dirty="0" err="1">
+                <a:solidFill>
+                  <a:schemeClr val="bg1"/>
+                </a:solidFill>
+                <a:effectLst/>
+                <a:latin typeface="SutonnyMJ" pitchFamily="2" charset="0"/>
+                <a:ea typeface="Calibri" panose="020F0502020204030204" pitchFamily="34" charset="0"/>
+                <a:cs typeface="Vrinda" panose="020B0502040204020203" pitchFamily="34" charset="0"/>
+              </a:rPr>
+              <a:t> </a:t>
+            </a:r>
+            <a:r>
+              <a:rPr lang="en-US" sz="1800" dirty="0" err="1">
+                <a:solidFill>
+                  <a:schemeClr val="bg1"/>
+                </a:solidFill>
                 <a:effectLst/>
                 <a:latin typeface="SutonnyMJ" pitchFamily="2" charset="0"/>
                 <a:ea typeface="Calibri" panose="020F0502020204030204" pitchFamily="34" charset="0"/>
@@ -12532,6 +13507,9 @@
               <a:t>bvB</a:t>
             </a:r>
             <a:endParaRPr lang="en-US" sz="1800" dirty="0">
+              <a:solidFill>
+                <a:schemeClr val="bg1"/>
+              </a:solidFill>
               <a:effectLst/>
               <a:latin typeface="Calibri" panose="020F0502020204030204" pitchFamily="34" charset="0"/>
               <a:ea typeface="Calibri" panose="020F0502020204030204" pitchFamily="34" charset="0"/>
@@ -12539,8 +13517,14 @@
             </a:endParaRPr>
           </a:p>
           <a:p>
-            <a:r>
-              <a:rPr lang="en-US" sz="1800" dirty="0">
+            <a:pPr marL="0" indent="0">
+              <a:buNone/>
+            </a:pPr>
+            <a:r>
+              <a:rPr lang="en-US" sz="1800" dirty="0">
+                <a:solidFill>
+                  <a:schemeClr val="bg1"/>
+                </a:solidFill>
                 <a:effectLst/>
                 <a:latin typeface="SutonnyMJ" pitchFamily="2" charset="0"/>
                 <a:ea typeface="Calibri" panose="020F0502020204030204" pitchFamily="34" charset="0"/>
@@ -12550,6 +13534,9 @@
             </a:r>
             <a:r>
               <a:rPr lang="en-US" sz="1800" dirty="0" err="1">
+                <a:solidFill>
+                  <a:schemeClr val="bg1"/>
+                </a:solidFill>
                 <a:effectLst/>
                 <a:latin typeface="SutonnyMJ" pitchFamily="2" charset="0"/>
                 <a:ea typeface="Calibri" panose="020F0502020204030204" pitchFamily="34" charset="0"/>
@@ -12559,15 +13546,21 @@
             </a:r>
             <a:r>
               <a:rPr lang="en-US" sz="1800" dirty="0">
-                <a:effectLst/>
-                <a:latin typeface="SutonnyMJ" pitchFamily="2" charset="0"/>
-                <a:ea typeface="Calibri" panose="020F0502020204030204" pitchFamily="34" charset="0"/>
-                <a:cs typeface="Vrinda" panose="020B0502040204020203" pitchFamily="34" charset="0"/>
-              </a:rPr>
-              <a:t> </a:t>
-            </a:r>
-            <a:r>
-              <a:rPr lang="en-US" sz="1800" dirty="0" err="1">
+                <a:solidFill>
+                  <a:schemeClr val="bg1"/>
+                </a:solidFill>
+                <a:effectLst/>
+                <a:latin typeface="SutonnyMJ" pitchFamily="2" charset="0"/>
+                <a:ea typeface="Calibri" panose="020F0502020204030204" pitchFamily="34" charset="0"/>
+                <a:cs typeface="Vrinda" panose="020B0502040204020203" pitchFamily="34" charset="0"/>
+              </a:rPr>
+              <a:t> </a:t>
+            </a:r>
+            <a:r>
+              <a:rPr lang="en-US" sz="1800" dirty="0" err="1">
+                <a:solidFill>
+                  <a:schemeClr val="bg1"/>
+                </a:solidFill>
                 <a:effectLst/>
                 <a:latin typeface="SutonnyMJ" pitchFamily="2" charset="0"/>
                 <a:ea typeface="Calibri" panose="020F0502020204030204" pitchFamily="34" charset="0"/>
@@ -12577,15 +13570,21 @@
             </a:r>
             <a:r>
               <a:rPr lang="en-US" sz="1800" dirty="0">
-                <a:effectLst/>
-                <a:latin typeface="SutonnyMJ" pitchFamily="2" charset="0"/>
-                <a:ea typeface="Calibri" panose="020F0502020204030204" pitchFamily="34" charset="0"/>
-                <a:cs typeface="Vrinda" panose="020B0502040204020203" pitchFamily="34" charset="0"/>
-              </a:rPr>
-              <a:t> </a:t>
-            </a:r>
-            <a:r>
-              <a:rPr lang="en-US" sz="1800" dirty="0" err="1">
+                <a:solidFill>
+                  <a:schemeClr val="bg1"/>
+                </a:solidFill>
+                <a:effectLst/>
+                <a:latin typeface="SutonnyMJ" pitchFamily="2" charset="0"/>
+                <a:ea typeface="Calibri" panose="020F0502020204030204" pitchFamily="34" charset="0"/>
+                <a:cs typeface="Vrinda" panose="020B0502040204020203" pitchFamily="34" charset="0"/>
+              </a:rPr>
+              <a:t> </a:t>
+            </a:r>
+            <a:r>
+              <a:rPr lang="en-US" sz="1800" dirty="0" err="1">
+                <a:solidFill>
+                  <a:schemeClr val="bg1"/>
+                </a:solidFill>
                 <a:effectLst/>
                 <a:latin typeface="SutonnyMJ" pitchFamily="2" charset="0"/>
                 <a:ea typeface="Calibri" panose="020F0502020204030204" pitchFamily="34" charset="0"/>
@@ -12595,15 +13594,21 @@
             </a:r>
             <a:r>
               <a:rPr lang="en-US" sz="1800" dirty="0">
-                <a:effectLst/>
-                <a:latin typeface="SutonnyMJ" pitchFamily="2" charset="0"/>
-                <a:ea typeface="Calibri" panose="020F0502020204030204" pitchFamily="34" charset="0"/>
-                <a:cs typeface="Vrinda" panose="020B0502040204020203" pitchFamily="34" charset="0"/>
-              </a:rPr>
-              <a:t> </a:t>
-            </a:r>
-            <a:r>
-              <a:rPr lang="en-US" sz="1800" dirty="0" err="1">
+                <a:solidFill>
+                  <a:schemeClr val="bg1"/>
+                </a:solidFill>
+                <a:effectLst/>
+                <a:latin typeface="SutonnyMJ" pitchFamily="2" charset="0"/>
+                <a:ea typeface="Calibri" panose="020F0502020204030204" pitchFamily="34" charset="0"/>
+                <a:cs typeface="Vrinda" panose="020B0502040204020203" pitchFamily="34" charset="0"/>
+              </a:rPr>
+              <a:t> </a:t>
+            </a:r>
+            <a:r>
+              <a:rPr lang="en-US" sz="1800" dirty="0" err="1">
+                <a:solidFill>
+                  <a:schemeClr val="bg1"/>
+                </a:solidFill>
                 <a:effectLst/>
                 <a:latin typeface="SutonnyMJ" pitchFamily="2" charset="0"/>
                 <a:ea typeface="Calibri" panose="020F0502020204030204" pitchFamily="34" charset="0"/>
@@ -12613,15 +13618,21 @@
             </a:r>
             <a:r>
               <a:rPr lang="en-US" sz="1800" dirty="0">
-                <a:effectLst/>
-                <a:latin typeface="SutonnyMJ" pitchFamily="2" charset="0"/>
-                <a:ea typeface="Calibri" panose="020F0502020204030204" pitchFamily="34" charset="0"/>
-                <a:cs typeface="Vrinda" panose="020B0502040204020203" pitchFamily="34" charset="0"/>
-              </a:rPr>
-              <a:t> </a:t>
-            </a:r>
-            <a:r>
-              <a:rPr lang="en-US" sz="1800" dirty="0" err="1">
+                <a:solidFill>
+                  <a:schemeClr val="bg1"/>
+                </a:solidFill>
+                <a:effectLst/>
+                <a:latin typeface="SutonnyMJ" pitchFamily="2" charset="0"/>
+                <a:ea typeface="Calibri" panose="020F0502020204030204" pitchFamily="34" charset="0"/>
+                <a:cs typeface="Vrinda" panose="020B0502040204020203" pitchFamily="34" charset="0"/>
+              </a:rPr>
+              <a:t> </a:t>
+            </a:r>
+            <a:r>
+              <a:rPr lang="en-US" sz="1800" dirty="0" err="1">
+                <a:solidFill>
+                  <a:schemeClr val="bg1"/>
+                </a:solidFill>
                 <a:effectLst/>
                 <a:latin typeface="SutonnyMJ" pitchFamily="2" charset="0"/>
                 <a:ea typeface="Calibri" panose="020F0502020204030204" pitchFamily="34" charset="0"/>
@@ -12631,15 +13642,21 @@
             </a:r>
             <a:r>
               <a:rPr lang="en-US" sz="1800" dirty="0">
-                <a:effectLst/>
-                <a:latin typeface="SutonnyMJ" pitchFamily="2" charset="0"/>
-                <a:ea typeface="Calibri" panose="020F0502020204030204" pitchFamily="34" charset="0"/>
-                <a:cs typeface="Vrinda" panose="020B0502040204020203" pitchFamily="34" charset="0"/>
-              </a:rPr>
-              <a:t> </a:t>
-            </a:r>
-            <a:r>
-              <a:rPr lang="en-US" sz="1800" dirty="0" err="1">
+                <a:solidFill>
+                  <a:schemeClr val="bg1"/>
+                </a:solidFill>
+                <a:effectLst/>
+                <a:latin typeface="SutonnyMJ" pitchFamily="2" charset="0"/>
+                <a:ea typeface="Calibri" panose="020F0502020204030204" pitchFamily="34" charset="0"/>
+                <a:cs typeface="Vrinda" panose="020B0502040204020203" pitchFamily="34" charset="0"/>
+              </a:rPr>
+              <a:t> </a:t>
+            </a:r>
+            <a:r>
+              <a:rPr lang="en-US" sz="1800" dirty="0" err="1">
+                <a:solidFill>
+                  <a:schemeClr val="bg1"/>
+                </a:solidFill>
                 <a:effectLst/>
                 <a:latin typeface="SutonnyMJ" pitchFamily="2" charset="0"/>
                 <a:ea typeface="Calibri" panose="020F0502020204030204" pitchFamily="34" charset="0"/>
@@ -12649,6 +13666,9 @@
             </a:r>
             <a:r>
               <a:rPr lang="en-US" sz="1800" dirty="0">
+                <a:solidFill>
+                  <a:schemeClr val="bg1"/>
+                </a:solidFill>
                 <a:effectLst/>
                 <a:latin typeface="SutonnyMJ" pitchFamily="2" charset="0"/>
                 <a:ea typeface="Calibri" panose="020F0502020204030204" pitchFamily="34" charset="0"/>
@@ -12658,6 +13678,9 @@
             </a:r>
             <a:r>
               <a:rPr lang="en-US" sz="1800" dirty="0" err="1">
+                <a:solidFill>
+                  <a:schemeClr val="bg1"/>
+                </a:solidFill>
                 <a:effectLst/>
                 <a:latin typeface="SutonnyOMJ" panose="01010600010101010101" pitchFamily="2" charset="0"/>
                 <a:ea typeface="Calibri" panose="020F0502020204030204" pitchFamily="34" charset="0"/>
@@ -12666,6 +13689,9 @@
               <a:t>মাধ্যম</a:t>
             </a:r>
             <a:endParaRPr lang="en-US" dirty="0">
+              <a:solidFill>
+                <a:schemeClr val="bg1"/>
+              </a:solidFill>
               <a:latin typeface="SutonnyMJ" pitchFamily="2" charset="0"/>
             </a:endParaRPr>
           </a:p>
@@ -12688,8 +13714,12 @@
           </a:bodyPr>
           <a:lstStyle/>
           <a:p>
+            <a:pPr algn="ctr"/>
             <a:r>
               <a:rPr lang="en-US" sz="2800" dirty="0" err="1">
+                <a:solidFill>
+                  <a:schemeClr val="bg1"/>
+                </a:solidFill>
                 <a:effectLst/>
                 <a:latin typeface="SutonnyMJ" pitchFamily="2" charset="0"/>
                 <a:ea typeface="Calibri" panose="020F0502020204030204" pitchFamily="34" charset="0"/>
@@ -12699,6 +13729,9 @@
             </a:r>
             <a:r>
               <a:rPr lang="en-US" sz="2800" dirty="0">
+                <a:solidFill>
+                  <a:schemeClr val="bg1"/>
+                </a:solidFill>
                 <a:effectLst/>
                 <a:latin typeface="SutonnyMJ" pitchFamily="2" charset="0"/>
                 <a:ea typeface="Calibri" panose="020F0502020204030204" pitchFamily="34" charset="0"/>
@@ -12708,6 +13741,9 @@
             </a:r>
             <a:r>
               <a:rPr lang="en-US" sz="2800" dirty="0" err="1">
+                <a:solidFill>
+                  <a:schemeClr val="bg1"/>
+                </a:solidFill>
                 <a:effectLst/>
                 <a:latin typeface="SutonnyMJ" pitchFamily="2" charset="0"/>
                 <a:ea typeface="Calibri" panose="020F0502020204030204" pitchFamily="34" charset="0"/>
@@ -12717,6 +13753,9 @@
             </a:r>
             <a:r>
               <a:rPr lang="en-US" sz="2800" dirty="0">
+                <a:solidFill>
+                  <a:schemeClr val="bg1"/>
+                </a:solidFill>
                 <a:effectLst/>
                 <a:latin typeface="SutonnyMJ" pitchFamily="2" charset="0"/>
                 <a:ea typeface="Calibri" panose="020F0502020204030204" pitchFamily="34" charset="0"/>
@@ -12726,6 +13765,9 @@
             </a:r>
             <a:r>
               <a:rPr lang="en-US" sz="2800" dirty="0" err="1">
+                <a:solidFill>
+                  <a:schemeClr val="bg1"/>
+                </a:solidFill>
                 <a:effectLst/>
                 <a:latin typeface="SutonnyOMJ" panose="01010600010101010101" pitchFamily="2" charset="0"/>
                 <a:ea typeface="Calibri" panose="020F0502020204030204" pitchFamily="34" charset="0"/>
@@ -12735,6 +13777,9 @@
             </a:r>
             <a:r>
               <a:rPr lang="en-US" sz="2800" dirty="0">
+                <a:solidFill>
+                  <a:schemeClr val="bg1"/>
+                </a:solidFill>
                 <a:effectLst/>
                 <a:latin typeface="SutonnyMJ" pitchFamily="2" charset="0"/>
                 <a:ea typeface="Calibri" panose="020F0502020204030204" pitchFamily="34" charset="0"/>
@@ -12744,6 +13789,9 @@
             </a:r>
             <a:r>
               <a:rPr lang="en-US" sz="2800" dirty="0" err="1">
+                <a:solidFill>
+                  <a:schemeClr val="bg1"/>
+                </a:solidFill>
                 <a:effectLst/>
                 <a:latin typeface="SutonnyMJ" pitchFamily="2" charset="0"/>
                 <a:ea typeface="Calibri" panose="020F0502020204030204" pitchFamily="34" charset="0"/>
@@ -12751,7 +13799,11 @@
               </a:rPr>
               <a:t>my‡hvM-myweavmg~n</a:t>
             </a:r>
-            <a:endParaRPr lang="en-US" sz="2800" dirty="0"/>
+            <a:endParaRPr lang="en-US" sz="2800" dirty="0">
+              <a:solidFill>
+                <a:schemeClr val="bg1"/>
+              </a:solidFill>
+            </a:endParaRPr>
           </a:p>
         </p:txBody>
       </p:sp>
@@ -12777,8 +13829,8 @@
         </p:blipFill>
         <p:spPr>
           <a:xfrm>
-            <a:off x="7147774" y="5399467"/>
-            <a:ext cx="1841680" cy="1368430"/>
+            <a:off x="7739269" y="5671929"/>
+            <a:ext cx="1311965" cy="1095967"/>
           </a:xfrm>
           <a:prstGeom prst="rect">
             <a:avLst/>

</xml_diff>